<commit_message>
Add slides for introduction and nbis presentation
</commit_message>
<xml_diff>
--- a/topics/other/slide_introduction.pptx
+++ b/topics/other/slide_introduction.pptx
@@ -5,26 +5,21 @@
     <p:sldMasterId id="2147483869" r:id="rId1"/>
   </p:sldMasterIdLst>
   <p:notesMasterIdLst>
-    <p:notesMasterId r:id="rId16"/>
+    <p:notesMasterId r:id="rId11"/>
   </p:notesMasterIdLst>
   <p:handoutMasterIdLst>
-    <p:handoutMasterId r:id="rId17"/>
+    <p:handoutMasterId r:id="rId12"/>
   </p:handoutMasterIdLst>
   <p:sldIdLst>
     <p:sldId id="256" r:id="rId2"/>
     <p:sldId id="1125" r:id="rId3"/>
     <p:sldId id="1121" r:id="rId4"/>
     <p:sldId id="1131" r:id="rId5"/>
-    <p:sldId id="1113" r:id="rId6"/>
-    <p:sldId id="1114" r:id="rId7"/>
-    <p:sldId id="1126" r:id="rId8"/>
-    <p:sldId id="1127" r:id="rId9"/>
-    <p:sldId id="1128" r:id="rId10"/>
-    <p:sldId id="1129" r:id="rId11"/>
-    <p:sldId id="1135" r:id="rId12"/>
-    <p:sldId id="1134" r:id="rId13"/>
-    <p:sldId id="1136" r:id="rId14"/>
-    <p:sldId id="1133" r:id="rId15"/>
+    <p:sldId id="1137" r:id="rId6"/>
+    <p:sldId id="1129" r:id="rId7"/>
+    <p:sldId id="1135" r:id="rId8"/>
+    <p:sldId id="1136" r:id="rId9"/>
+    <p:sldId id="1133" r:id="rId10"/>
   </p:sldIdLst>
   <p:sldSz cx="12192000" cy="6858000"/>
   <p:notesSz cx="6858000" cy="9144000"/>
@@ -134,6 +129,12 @@
 </p:presentation>
 </file>
 
+<file path=ppt/commentAuthors.xml><?xml version="1.0" encoding="utf-8"?>
+<p:cmAuthorLst xmlns:a="http://schemas.openxmlformats.org/drawingml/2006/main" xmlns:r="http://schemas.openxmlformats.org/officeDocument/2006/relationships" xmlns:p="http://schemas.openxmlformats.org/presentationml/2006/main">
+  <p:cmAuthor id="1" name="Elin Kronander" initials="" lastIdx="1" clrIdx="0"/>
+</p:cmAuthorLst>
+</file>
+
 <file path=ppt/handoutMasters/handoutMaster1.xml><?xml version="1.0" encoding="utf-8"?>
 <p:handoutMaster xmlns:a="http://schemas.openxmlformats.org/drawingml/2006/main" xmlns:r="http://schemas.openxmlformats.org/officeDocument/2006/relationships" xmlns:p="http://schemas.openxmlformats.org/presentationml/2006/main">
   <p:cSld>
@@ -306,7 +307,7 @@
           <a:p>
             <a:fld id="{C3D4F295-D1F4-D54B-BA69-832D96C6432A}" type="datetimeFigureOut">
               <a:rPr lang="en-SE" smtClean="0"/>
-              <a:t>2023-02-03</a:t>
+              <a:t>2023-11-06</a:t>
             </a:fld>
             <a:endParaRPr lang="en-SE"/>
           </a:p>
@@ -405,7 +406,7 @@
           <a:p>
             <a:fld id="{1EC88F62-802F-2448-8EA8-1562273BBAF4}" type="datetimeFigureOut">
               <a:rPr lang="en-SE" smtClean="0"/>
-              <a:t>2023-02-03</a:t>
+              <a:t>2023-11-06</a:t>
             </a:fld>
             <a:endParaRPr lang="en-SE"/>
           </a:p>
@@ -1000,7 +1001,7 @@
           <a:p>
             <a:fld id="{DA3BA1A2-6287-9245-9FC9-020813467484}" type="slidenum">
               <a:rPr lang="en-SE" smtClean="0"/>
-              <a:t>10</a:t>
+              <a:t>6</a:t>
             </a:fld>
             <a:endParaRPr lang="en-SE"/>
           </a:p>
@@ -1114,7 +1115,7 @@
           <a:p>
             <a:fld id="{DA3BA1A2-6287-9245-9FC9-020813467484}" type="slidenum">
               <a:rPr lang="en-SE" smtClean="0"/>
-              <a:t>11</a:t>
+              <a:t>7</a:t>
             </a:fld>
             <a:endParaRPr lang="en-SE"/>
           </a:p>
@@ -2148,21 +2149,7 @@
           <a:bodyPr/>
           <a:lstStyle/>
           <a:p>
-            <a:r>
-              <a:rPr lang="sv-SE" dirty="0"/>
-              <a:t>Martin </a:t>
-            </a:r>
-            <a:r>
-              <a:rPr lang="sv-SE" dirty="0" err="1"/>
-              <a:t>Dahlö</a:t>
-            </a:r>
             <a:endParaRPr lang="sv-SE" dirty="0"/>
-          </a:p>
-          <a:p>
-            <a:r>
-              <a:rPr lang="sv-SE" dirty="0"/>
-              <a:t>2023-02-06</a:t>
-            </a:r>
           </a:p>
         </p:txBody>
       </p:sp>
@@ -2170,621 +2157,6 @@
     <p:extLst>
       <p:ext uri="{BB962C8B-B14F-4D97-AF65-F5344CB8AC3E}">
         <p14:creationId xmlns:p14="http://schemas.microsoft.com/office/powerpoint/2010/main" val="1820487766"/>
-      </p:ext>
-    </p:extLst>
-  </p:cSld>
-  <p:clrMapOvr>
-    <a:masterClrMapping/>
-  </p:clrMapOvr>
-</p:sld>
-</file>
-
-<file path=ppt/slides/slide10.xml><?xml version="1.0" encoding="utf-8"?>
-<p:sld xmlns:a="http://schemas.openxmlformats.org/drawingml/2006/main" xmlns:r="http://schemas.openxmlformats.org/officeDocument/2006/relationships" xmlns:p="http://schemas.openxmlformats.org/presentationml/2006/main">
-  <p:cSld>
-    <p:spTree>
-      <p:nvGrpSpPr>
-        <p:cNvPr id="1" name=""/>
-        <p:cNvGrpSpPr/>
-        <p:nvPr/>
-      </p:nvGrpSpPr>
-      <p:grpSpPr>
-        <a:xfrm>
-          <a:off x="0" y="0"/>
-          <a:ext cx="0" cy="0"/>
-          <a:chOff x="0" y="0"/>
-          <a:chExt cx="0" cy="0"/>
-        </a:xfrm>
-      </p:grpSpPr>
-      <p:sp>
-        <p:nvSpPr>
-          <p:cNvPr id="2" name="Platshållare för innehåll 1">
-            <a:extLst>
-              <a:ext uri="{FF2B5EF4-FFF2-40B4-BE49-F238E27FC236}">
-                <a16:creationId xmlns:a16="http://schemas.microsoft.com/office/drawing/2014/main" id="{EFEF3CA9-AB7A-A446-91F3-AFDAACBB631D}"/>
-              </a:ext>
-            </a:extLst>
-          </p:cNvPr>
-          <p:cNvSpPr>
-            <a:spLocks noGrp="1"/>
-          </p:cNvSpPr>
-          <p:nvPr>
-            <p:ph idx="1"/>
-          </p:nvPr>
-        </p:nvSpPr>
-        <p:spPr>
-          <a:xfrm>
-            <a:off x="431209" y="1241059"/>
-            <a:ext cx="8680133" cy="2992407"/>
-          </a:xfrm>
-        </p:spPr>
-        <p:txBody>
-          <a:bodyPr/>
-          <a:lstStyle/>
-          <a:p>
-            <a:pPr marL="342900" indent="-342900">
-              <a:buFont typeface="Arial" panose="020B0604020202020204" pitchFamily="34" charset="0"/>
-              <a:buChar char="•"/>
-            </a:pPr>
-            <a:r>
-              <a:rPr lang="en-GB" sz="2400" dirty="0"/>
-              <a:t>Instructions available in Canvas:</a:t>
-            </a:r>
-            <a:endParaRPr lang="en-GB" dirty="0"/>
-          </a:p>
-          <a:p>
-            <a:pPr marL="800100" lvl="1" indent="-342900">
-              <a:buFont typeface="Arial" panose="020B0604020202020204" pitchFamily="34" charset="0"/>
-              <a:buChar char="•"/>
-            </a:pPr>
-            <a:r>
-              <a:rPr lang="en-GB" sz="2000" dirty="0">
-                <a:hlinkClick r:id="rId3"/>
-              </a:rPr>
-              <a:t>https://uppsala.instructure.com/courses/76870</a:t>
-            </a:r>
-            <a:endParaRPr lang="en-GB" sz="2000" dirty="0"/>
-          </a:p>
-          <a:p>
-            <a:pPr marL="800100" lvl="1" indent="-342900">
-              <a:buFont typeface="Arial" panose="020B0604020202020204" pitchFamily="34" charset="0"/>
-              <a:buChar char="•"/>
-            </a:pPr>
-            <a:r>
-              <a:rPr lang="en-GB" sz="2000" dirty="0"/>
-              <a:t>All material listed under “Contents”</a:t>
-            </a:r>
-            <a:endParaRPr lang="en-GB" sz="2400" dirty="0"/>
-          </a:p>
-          <a:p>
-            <a:pPr marL="342900" indent="-342900">
-              <a:buFont typeface="Arial" panose="020B0604020202020204" pitchFamily="34" charset="0"/>
-              <a:buChar char="•"/>
-            </a:pPr>
-            <a:r>
-              <a:rPr lang="en-GB" sz="2400" dirty="0"/>
-              <a:t>Work in pairs because it improves the learning.</a:t>
-            </a:r>
-          </a:p>
-          <a:p>
-            <a:pPr marL="342900" indent="-342900">
-              <a:buFont typeface="Arial" panose="020B0604020202020204" pitchFamily="34" charset="0"/>
-              <a:buChar char="•"/>
-            </a:pPr>
-            <a:r>
-              <a:rPr lang="en-GB" sz="2400" dirty="0"/>
-              <a:t>TAs available in your classroom</a:t>
-            </a:r>
-          </a:p>
-          <a:p>
-            <a:endParaRPr lang="en-GB" dirty="0"/>
-          </a:p>
-          <a:p>
-            <a:endParaRPr lang="en-GB" dirty="0"/>
-          </a:p>
-          <a:p>
-            <a:endParaRPr lang="en-GB" dirty="0"/>
-          </a:p>
-          <a:p>
-            <a:endParaRPr lang="en-GB" dirty="0"/>
-          </a:p>
-        </p:txBody>
-      </p:sp>
-      <p:sp>
-        <p:nvSpPr>
-          <p:cNvPr id="3" name="Rubrik 2">
-            <a:extLst>
-              <a:ext uri="{FF2B5EF4-FFF2-40B4-BE49-F238E27FC236}">
-                <a16:creationId xmlns:a16="http://schemas.microsoft.com/office/drawing/2014/main" id="{7E27F0CF-10D2-0745-B573-A806CFB1514D}"/>
-              </a:ext>
-            </a:extLst>
-          </p:cNvPr>
-          <p:cNvSpPr>
-            <a:spLocks noGrp="1"/>
-          </p:cNvSpPr>
-          <p:nvPr>
-            <p:ph type="title"/>
-          </p:nvPr>
-        </p:nvSpPr>
-        <p:spPr/>
-        <p:txBody>
-          <a:bodyPr>
-            <a:normAutofit fontScale="90000"/>
-          </a:bodyPr>
-          <a:lstStyle/>
-          <a:p>
-            <a:r>
-              <a:rPr lang="en-GB" dirty="0"/>
-              <a:t>Labs</a:t>
-            </a:r>
-          </a:p>
-        </p:txBody>
-      </p:sp>
-    </p:spTree>
-    <p:extLst>
-      <p:ext uri="{BB962C8B-B14F-4D97-AF65-F5344CB8AC3E}">
-        <p14:creationId xmlns:p14="http://schemas.microsoft.com/office/powerpoint/2010/main" val="235262784"/>
-      </p:ext>
-    </p:extLst>
-  </p:cSld>
-  <p:clrMapOvr>
-    <a:masterClrMapping/>
-  </p:clrMapOvr>
-</p:sld>
-</file>
-
-<file path=ppt/slides/slide11.xml><?xml version="1.0" encoding="utf-8"?>
-<p:sld xmlns:a="http://schemas.openxmlformats.org/drawingml/2006/main" xmlns:r="http://schemas.openxmlformats.org/officeDocument/2006/relationships" xmlns:p="http://schemas.openxmlformats.org/presentationml/2006/main">
-  <p:cSld>
-    <p:spTree>
-      <p:nvGrpSpPr>
-        <p:cNvPr id="1" name=""/>
-        <p:cNvGrpSpPr/>
-        <p:nvPr/>
-      </p:nvGrpSpPr>
-      <p:grpSpPr>
-        <a:xfrm>
-          <a:off x="0" y="0"/>
-          <a:ext cx="0" cy="0"/>
-          <a:chOff x="0" y="0"/>
-          <a:chExt cx="0" cy="0"/>
-        </a:xfrm>
-      </p:grpSpPr>
-      <p:sp>
-        <p:nvSpPr>
-          <p:cNvPr id="2" name="Content Placeholder 1">
-            <a:extLst>
-              <a:ext uri="{FF2B5EF4-FFF2-40B4-BE49-F238E27FC236}">
-                <a16:creationId xmlns:a16="http://schemas.microsoft.com/office/drawing/2014/main" id="{D8A19674-0785-988B-CAE8-B69C6C1D93C5}"/>
-              </a:ext>
-            </a:extLst>
-          </p:cNvPr>
-          <p:cNvSpPr>
-            <a:spLocks noGrp="1"/>
-          </p:cNvSpPr>
-          <p:nvPr>
-            <p:ph idx="1"/>
-          </p:nvPr>
-        </p:nvSpPr>
-        <p:spPr/>
-        <p:txBody>
-          <a:bodyPr>
-            <a:normAutofit/>
-          </a:bodyPr>
-          <a:lstStyle/>
-          <a:p>
-            <a:r>
-              <a:rPr lang="en-SE" sz="2400" dirty="0"/>
-              <a:t>Those that attend the full workshop* will get a certificate.</a:t>
-            </a:r>
-          </a:p>
-          <a:p>
-            <a:r>
-              <a:rPr lang="en-SE" sz="2400" dirty="0"/>
-              <a:t>	*Attendence at all lectures and labs</a:t>
-            </a:r>
-          </a:p>
-          <a:p>
-            <a:r>
-              <a:rPr lang="en-SE" sz="2400" dirty="0"/>
-              <a:t>	*Labs done (to the basic level)</a:t>
-            </a:r>
-          </a:p>
-          <a:p>
-            <a:r>
-              <a:rPr lang="en-SE" sz="2400"/>
-              <a:t>	*Let us know if you need to miss a session</a:t>
-            </a:r>
-            <a:endParaRPr lang="en-SE" sz="2400" dirty="0"/>
-          </a:p>
-          <a:p>
-            <a:endParaRPr lang="en-SE" sz="2400" dirty="0"/>
-          </a:p>
-          <a:p>
-            <a:r>
-              <a:rPr lang="en-SE" sz="2400" dirty="0"/>
-              <a:t>The certificate will not state number of credits. It will say that this was a full weeks workshop and what topics were covered.</a:t>
-            </a:r>
-          </a:p>
-          <a:p>
-            <a:endParaRPr lang="en-SE" sz="2400" dirty="0"/>
-          </a:p>
-          <a:p>
-            <a:r>
-              <a:rPr lang="en-SE" sz="2400" dirty="0"/>
-              <a:t>Please fill in attendence sheets on the wall!</a:t>
-            </a:r>
-          </a:p>
-        </p:txBody>
-      </p:sp>
-      <p:sp>
-        <p:nvSpPr>
-          <p:cNvPr id="3" name="Title 2">
-            <a:extLst>
-              <a:ext uri="{FF2B5EF4-FFF2-40B4-BE49-F238E27FC236}">
-                <a16:creationId xmlns:a16="http://schemas.microsoft.com/office/drawing/2014/main" id="{1C20F98B-1903-2E1B-1CC1-DFE396E5749F}"/>
-              </a:ext>
-            </a:extLst>
-          </p:cNvPr>
-          <p:cNvSpPr>
-            <a:spLocks noGrp="1"/>
-          </p:cNvSpPr>
-          <p:nvPr>
-            <p:ph type="title"/>
-          </p:nvPr>
-        </p:nvSpPr>
-        <p:spPr/>
-        <p:txBody>
-          <a:bodyPr>
-            <a:normAutofit fontScale="90000"/>
-          </a:bodyPr>
-          <a:lstStyle/>
-          <a:p>
-            <a:r>
-              <a:rPr lang="en-SE" dirty="0"/>
-              <a:t>Attendence and certificate</a:t>
-            </a:r>
-          </a:p>
-        </p:txBody>
-      </p:sp>
-    </p:spTree>
-    <p:extLst>
-      <p:ext uri="{BB962C8B-B14F-4D97-AF65-F5344CB8AC3E}">
-        <p14:creationId xmlns:p14="http://schemas.microsoft.com/office/powerpoint/2010/main" val="4010080424"/>
-      </p:ext>
-    </p:extLst>
-  </p:cSld>
-  <p:clrMapOvr>
-    <a:masterClrMapping/>
-  </p:clrMapOvr>
-</p:sld>
-</file>
-
-<file path=ppt/slides/slide12.xml><?xml version="1.0" encoding="utf-8"?>
-<p:sld xmlns:a="http://schemas.openxmlformats.org/drawingml/2006/main" xmlns:r="http://schemas.openxmlformats.org/officeDocument/2006/relationships" xmlns:p="http://schemas.openxmlformats.org/presentationml/2006/main">
-  <p:cSld>
-    <p:spTree>
-      <p:nvGrpSpPr>
-        <p:cNvPr id="1" name=""/>
-        <p:cNvGrpSpPr/>
-        <p:nvPr/>
-      </p:nvGrpSpPr>
-      <p:grpSpPr>
-        <a:xfrm>
-          <a:off x="0" y="0"/>
-          <a:ext cx="0" cy="0"/>
-          <a:chOff x="0" y="0"/>
-          <a:chExt cx="0" cy="0"/>
-        </a:xfrm>
-      </p:grpSpPr>
-      <p:sp>
-        <p:nvSpPr>
-          <p:cNvPr id="2" name="Content Placeholder 1">
-            <a:extLst>
-              <a:ext uri="{FF2B5EF4-FFF2-40B4-BE49-F238E27FC236}">
-                <a16:creationId xmlns:a16="http://schemas.microsoft.com/office/drawing/2014/main" id="{A59D0C7B-BD22-F2F2-5776-D2C9D947456C}"/>
-              </a:ext>
-            </a:extLst>
-          </p:cNvPr>
-          <p:cNvSpPr>
-            <a:spLocks noGrp="1"/>
-          </p:cNvSpPr>
-          <p:nvPr>
-            <p:ph idx="1"/>
-          </p:nvPr>
-        </p:nvSpPr>
-        <p:spPr>
-          <a:xfrm>
-            <a:off x="1608082" y="1397876"/>
-            <a:ext cx="10152707" cy="4772579"/>
-          </a:xfrm>
-        </p:spPr>
-        <p:txBody>
-          <a:bodyPr>
-            <a:normAutofit/>
-          </a:bodyPr>
-          <a:lstStyle/>
-          <a:p>
-            <a:r>
-              <a:rPr lang="en-SE" sz="2400" dirty="0"/>
-              <a:t>Coffe is ordered for 10:00 and 14:30 every day</a:t>
-            </a:r>
-          </a:p>
-          <a:p>
-            <a:r>
-              <a:rPr lang="en-SE" sz="2400" dirty="0"/>
-              <a:t>May adjust times a bit depending on lectures</a:t>
-            </a:r>
-          </a:p>
-          <a:p>
-            <a:endParaRPr lang="en-SE" sz="2400" dirty="0"/>
-          </a:p>
-          <a:p>
-            <a:r>
-              <a:rPr lang="en-SE" sz="2400" dirty="0"/>
-              <a:t>Lunch booked at 12:00 every day</a:t>
-            </a:r>
-          </a:p>
-          <a:p>
-            <a:r>
-              <a:rPr lang="en-SE" sz="2400" dirty="0"/>
-              <a:t>Uppsala: </a:t>
-            </a:r>
-          </a:p>
-          <a:p>
-            <a:r>
-              <a:rPr lang="en-SE" sz="2400" dirty="0"/>
-              <a:t>Lund:</a:t>
-            </a:r>
-          </a:p>
-          <a:p>
-            <a:r>
-              <a:rPr lang="en-SE" sz="2400" dirty="0"/>
-              <a:t>Umeå</a:t>
-            </a:r>
-          </a:p>
-        </p:txBody>
-      </p:sp>
-      <p:sp>
-        <p:nvSpPr>
-          <p:cNvPr id="3" name="Title 2">
-            <a:extLst>
-              <a:ext uri="{FF2B5EF4-FFF2-40B4-BE49-F238E27FC236}">
-                <a16:creationId xmlns:a16="http://schemas.microsoft.com/office/drawing/2014/main" id="{74A0B91E-463E-527C-F8D7-0CD4E3296134}"/>
-              </a:ext>
-            </a:extLst>
-          </p:cNvPr>
-          <p:cNvSpPr>
-            <a:spLocks noGrp="1"/>
-          </p:cNvSpPr>
-          <p:nvPr>
-            <p:ph type="title"/>
-          </p:nvPr>
-        </p:nvSpPr>
-        <p:spPr/>
-        <p:txBody>
-          <a:bodyPr>
-            <a:normAutofit fontScale="90000"/>
-          </a:bodyPr>
-          <a:lstStyle/>
-          <a:p>
-            <a:r>
-              <a:rPr lang="en-SE" dirty="0"/>
-              <a:t>Breaks</a:t>
-            </a:r>
-          </a:p>
-        </p:txBody>
-      </p:sp>
-    </p:spTree>
-    <p:extLst>
-      <p:ext uri="{BB962C8B-B14F-4D97-AF65-F5344CB8AC3E}">
-        <p14:creationId xmlns:p14="http://schemas.microsoft.com/office/powerpoint/2010/main" val="2063477004"/>
-      </p:ext>
-    </p:extLst>
-  </p:cSld>
-  <p:clrMapOvr>
-    <a:masterClrMapping/>
-  </p:clrMapOvr>
-</p:sld>
-</file>
-
-<file path=ppt/slides/slide13.xml><?xml version="1.0" encoding="utf-8"?>
-<p:sld xmlns:a="http://schemas.openxmlformats.org/drawingml/2006/main" xmlns:r="http://schemas.openxmlformats.org/officeDocument/2006/relationships" xmlns:p="http://schemas.openxmlformats.org/presentationml/2006/main">
-  <p:cSld>
-    <p:spTree>
-      <p:nvGrpSpPr>
-        <p:cNvPr id="1" name=""/>
-        <p:cNvGrpSpPr/>
-        <p:nvPr/>
-      </p:nvGrpSpPr>
-      <p:grpSpPr>
-        <a:xfrm>
-          <a:off x="0" y="0"/>
-          <a:ext cx="0" cy="0"/>
-          <a:chOff x="0" y="0"/>
-          <a:chExt cx="0" cy="0"/>
-        </a:xfrm>
-      </p:grpSpPr>
-      <p:sp>
-        <p:nvSpPr>
-          <p:cNvPr id="2" name="Content Placeholder 1">
-            <a:extLst>
-              <a:ext uri="{FF2B5EF4-FFF2-40B4-BE49-F238E27FC236}">
-                <a16:creationId xmlns:a16="http://schemas.microsoft.com/office/drawing/2014/main" id="{D96A6D82-F9B4-3263-5767-33C81CEE1332}"/>
-              </a:ext>
-            </a:extLst>
-          </p:cNvPr>
-          <p:cNvSpPr>
-            <a:spLocks noGrp="1"/>
-          </p:cNvSpPr>
-          <p:nvPr>
-            <p:ph idx="1"/>
-          </p:nvPr>
-        </p:nvSpPr>
-        <p:spPr/>
-        <p:txBody>
-          <a:bodyPr>
-            <a:normAutofit/>
-          </a:bodyPr>
-          <a:lstStyle/>
-          <a:p>
-            <a:r>
-              <a:rPr lang="en-SE" sz="2400" dirty="0"/>
-              <a:t>Wednesday 18:00</a:t>
-            </a:r>
-          </a:p>
-          <a:p>
-            <a:endParaRPr lang="en-SE" sz="2400" dirty="0"/>
-          </a:p>
-          <a:p>
-            <a:r>
-              <a:rPr lang="en-SE" sz="2400" dirty="0"/>
-              <a:t>Uppsala: Koh Phangan, Fyristorg 2</a:t>
-            </a:r>
-          </a:p>
-          <a:p>
-            <a:r>
-              <a:rPr lang="en-SE" sz="2400" dirty="0"/>
-              <a:t>Lund:</a:t>
-            </a:r>
-          </a:p>
-          <a:p>
-            <a:r>
-              <a:rPr lang="en-SE" sz="2400" dirty="0"/>
-              <a:t>Umeå:</a:t>
-            </a:r>
-          </a:p>
-          <a:p>
-            <a:endParaRPr lang="en-SE" sz="2400" dirty="0"/>
-          </a:p>
-          <a:p>
-            <a:r>
-              <a:rPr lang="en-SE" sz="2400" dirty="0"/>
-              <a:t>Please sign up on the list in the classroom on Monday!</a:t>
-            </a:r>
-          </a:p>
-        </p:txBody>
-      </p:sp>
-      <p:sp>
-        <p:nvSpPr>
-          <p:cNvPr id="3" name="Title 2">
-            <a:extLst>
-              <a:ext uri="{FF2B5EF4-FFF2-40B4-BE49-F238E27FC236}">
-                <a16:creationId xmlns:a16="http://schemas.microsoft.com/office/drawing/2014/main" id="{B89F6912-36F6-CA31-AC72-7539500C7B1B}"/>
-              </a:ext>
-            </a:extLst>
-          </p:cNvPr>
-          <p:cNvSpPr>
-            <a:spLocks noGrp="1"/>
-          </p:cNvSpPr>
-          <p:nvPr>
-            <p:ph type="title"/>
-          </p:nvPr>
-        </p:nvSpPr>
-        <p:spPr/>
-        <p:txBody>
-          <a:bodyPr>
-            <a:normAutofit fontScale="90000"/>
-          </a:bodyPr>
-          <a:lstStyle/>
-          <a:p>
-            <a:r>
-              <a:rPr lang="en-SE" dirty="0"/>
-              <a:t>Course dinner</a:t>
-            </a:r>
-          </a:p>
-        </p:txBody>
-      </p:sp>
-    </p:spTree>
-    <p:extLst>
-      <p:ext uri="{BB962C8B-B14F-4D97-AF65-F5344CB8AC3E}">
-        <p14:creationId xmlns:p14="http://schemas.microsoft.com/office/powerpoint/2010/main" val="2894102020"/>
-      </p:ext>
-    </p:extLst>
-  </p:cSld>
-  <p:clrMapOvr>
-    <a:masterClrMapping/>
-  </p:clrMapOvr>
-</p:sld>
-</file>
-
-<file path=ppt/slides/slide14.xml><?xml version="1.0" encoding="utf-8"?>
-<p:sld xmlns:a="http://schemas.openxmlformats.org/drawingml/2006/main" xmlns:r="http://schemas.openxmlformats.org/officeDocument/2006/relationships" xmlns:p="http://schemas.openxmlformats.org/presentationml/2006/main">
-  <p:cSld>
-    <p:spTree>
-      <p:nvGrpSpPr>
-        <p:cNvPr id="1" name=""/>
-        <p:cNvGrpSpPr/>
-        <p:nvPr/>
-      </p:nvGrpSpPr>
-      <p:grpSpPr>
-        <a:xfrm>
-          <a:off x="0" y="0"/>
-          <a:ext cx="0" cy="0"/>
-          <a:chOff x="0" y="0"/>
-          <a:chExt cx="0" cy="0"/>
-        </a:xfrm>
-      </p:grpSpPr>
-      <p:sp>
-        <p:nvSpPr>
-          <p:cNvPr id="2" name="Rubrik 1">
-            <a:extLst>
-              <a:ext uri="{FF2B5EF4-FFF2-40B4-BE49-F238E27FC236}">
-                <a16:creationId xmlns:a16="http://schemas.microsoft.com/office/drawing/2014/main" id="{91E43C49-E986-0845-A1CC-D1810C078403}"/>
-              </a:ext>
-            </a:extLst>
-          </p:cNvPr>
-          <p:cNvSpPr>
-            <a:spLocks noGrp="1"/>
-          </p:cNvSpPr>
-          <p:nvPr>
-            <p:ph type="ctrTitle"/>
-          </p:nvPr>
-        </p:nvSpPr>
-        <p:spPr/>
-        <p:txBody>
-          <a:bodyPr/>
-          <a:lstStyle/>
-          <a:p>
-            <a:r>
-              <a:rPr lang="en-GB" dirty="0"/>
-              <a:t>Questions?</a:t>
-            </a:r>
-          </a:p>
-        </p:txBody>
-      </p:sp>
-      <p:sp>
-        <p:nvSpPr>
-          <p:cNvPr id="3" name="Underrubrik 2">
-            <a:extLst>
-              <a:ext uri="{FF2B5EF4-FFF2-40B4-BE49-F238E27FC236}">
-                <a16:creationId xmlns:a16="http://schemas.microsoft.com/office/drawing/2014/main" id="{A9E0F243-4187-4A48-85B7-4390215EB1DA}"/>
-              </a:ext>
-            </a:extLst>
-          </p:cNvPr>
-          <p:cNvSpPr>
-            <a:spLocks noGrp="1"/>
-          </p:cNvSpPr>
-          <p:nvPr>
-            <p:ph type="subTitle" idx="1"/>
-          </p:nvPr>
-        </p:nvSpPr>
-        <p:spPr/>
-        <p:txBody>
-          <a:bodyPr/>
-          <a:lstStyle/>
-          <a:p>
-            <a:r>
-              <a:rPr lang="en-GB" dirty="0"/>
-              <a:t>Please ask questions and take part in discussions trough out the workshop! </a:t>
-            </a:r>
-          </a:p>
-        </p:txBody>
-      </p:sp>
-    </p:spTree>
-    <p:extLst>
-      <p:ext uri="{BB962C8B-B14F-4D97-AF65-F5344CB8AC3E}">
-        <p14:creationId xmlns:p14="http://schemas.microsoft.com/office/powerpoint/2010/main" val="3455965932"/>
       </p:ext>
     </p:extLst>
   </p:cSld>
@@ -2811,55 +2183,6 @@
           <a:chExt cx="0" cy="0"/>
         </a:xfrm>
       </p:grpSpPr>
-      <p:sp>
-        <p:nvSpPr>
-          <p:cNvPr id="6" name="Oval 5">
-            <a:extLst>
-              <a:ext uri="{FF2B5EF4-FFF2-40B4-BE49-F238E27FC236}">
-                <a16:creationId xmlns:a16="http://schemas.microsoft.com/office/drawing/2014/main" id="{6178CD6D-22D4-8D45-823B-CD574C4FE4AB}"/>
-              </a:ext>
-            </a:extLst>
-          </p:cNvPr>
-          <p:cNvSpPr/>
-          <p:nvPr/>
-        </p:nvSpPr>
-        <p:spPr>
-          <a:xfrm>
-            <a:off x="6533150" y="3755832"/>
-            <a:ext cx="2181054" cy="2130615"/>
-          </a:xfrm>
-          <a:prstGeom prst="ellipse">
-            <a:avLst/>
-          </a:prstGeom>
-          <a:ln>
-            <a:noFill/>
-          </a:ln>
-        </p:spPr>
-        <p:style>
-          <a:lnRef idx="2">
-            <a:schemeClr val="accent1">
-              <a:shade val="50000"/>
-            </a:schemeClr>
-          </a:lnRef>
-          <a:fillRef idx="1">
-            <a:schemeClr val="accent1"/>
-          </a:fillRef>
-          <a:effectRef idx="0">
-            <a:schemeClr val="accent1"/>
-          </a:effectRef>
-          <a:fontRef idx="minor">
-            <a:schemeClr val="lt1"/>
-          </a:fontRef>
-        </p:style>
-        <p:txBody>
-          <a:bodyPr rtlCol="0" anchor="ctr"/>
-          <a:lstStyle/>
-          <a:p>
-            <a:pPr algn="ctr"/>
-            <a:endParaRPr lang="en-SE"/>
-          </a:p>
-        </p:txBody>
-      </p:sp>
       <p:sp>
         <p:nvSpPr>
           <p:cNvPr id="3" name="Title 2">
@@ -3043,692 +2366,6 @@
           </a:p>
         </p:txBody>
       </p:sp>
-      <p:grpSp>
-        <p:nvGrpSpPr>
-          <p:cNvPr id="13" name="Group 12">
-            <a:extLst>
-              <a:ext uri="{FF2B5EF4-FFF2-40B4-BE49-F238E27FC236}">
-                <a16:creationId xmlns:a16="http://schemas.microsoft.com/office/drawing/2014/main" id="{C9AEBD1A-3B6F-3E4F-B7CB-EF9A4E876753}"/>
-              </a:ext>
-            </a:extLst>
-          </p:cNvPr>
-          <p:cNvGrpSpPr/>
-          <p:nvPr/>
-        </p:nvGrpSpPr>
-        <p:grpSpPr>
-          <a:xfrm>
-            <a:off x="9136737" y="2005580"/>
-            <a:ext cx="2365951" cy="3860353"/>
-            <a:chOff x="9987288" y="3903061"/>
-            <a:chExt cx="1305593" cy="2321746"/>
-          </a:xfrm>
-        </p:grpSpPr>
-        <p:grpSp>
-          <p:nvGrpSpPr>
-            <p:cNvPr id="21" name="Group 20">
-              <a:extLst>
-                <a:ext uri="{FF2B5EF4-FFF2-40B4-BE49-F238E27FC236}">
-                  <a16:creationId xmlns:a16="http://schemas.microsoft.com/office/drawing/2014/main" id="{B84B3435-59A3-A244-95FF-3219CB3AB22E}"/>
-                </a:ext>
-              </a:extLst>
-            </p:cNvPr>
-            <p:cNvGrpSpPr/>
-            <p:nvPr/>
-          </p:nvGrpSpPr>
-          <p:grpSpPr>
-            <a:xfrm>
-              <a:off x="10226037" y="3903061"/>
-              <a:ext cx="1043614" cy="2321746"/>
-              <a:chOff x="3663675" y="0"/>
-              <a:chExt cx="2957700" cy="6580047"/>
-            </a:xfrm>
-          </p:grpSpPr>
-          <p:pic>
-            <p:nvPicPr>
-              <p:cNvPr id="28" name="Picture 27">
-                <a:extLst>
-                  <a:ext uri="{FF2B5EF4-FFF2-40B4-BE49-F238E27FC236}">
-                    <a16:creationId xmlns:a16="http://schemas.microsoft.com/office/drawing/2014/main" id="{AC0B7AA4-36BF-E241-B0A7-DB062A57500B}"/>
-                  </a:ext>
-                </a:extLst>
-              </p:cNvPr>
-              <p:cNvPicPr>
-                <a:picLocks noChangeAspect="1"/>
-              </p:cNvPicPr>
-              <p:nvPr/>
-            </p:nvPicPr>
-            <p:blipFill rotWithShape="1">
-              <a:blip r:embed="rId4">
-                <a:alphaModFix amt="70000"/>
-                <a:extLst>
-                  <a:ext uri="{28A0092B-C50C-407E-A947-70E740481C1C}">
-                    <a14:useLocalDpi xmlns:a14="http://schemas.microsoft.com/office/drawing/2010/main"/>
-                  </a:ext>
-                </a:extLst>
-              </a:blip>
-              <a:srcRect/>
-              <a:stretch/>
-            </p:blipFill>
-            <p:spPr>
-              <a:xfrm>
-                <a:off x="3663675" y="0"/>
-                <a:ext cx="2957700" cy="6580047"/>
-              </a:xfrm>
-              <a:prstGeom prst="rect">
-                <a:avLst/>
-              </a:prstGeom>
-            </p:spPr>
-          </p:pic>
-          <p:sp>
-            <p:nvSpPr>
-              <p:cNvPr id="29" name="Oval 28">
-                <a:extLst>
-                  <a:ext uri="{FF2B5EF4-FFF2-40B4-BE49-F238E27FC236}">
-                    <a16:creationId xmlns:a16="http://schemas.microsoft.com/office/drawing/2014/main" id="{C1506E3E-3F63-2443-9876-CF98DC9B88E5}"/>
-                  </a:ext>
-                </a:extLst>
-              </p:cNvPr>
-              <p:cNvSpPr/>
-              <p:nvPr/>
-            </p:nvSpPr>
-            <p:spPr>
-              <a:xfrm>
-                <a:off x="4200315" y="6083610"/>
-                <a:ext cx="93945" cy="93945"/>
-              </a:xfrm>
-              <a:prstGeom prst="ellipse">
-                <a:avLst/>
-              </a:prstGeom>
-              <a:ln>
-                <a:solidFill>
-                  <a:schemeClr val="tx1">
-                    <a:lumMod val="65000"/>
-                    <a:lumOff val="35000"/>
-                  </a:schemeClr>
-                </a:solidFill>
-              </a:ln>
-            </p:spPr>
-            <p:style>
-              <a:lnRef idx="2">
-                <a:schemeClr val="accent1">
-                  <a:shade val="50000"/>
-                </a:schemeClr>
-              </a:lnRef>
-              <a:fillRef idx="1">
-                <a:schemeClr val="accent1"/>
-              </a:fillRef>
-              <a:effectRef idx="0">
-                <a:schemeClr val="accent1"/>
-              </a:effectRef>
-              <a:fontRef idx="minor">
-                <a:schemeClr val="lt1"/>
-              </a:fontRef>
-            </p:style>
-            <p:txBody>
-              <a:bodyPr rtlCol="0" anchor="ctr"/>
-              <a:lstStyle/>
-              <a:p>
-                <a:pPr algn="ctr"/>
-                <a:endParaRPr lang="en-GB"/>
-              </a:p>
-            </p:txBody>
-          </p:sp>
-          <p:sp>
-            <p:nvSpPr>
-              <p:cNvPr id="30" name="Oval 29">
-                <a:extLst>
-                  <a:ext uri="{FF2B5EF4-FFF2-40B4-BE49-F238E27FC236}">
-                    <a16:creationId xmlns:a16="http://schemas.microsoft.com/office/drawing/2014/main" id="{521340F0-847D-664E-A589-65522B2AE097}"/>
-                  </a:ext>
-                </a:extLst>
-              </p:cNvPr>
-              <p:cNvSpPr/>
-              <p:nvPr/>
-            </p:nvSpPr>
-            <p:spPr>
-              <a:xfrm>
-                <a:off x="3966709" y="5389468"/>
-                <a:ext cx="93945" cy="93945"/>
-              </a:xfrm>
-              <a:prstGeom prst="ellipse">
-                <a:avLst/>
-              </a:prstGeom>
-              <a:ln>
-                <a:solidFill>
-                  <a:schemeClr val="tx1">
-                    <a:lumMod val="65000"/>
-                    <a:lumOff val="35000"/>
-                  </a:schemeClr>
-                </a:solidFill>
-              </a:ln>
-            </p:spPr>
-            <p:style>
-              <a:lnRef idx="2">
-                <a:schemeClr val="accent1">
-                  <a:shade val="50000"/>
-                </a:schemeClr>
-              </a:lnRef>
-              <a:fillRef idx="1">
-                <a:schemeClr val="accent1"/>
-              </a:fillRef>
-              <a:effectRef idx="0">
-                <a:schemeClr val="accent1"/>
-              </a:effectRef>
-              <a:fontRef idx="minor">
-                <a:schemeClr val="lt1"/>
-              </a:fontRef>
-            </p:style>
-            <p:txBody>
-              <a:bodyPr rtlCol="0" anchor="ctr"/>
-              <a:lstStyle/>
-              <a:p>
-                <a:pPr algn="ctr"/>
-                <a:endParaRPr lang="en-GB"/>
-              </a:p>
-            </p:txBody>
-          </p:sp>
-          <p:sp>
-            <p:nvSpPr>
-              <p:cNvPr id="31" name="Oval 30">
-                <a:extLst>
-                  <a:ext uri="{FF2B5EF4-FFF2-40B4-BE49-F238E27FC236}">
-                    <a16:creationId xmlns:a16="http://schemas.microsoft.com/office/drawing/2014/main" id="{1735CCA0-9A3B-6F4D-8552-BFA84761679C}"/>
-                  </a:ext>
-                </a:extLst>
-              </p:cNvPr>
-              <p:cNvSpPr/>
-              <p:nvPr/>
-            </p:nvSpPr>
-            <p:spPr>
-              <a:xfrm>
-                <a:off x="5068602" y="4575183"/>
-                <a:ext cx="93945" cy="93945"/>
-              </a:xfrm>
-              <a:prstGeom prst="ellipse">
-                <a:avLst/>
-              </a:prstGeom>
-              <a:ln>
-                <a:solidFill>
-                  <a:schemeClr val="tx1">
-                    <a:lumMod val="65000"/>
-                    <a:lumOff val="35000"/>
-                  </a:schemeClr>
-                </a:solidFill>
-              </a:ln>
-            </p:spPr>
-            <p:style>
-              <a:lnRef idx="2">
-                <a:schemeClr val="accent1">
-                  <a:shade val="50000"/>
-                </a:schemeClr>
-              </a:lnRef>
-              <a:fillRef idx="1">
-                <a:schemeClr val="accent1"/>
-              </a:fillRef>
-              <a:effectRef idx="0">
-                <a:schemeClr val="accent1"/>
-              </a:effectRef>
-              <a:fontRef idx="minor">
-                <a:schemeClr val="lt1"/>
-              </a:fontRef>
-            </p:style>
-            <p:txBody>
-              <a:bodyPr rtlCol="0" anchor="ctr"/>
-              <a:lstStyle/>
-              <a:p>
-                <a:pPr algn="ctr"/>
-                <a:endParaRPr lang="en-GB"/>
-              </a:p>
-            </p:txBody>
-          </p:sp>
-          <p:sp>
-            <p:nvSpPr>
-              <p:cNvPr id="32" name="Oval 31">
-                <a:extLst>
-                  <a:ext uri="{FF2B5EF4-FFF2-40B4-BE49-F238E27FC236}">
-                    <a16:creationId xmlns:a16="http://schemas.microsoft.com/office/drawing/2014/main" id="{E8D5FBA8-13EB-7943-92CB-BA048DD43881}"/>
-                  </a:ext>
-                </a:extLst>
-              </p:cNvPr>
-              <p:cNvSpPr/>
-              <p:nvPr/>
-            </p:nvSpPr>
-            <p:spPr>
-              <a:xfrm>
-                <a:off x="5149199" y="4720909"/>
-                <a:ext cx="93945" cy="93945"/>
-              </a:xfrm>
-              <a:prstGeom prst="ellipse">
-                <a:avLst/>
-              </a:prstGeom>
-              <a:ln>
-                <a:solidFill>
-                  <a:schemeClr val="tx1">
-                    <a:lumMod val="65000"/>
-                    <a:lumOff val="35000"/>
-                  </a:schemeClr>
-                </a:solidFill>
-              </a:ln>
-            </p:spPr>
-            <p:style>
-              <a:lnRef idx="2">
-                <a:schemeClr val="accent1">
-                  <a:shade val="50000"/>
-                </a:schemeClr>
-              </a:lnRef>
-              <a:fillRef idx="1">
-                <a:schemeClr val="accent1"/>
-              </a:fillRef>
-              <a:effectRef idx="0">
-                <a:schemeClr val="accent1"/>
-              </a:effectRef>
-              <a:fontRef idx="minor">
-                <a:schemeClr val="lt1"/>
-              </a:fontRef>
-            </p:style>
-            <p:txBody>
-              <a:bodyPr rtlCol="0" anchor="ctr"/>
-              <a:lstStyle/>
-              <a:p>
-                <a:pPr algn="ctr"/>
-                <a:endParaRPr lang="en-GB"/>
-              </a:p>
-            </p:txBody>
-          </p:sp>
-          <p:sp>
-            <p:nvSpPr>
-              <p:cNvPr id="33" name="Oval 32">
-                <a:extLst>
-                  <a:ext uri="{FF2B5EF4-FFF2-40B4-BE49-F238E27FC236}">
-                    <a16:creationId xmlns:a16="http://schemas.microsoft.com/office/drawing/2014/main" id="{0C8172C3-C059-2248-B639-AB85E35C06F4}"/>
-                  </a:ext>
-                </a:extLst>
-              </p:cNvPr>
-              <p:cNvSpPr/>
-              <p:nvPr/>
-            </p:nvSpPr>
-            <p:spPr>
-              <a:xfrm>
-                <a:off x="4693722" y="5061305"/>
-                <a:ext cx="93945" cy="93945"/>
-              </a:xfrm>
-              <a:prstGeom prst="ellipse">
-                <a:avLst/>
-              </a:prstGeom>
-              <a:ln>
-                <a:solidFill>
-                  <a:schemeClr val="tx1">
-                    <a:lumMod val="65000"/>
-                    <a:lumOff val="35000"/>
-                  </a:schemeClr>
-                </a:solidFill>
-              </a:ln>
-            </p:spPr>
-            <p:style>
-              <a:lnRef idx="2">
-                <a:schemeClr val="accent1">
-                  <a:shade val="50000"/>
-                </a:schemeClr>
-              </a:lnRef>
-              <a:fillRef idx="1">
-                <a:schemeClr val="accent1"/>
-              </a:fillRef>
-              <a:effectRef idx="0">
-                <a:schemeClr val="accent1"/>
-              </a:effectRef>
-              <a:fontRef idx="minor">
-                <a:schemeClr val="lt1"/>
-              </a:fontRef>
-            </p:style>
-            <p:txBody>
-              <a:bodyPr rtlCol="0" anchor="ctr"/>
-              <a:lstStyle/>
-              <a:p>
-                <a:pPr algn="ctr"/>
-                <a:endParaRPr lang="en-GB"/>
-              </a:p>
-            </p:txBody>
-          </p:sp>
-          <p:sp>
-            <p:nvSpPr>
-              <p:cNvPr id="34" name="Oval 33">
-                <a:extLst>
-                  <a:ext uri="{FF2B5EF4-FFF2-40B4-BE49-F238E27FC236}">
-                    <a16:creationId xmlns:a16="http://schemas.microsoft.com/office/drawing/2014/main" id="{98A0199B-1D24-5944-A5C5-EBB3432E40A3}"/>
-                  </a:ext>
-                </a:extLst>
-              </p:cNvPr>
-              <p:cNvSpPr/>
-              <p:nvPr/>
-            </p:nvSpPr>
-            <p:spPr>
-              <a:xfrm>
-                <a:off x="5614794" y="2805341"/>
-                <a:ext cx="93945" cy="93945"/>
-              </a:xfrm>
-              <a:prstGeom prst="ellipse">
-                <a:avLst/>
-              </a:prstGeom>
-              <a:ln>
-                <a:solidFill>
-                  <a:schemeClr val="tx1">
-                    <a:lumMod val="65000"/>
-                    <a:lumOff val="35000"/>
-                  </a:schemeClr>
-                </a:solidFill>
-              </a:ln>
-            </p:spPr>
-            <p:style>
-              <a:lnRef idx="2">
-                <a:schemeClr val="accent1">
-                  <a:shade val="50000"/>
-                </a:schemeClr>
-              </a:lnRef>
-              <a:fillRef idx="1">
-                <a:schemeClr val="accent1"/>
-              </a:fillRef>
-              <a:effectRef idx="0">
-                <a:schemeClr val="accent1"/>
-              </a:effectRef>
-              <a:fontRef idx="minor">
-                <a:schemeClr val="lt1"/>
-              </a:fontRef>
-            </p:style>
-            <p:txBody>
-              <a:bodyPr rtlCol="0" anchor="ctr"/>
-              <a:lstStyle/>
-              <a:p>
-                <a:pPr algn="ctr"/>
-                <a:endParaRPr lang="en-GB"/>
-              </a:p>
-            </p:txBody>
-          </p:sp>
-        </p:grpSp>
-        <p:sp>
-          <p:nvSpPr>
-            <p:cNvPr id="22" name="TextBox 21">
-              <a:extLst>
-                <a:ext uri="{FF2B5EF4-FFF2-40B4-BE49-F238E27FC236}">
-                  <a16:creationId xmlns:a16="http://schemas.microsoft.com/office/drawing/2014/main" id="{5A783BE7-C63E-054E-9384-094D32685C2D}"/>
-                </a:ext>
-              </a:extLst>
-            </p:cNvPr>
-            <p:cNvSpPr txBox="1"/>
-            <p:nvPr/>
-          </p:nvSpPr>
-          <p:spPr>
-            <a:xfrm>
-              <a:off x="10901427" y="4831690"/>
-              <a:ext cx="391454" cy="184666"/>
-            </a:xfrm>
-            <a:prstGeom prst="rect">
-              <a:avLst/>
-            </a:prstGeom>
-            <a:noFill/>
-          </p:spPr>
-          <p:txBody>
-            <a:bodyPr wrap="none" rtlCol="0">
-              <a:spAutoFit/>
-            </a:bodyPr>
-            <a:lstStyle/>
-            <a:p>
-              <a:pPr algn="ctr"/>
-              <a:r>
-                <a:rPr lang="en-GB" sz="600" i="1" dirty="0" err="1">
-                  <a:latin typeface="Arial" panose="020B0604020202020204" pitchFamily="34" charset="0"/>
-                  <a:cs typeface="Arial" panose="020B0604020202020204" pitchFamily="34" charset="0"/>
-                </a:rPr>
-                <a:t>Umeå</a:t>
-              </a:r>
-              <a:endParaRPr lang="en-GB" sz="600" i="1" dirty="0">
-                <a:latin typeface="Arial" panose="020B0604020202020204" pitchFamily="34" charset="0"/>
-                <a:cs typeface="Arial" panose="020B0604020202020204" pitchFamily="34" charset="0"/>
-              </a:endParaRPr>
-            </a:p>
-          </p:txBody>
-        </p:sp>
-        <p:sp>
-          <p:nvSpPr>
-            <p:cNvPr id="23" name="TextBox 22">
-              <a:extLst>
-                <a:ext uri="{FF2B5EF4-FFF2-40B4-BE49-F238E27FC236}">
-                  <a16:creationId xmlns:a16="http://schemas.microsoft.com/office/drawing/2014/main" id="{10EC656E-7439-784E-ADB3-861E3CFB2571}"/>
-                </a:ext>
-              </a:extLst>
-            </p:cNvPr>
-            <p:cNvSpPr txBox="1"/>
-            <p:nvPr/>
-          </p:nvSpPr>
-          <p:spPr>
-            <a:xfrm>
-              <a:off x="10713412" y="5543559"/>
-              <a:ext cx="545342" cy="184666"/>
-            </a:xfrm>
-            <a:prstGeom prst="rect">
-              <a:avLst/>
-            </a:prstGeom>
-            <a:noFill/>
-          </p:spPr>
-          <p:txBody>
-            <a:bodyPr wrap="none" rtlCol="0">
-              <a:spAutoFit/>
-            </a:bodyPr>
-            <a:lstStyle/>
-            <a:p>
-              <a:pPr algn="ctr"/>
-              <a:r>
-                <a:rPr lang="en-GB" sz="600" i="1" dirty="0">
-                  <a:latin typeface="Arial" panose="020B0604020202020204" pitchFamily="34" charset="0"/>
-                  <a:cs typeface="Arial" panose="020B0604020202020204" pitchFamily="34" charset="0"/>
-                </a:rPr>
-                <a:t>Stockholm</a:t>
-              </a:r>
-            </a:p>
-          </p:txBody>
-        </p:sp>
-        <p:sp>
-          <p:nvSpPr>
-            <p:cNvPr id="24" name="TextBox 23">
-              <a:extLst>
-                <a:ext uri="{FF2B5EF4-FFF2-40B4-BE49-F238E27FC236}">
-                  <a16:creationId xmlns:a16="http://schemas.microsoft.com/office/drawing/2014/main" id="{7E9B51CB-FF21-444B-982D-5237A4C4CF9F}"/>
-                </a:ext>
-              </a:extLst>
-            </p:cNvPr>
-            <p:cNvSpPr txBox="1"/>
-            <p:nvPr/>
-          </p:nvSpPr>
-          <p:spPr>
-            <a:xfrm>
-              <a:off x="10669218" y="5386702"/>
-              <a:ext cx="470000" cy="184666"/>
-            </a:xfrm>
-            <a:prstGeom prst="rect">
-              <a:avLst/>
-            </a:prstGeom>
-            <a:noFill/>
-          </p:spPr>
-          <p:txBody>
-            <a:bodyPr wrap="none" rtlCol="0">
-              <a:spAutoFit/>
-            </a:bodyPr>
-            <a:lstStyle/>
-            <a:p>
-              <a:pPr algn="ctr"/>
-              <a:r>
-                <a:rPr lang="en-GB" sz="600" i="1" dirty="0">
-                  <a:latin typeface="Arial" panose="020B0604020202020204" pitchFamily="34" charset="0"/>
-                  <a:cs typeface="Arial" panose="020B0604020202020204" pitchFamily="34" charset="0"/>
-                </a:rPr>
-                <a:t>Uppsala</a:t>
-              </a:r>
-            </a:p>
-          </p:txBody>
-        </p:sp>
-        <p:sp>
-          <p:nvSpPr>
-            <p:cNvPr id="25" name="TextBox 24">
-              <a:extLst>
-                <a:ext uri="{FF2B5EF4-FFF2-40B4-BE49-F238E27FC236}">
-                  <a16:creationId xmlns:a16="http://schemas.microsoft.com/office/drawing/2014/main" id="{F2A4D98C-3FD5-E046-996F-92A3C92099BE}"/>
-                </a:ext>
-              </a:extLst>
-            </p:cNvPr>
-            <p:cNvSpPr txBox="1"/>
-            <p:nvPr/>
-          </p:nvSpPr>
-          <p:spPr>
-            <a:xfrm>
-              <a:off x="10545722" y="5649241"/>
-              <a:ext cx="518091" cy="184666"/>
-            </a:xfrm>
-            <a:prstGeom prst="rect">
-              <a:avLst/>
-            </a:prstGeom>
-            <a:noFill/>
-          </p:spPr>
-          <p:txBody>
-            <a:bodyPr wrap="none" rtlCol="0">
-              <a:spAutoFit/>
-            </a:bodyPr>
-            <a:lstStyle/>
-            <a:p>
-              <a:pPr algn="ctr"/>
-              <a:r>
-                <a:rPr lang="en-GB" sz="600" i="1" dirty="0">
-                  <a:latin typeface="Arial" panose="020B0604020202020204" pitchFamily="34" charset="0"/>
-                  <a:cs typeface="Arial" panose="020B0604020202020204" pitchFamily="34" charset="0"/>
-                </a:rPr>
-                <a:t>Linköping</a:t>
-              </a:r>
-            </a:p>
-          </p:txBody>
-        </p:sp>
-        <p:sp>
-          <p:nvSpPr>
-            <p:cNvPr id="26" name="TextBox 25">
-              <a:extLst>
-                <a:ext uri="{FF2B5EF4-FFF2-40B4-BE49-F238E27FC236}">
-                  <a16:creationId xmlns:a16="http://schemas.microsoft.com/office/drawing/2014/main" id="{6B4E993F-0813-5544-B5F5-FC294E95A45A}"/>
-                </a:ext>
-              </a:extLst>
-            </p:cNvPr>
-            <p:cNvSpPr txBox="1"/>
-            <p:nvPr/>
-          </p:nvSpPr>
-          <p:spPr>
-            <a:xfrm>
-              <a:off x="9987288" y="5804683"/>
-              <a:ext cx="506870" cy="184666"/>
-            </a:xfrm>
-            <a:prstGeom prst="rect">
-              <a:avLst/>
-            </a:prstGeom>
-            <a:noFill/>
-          </p:spPr>
-          <p:txBody>
-            <a:bodyPr wrap="none" rtlCol="0">
-              <a:spAutoFit/>
-            </a:bodyPr>
-            <a:lstStyle/>
-            <a:p>
-              <a:pPr algn="ctr"/>
-              <a:r>
-                <a:rPr lang="en-GB" sz="600" i="1" dirty="0" err="1">
-                  <a:latin typeface="Arial" panose="020B0604020202020204" pitchFamily="34" charset="0"/>
-                  <a:cs typeface="Arial" panose="020B0604020202020204" pitchFamily="34" charset="0"/>
-                </a:rPr>
-                <a:t>Göteborg</a:t>
-              </a:r>
-              <a:endParaRPr lang="en-GB" sz="600" i="1" dirty="0">
-                <a:latin typeface="Arial" panose="020B0604020202020204" pitchFamily="34" charset="0"/>
-                <a:cs typeface="Arial" panose="020B0604020202020204" pitchFamily="34" charset="0"/>
-              </a:endParaRPr>
-            </a:p>
-          </p:txBody>
-        </p:sp>
-        <p:sp>
-          <p:nvSpPr>
-            <p:cNvPr id="27" name="TextBox 26">
-              <a:extLst>
-                <a:ext uri="{FF2B5EF4-FFF2-40B4-BE49-F238E27FC236}">
-                  <a16:creationId xmlns:a16="http://schemas.microsoft.com/office/drawing/2014/main" id="{B8FBAEB9-A2E2-C34C-9E9D-B943C50948A9}"/>
-                </a:ext>
-              </a:extLst>
-            </p:cNvPr>
-            <p:cNvSpPr txBox="1"/>
-            <p:nvPr/>
-          </p:nvSpPr>
-          <p:spPr>
-            <a:xfrm>
-              <a:off x="10272653" y="6084398"/>
-              <a:ext cx="197438" cy="111064"/>
-            </a:xfrm>
-            <a:prstGeom prst="rect">
-              <a:avLst/>
-            </a:prstGeom>
-            <a:noFill/>
-          </p:spPr>
-          <p:txBody>
-            <a:bodyPr wrap="none" rtlCol="0">
-              <a:spAutoFit/>
-            </a:bodyPr>
-            <a:lstStyle/>
-            <a:p>
-              <a:pPr algn="ctr"/>
-              <a:r>
-                <a:rPr lang="en-GB" sz="600" i="1" dirty="0">
-                  <a:latin typeface="Arial" panose="020B0604020202020204" pitchFamily="34" charset="0"/>
-                  <a:cs typeface="Arial" panose="020B0604020202020204" pitchFamily="34" charset="0"/>
-                </a:rPr>
-                <a:t>Lund</a:t>
-              </a:r>
-            </a:p>
-          </p:txBody>
-        </p:sp>
-      </p:grpSp>
-      <p:pic>
-        <p:nvPicPr>
-          <p:cNvPr id="36" name="Picture 35" descr="NBIS Staff">
-            <a:extLst>
-              <a:ext uri="{FF2B5EF4-FFF2-40B4-BE49-F238E27FC236}">
-                <a16:creationId xmlns:a16="http://schemas.microsoft.com/office/drawing/2014/main" id="{340A3D75-627C-4F46-8392-95589967FBBD}"/>
-              </a:ext>
-            </a:extLst>
-          </p:cNvPr>
-          <p:cNvPicPr>
-            <a:picLocks noChangeAspect="1"/>
-          </p:cNvPicPr>
-          <p:nvPr/>
-        </p:nvPicPr>
-        <p:blipFill>
-          <a:blip r:embed="rId5" cstate="screen">
-            <a:extLst>
-              <a:ext uri="{28A0092B-C50C-407E-A947-70E740481C1C}">
-                <a14:useLocalDpi xmlns:a14="http://schemas.microsoft.com/office/drawing/2010/main"/>
-              </a:ext>
-            </a:extLst>
-          </a:blip>
-          <a:stretch>
-            <a:fillRect/>
-          </a:stretch>
-        </p:blipFill>
-        <p:spPr>
-          <a:xfrm>
-            <a:off x="5098709" y="1495520"/>
-            <a:ext cx="4532237" cy="2130614"/>
-          </a:xfrm>
-          <a:prstGeom prst="rect">
-            <a:avLst/>
-          </a:prstGeom>
-          <a:ln>
-            <a:noFill/>
-          </a:ln>
-          <a:effectLst>
-            <a:softEdge rad="112500"/>
-          </a:effectLst>
-        </p:spPr>
-      </p:pic>
       <p:sp>
         <p:nvSpPr>
           <p:cNvPr id="37" name="Content Placeholder 1">
@@ -3772,263 +2409,6 @@
           </a:p>
         </p:txBody>
       </p:sp>
-      <p:cxnSp>
-        <p:nvCxnSpPr>
-          <p:cNvPr id="8" name="Straight Connector 7">
-            <a:extLst>
-              <a:ext uri="{FF2B5EF4-FFF2-40B4-BE49-F238E27FC236}">
-                <a16:creationId xmlns:a16="http://schemas.microsoft.com/office/drawing/2014/main" id="{92437C0B-BCAA-B243-9D67-3BB1EE658E85}"/>
-              </a:ext>
-            </a:extLst>
-          </p:cNvPr>
-          <p:cNvCxnSpPr/>
-          <p:nvPr/>
-        </p:nvCxnSpPr>
-        <p:spPr>
-          <a:xfrm flipV="1">
-            <a:off x="8469625" y="3692617"/>
-            <a:ext cx="2308962" cy="679687"/>
-          </a:xfrm>
-          <a:prstGeom prst="line">
-            <a:avLst/>
-          </a:prstGeom>
-          <a:ln w="28575" cap="rnd">
-            <a:prstDash val="sysDot"/>
-            <a:round/>
-            <a:tailEnd type="none"/>
-          </a:ln>
-        </p:spPr>
-        <p:style>
-          <a:lnRef idx="1">
-            <a:schemeClr val="accent1"/>
-          </a:lnRef>
-          <a:fillRef idx="0">
-            <a:schemeClr val="accent1"/>
-          </a:fillRef>
-          <a:effectRef idx="0">
-            <a:schemeClr val="accent1"/>
-          </a:effectRef>
-          <a:fontRef idx="minor">
-            <a:schemeClr val="tx1"/>
-          </a:fontRef>
-        </p:style>
-      </p:cxnSp>
-      <p:cxnSp>
-        <p:nvCxnSpPr>
-          <p:cNvPr id="35" name="Straight Connector 34">
-            <a:extLst>
-              <a:ext uri="{FF2B5EF4-FFF2-40B4-BE49-F238E27FC236}">
-                <a16:creationId xmlns:a16="http://schemas.microsoft.com/office/drawing/2014/main" id="{16F52271-3D90-494A-A4F7-D2635F6E5958}"/>
-              </a:ext>
-            </a:extLst>
-          </p:cNvPr>
-          <p:cNvCxnSpPr>
-            <a:cxnSpLocks/>
-          </p:cNvCxnSpPr>
-          <p:nvPr/>
-        </p:nvCxnSpPr>
-        <p:spPr>
-          <a:xfrm>
-            <a:off x="8549921" y="5247013"/>
-            <a:ext cx="1323746" cy="340285"/>
-          </a:xfrm>
-          <a:prstGeom prst="line">
-            <a:avLst/>
-          </a:prstGeom>
-          <a:ln w="28575" cap="rnd">
-            <a:prstDash val="sysDot"/>
-            <a:round/>
-            <a:headEnd type="none"/>
-            <a:tailEnd type="none"/>
-          </a:ln>
-        </p:spPr>
-        <p:style>
-          <a:lnRef idx="1">
-            <a:schemeClr val="accent1"/>
-          </a:lnRef>
-          <a:fillRef idx="0">
-            <a:schemeClr val="accent1"/>
-          </a:fillRef>
-          <a:effectRef idx="0">
-            <a:schemeClr val="accent1"/>
-          </a:effectRef>
-          <a:fontRef idx="minor">
-            <a:schemeClr val="tx1"/>
-          </a:fontRef>
-        </p:style>
-      </p:cxnSp>
-      <p:cxnSp>
-        <p:nvCxnSpPr>
-          <p:cNvPr id="38" name="Straight Connector 37">
-            <a:extLst>
-              <a:ext uri="{FF2B5EF4-FFF2-40B4-BE49-F238E27FC236}">
-                <a16:creationId xmlns:a16="http://schemas.microsoft.com/office/drawing/2014/main" id="{E6C609C4-EF2B-8C4A-B2D4-3C250F84A120}"/>
-              </a:ext>
-            </a:extLst>
-          </p:cNvPr>
-          <p:cNvCxnSpPr>
-            <a:cxnSpLocks/>
-          </p:cNvCxnSpPr>
-          <p:nvPr/>
-        </p:nvCxnSpPr>
-        <p:spPr>
-          <a:xfrm>
-            <a:off x="8601038" y="4684966"/>
-            <a:ext cx="1837631" cy="22168"/>
-          </a:xfrm>
-          <a:prstGeom prst="line">
-            <a:avLst/>
-          </a:prstGeom>
-          <a:ln w="28575" cap="rnd">
-            <a:prstDash val="sysDot"/>
-            <a:round/>
-            <a:tailEnd type="stealth" w="sm" len="sm"/>
-          </a:ln>
-        </p:spPr>
-        <p:style>
-          <a:lnRef idx="1">
-            <a:schemeClr val="accent1"/>
-          </a:lnRef>
-          <a:fillRef idx="0">
-            <a:schemeClr val="accent1"/>
-          </a:fillRef>
-          <a:effectRef idx="0">
-            <a:schemeClr val="accent1"/>
-          </a:effectRef>
-          <a:fontRef idx="minor">
-            <a:schemeClr val="tx1"/>
-          </a:fontRef>
-        </p:style>
-      </p:cxnSp>
-      <p:cxnSp>
-        <p:nvCxnSpPr>
-          <p:cNvPr id="39" name="Straight Connector 38">
-            <a:extLst>
-              <a:ext uri="{FF2B5EF4-FFF2-40B4-BE49-F238E27FC236}">
-                <a16:creationId xmlns:a16="http://schemas.microsoft.com/office/drawing/2014/main" id="{D75B1EC4-2A3C-854A-AFBC-63D703470F04}"/>
-              </a:ext>
-            </a:extLst>
-          </p:cNvPr>
-          <p:cNvCxnSpPr>
-            <a:cxnSpLocks/>
-          </p:cNvCxnSpPr>
-          <p:nvPr/>
-        </p:nvCxnSpPr>
-        <p:spPr>
-          <a:xfrm>
-            <a:off x="8523095" y="5123031"/>
-            <a:ext cx="1202246" cy="65669"/>
-          </a:xfrm>
-          <a:prstGeom prst="line">
-            <a:avLst/>
-          </a:prstGeom>
-          <a:ln w="28575" cap="rnd">
-            <a:prstDash val="sysDot"/>
-            <a:round/>
-            <a:tailEnd type="none"/>
-          </a:ln>
-        </p:spPr>
-        <p:style>
-          <a:lnRef idx="1">
-            <a:schemeClr val="accent1"/>
-          </a:lnRef>
-          <a:fillRef idx="0">
-            <a:schemeClr val="accent1"/>
-          </a:fillRef>
-          <a:effectRef idx="0">
-            <a:schemeClr val="accent1"/>
-          </a:effectRef>
-          <a:fontRef idx="minor">
-            <a:schemeClr val="tx1"/>
-          </a:fontRef>
-        </p:style>
-      </p:cxnSp>
-      <p:cxnSp>
-        <p:nvCxnSpPr>
-          <p:cNvPr id="40" name="Straight Connector 39">
-            <a:extLst>
-              <a:ext uri="{FF2B5EF4-FFF2-40B4-BE49-F238E27FC236}">
-                <a16:creationId xmlns:a16="http://schemas.microsoft.com/office/drawing/2014/main" id="{60B48166-3BFB-294A-9BFF-C490BFABCB96}"/>
-              </a:ext>
-            </a:extLst>
-          </p:cNvPr>
-          <p:cNvCxnSpPr>
-            <a:cxnSpLocks/>
-          </p:cNvCxnSpPr>
-          <p:nvPr/>
-        </p:nvCxnSpPr>
-        <p:spPr>
-          <a:xfrm>
-            <a:off x="8649567" y="4774724"/>
-            <a:ext cx="1837631" cy="22168"/>
-          </a:xfrm>
-          <a:prstGeom prst="line">
-            <a:avLst/>
-          </a:prstGeom>
-          <a:ln w="28575" cap="rnd">
-            <a:prstDash val="sysDot"/>
-            <a:round/>
-            <a:tailEnd type="none"/>
-          </a:ln>
-        </p:spPr>
-        <p:style>
-          <a:lnRef idx="1">
-            <a:schemeClr val="accent1"/>
-          </a:lnRef>
-          <a:fillRef idx="0">
-            <a:schemeClr val="accent1"/>
-          </a:fillRef>
-          <a:effectRef idx="0">
-            <a:schemeClr val="accent1"/>
-          </a:effectRef>
-          <a:fontRef idx="minor">
-            <a:schemeClr val="tx1"/>
-          </a:fontRef>
-        </p:style>
-      </p:cxnSp>
-      <p:cxnSp>
-        <p:nvCxnSpPr>
-          <p:cNvPr id="41" name="Straight Connector 40">
-            <a:extLst>
-              <a:ext uri="{FF2B5EF4-FFF2-40B4-BE49-F238E27FC236}">
-                <a16:creationId xmlns:a16="http://schemas.microsoft.com/office/drawing/2014/main" id="{AE97E876-6BFF-CF4E-80FB-8291F131BAB3}"/>
-              </a:ext>
-            </a:extLst>
-          </p:cNvPr>
-          <p:cNvCxnSpPr>
-            <a:cxnSpLocks/>
-          </p:cNvCxnSpPr>
-          <p:nvPr/>
-        </p:nvCxnSpPr>
-        <p:spPr>
-          <a:xfrm>
-            <a:off x="8581451" y="4935079"/>
-            <a:ext cx="1607136" cy="57763"/>
-          </a:xfrm>
-          <a:prstGeom prst="line">
-            <a:avLst/>
-          </a:prstGeom>
-          <a:ln w="28575" cap="rnd">
-            <a:prstDash val="sysDot"/>
-            <a:round/>
-            <a:tailEnd type="none"/>
-          </a:ln>
-        </p:spPr>
-        <p:style>
-          <a:lnRef idx="1">
-            <a:schemeClr val="accent1"/>
-          </a:lnRef>
-          <a:fillRef idx="0">
-            <a:schemeClr val="accent1"/>
-          </a:fillRef>
-          <a:effectRef idx="0">
-            <a:schemeClr val="accent1"/>
-          </a:effectRef>
-          <a:fontRef idx="minor">
-            <a:schemeClr val="tx1"/>
-          </a:fontRef>
-        </p:style>
-      </p:cxnSp>
       <p:sp>
         <p:nvSpPr>
           <p:cNvPr id="42" name="Rectangle 10">
@@ -4151,10 +2531,10 @@
           <p:nvPr/>
         </p:nvPicPr>
         <p:blipFill>
-          <a:blip r:embed="rId6">
+          <a:blip r:embed="rId4">
             <a:extLst>
               <a:ext uri="{96DAC541-7B7A-43D3-8B79-37D633B846F1}">
-                <asvg:svgBlip xmlns:asvg="http://schemas.microsoft.com/office/drawing/2016/SVG/main" r:embed="rId7"/>
+                <asvg:svgBlip xmlns:asvg="http://schemas.microsoft.com/office/drawing/2016/SVG/main" r:embed="rId5"/>
               </a:ext>
             </a:extLst>
           </a:blip>
@@ -4172,6 +2552,1331 @@
           </a:prstGeom>
         </p:spPr>
       </p:pic>
+      <p:pic>
+        <p:nvPicPr>
+          <p:cNvPr id="2" name="Google Shape;32;p2">
+            <a:extLst>
+              <a:ext uri="{FF2B5EF4-FFF2-40B4-BE49-F238E27FC236}">
+                <a16:creationId xmlns:a16="http://schemas.microsoft.com/office/drawing/2014/main" id="{0FEF334C-98DD-BB22-5B18-D039F5DB5E26}"/>
+              </a:ext>
+            </a:extLst>
+          </p:cNvPr>
+          <p:cNvPicPr preferRelativeResize="0"/>
+          <p:nvPr/>
+        </p:nvPicPr>
+        <p:blipFill rotWithShape="1">
+          <a:blip r:embed="rId6">
+            <a:alphaModFix/>
+          </a:blip>
+          <a:srcRect/>
+          <a:stretch/>
+        </p:blipFill>
+        <p:spPr>
+          <a:xfrm>
+            <a:off x="4673117" y="1530902"/>
+            <a:ext cx="4311705" cy="2573230"/>
+          </a:xfrm>
+          <a:prstGeom prst="rect">
+            <a:avLst/>
+          </a:prstGeom>
+          <a:noFill/>
+          <a:ln>
+            <a:noFill/>
+          </a:ln>
+        </p:spPr>
+      </p:pic>
+      <p:pic>
+        <p:nvPicPr>
+          <p:cNvPr id="9" name="Google Shape;33;p2" descr="A group of people standing outside a building&#10;&#10;Description automatically generated with medium confidence">
+            <a:extLst>
+              <a:ext uri="{FF2B5EF4-FFF2-40B4-BE49-F238E27FC236}">
+                <a16:creationId xmlns:a16="http://schemas.microsoft.com/office/drawing/2014/main" id="{864D5F65-A3AA-31FC-2651-53C12D0A2049}"/>
+              </a:ext>
+            </a:extLst>
+          </p:cNvPr>
+          <p:cNvPicPr preferRelativeResize="0"/>
+          <p:nvPr/>
+        </p:nvPicPr>
+        <p:blipFill rotWithShape="1">
+          <a:blip r:embed="rId7">
+            <a:alphaModFix/>
+          </a:blip>
+          <a:srcRect/>
+          <a:stretch/>
+        </p:blipFill>
+        <p:spPr>
+          <a:xfrm>
+            <a:off x="1" y="-3043596"/>
+            <a:ext cx="6173300" cy="2632268"/>
+          </a:xfrm>
+          <a:prstGeom prst="rect">
+            <a:avLst/>
+          </a:prstGeom>
+          <a:noFill/>
+          <a:ln>
+            <a:noFill/>
+          </a:ln>
+        </p:spPr>
+      </p:pic>
+      <p:sp>
+        <p:nvSpPr>
+          <p:cNvPr id="10" name="Google Shape;34;p2">
+            <a:extLst>
+              <a:ext uri="{FF2B5EF4-FFF2-40B4-BE49-F238E27FC236}">
+                <a16:creationId xmlns:a16="http://schemas.microsoft.com/office/drawing/2014/main" id="{7AAD85EA-730D-FC64-787A-44CFAF64E985}"/>
+              </a:ext>
+            </a:extLst>
+          </p:cNvPr>
+          <p:cNvSpPr/>
+          <p:nvPr/>
+        </p:nvSpPr>
+        <p:spPr>
+          <a:xfrm>
+            <a:off x="6533151" y="3769687"/>
+            <a:ext cx="2181053" cy="2130615"/>
+          </a:xfrm>
+          <a:prstGeom prst="ellipse">
+            <a:avLst/>
+          </a:prstGeom>
+          <a:solidFill>
+            <a:schemeClr val="accent1"/>
+          </a:solidFill>
+          <a:ln>
+            <a:noFill/>
+          </a:ln>
+        </p:spPr>
+        <p:txBody>
+          <a:bodyPr spcFirstLastPara="1" wrap="square" lIns="91433" tIns="45700" rIns="91433" bIns="45700" anchor="ctr" anchorCtr="0">
+            <a:noAutofit/>
+          </a:bodyPr>
+          <a:lstStyle/>
+          <a:p>
+            <a:pPr algn="ctr">
+              <a:buClr>
+                <a:srgbClr val="000000"/>
+              </a:buClr>
+              <a:buSzPts val="1400"/>
+            </a:pPr>
+            <a:endParaRPr sz="1867">
+              <a:solidFill>
+                <a:schemeClr val="lt1"/>
+              </a:solidFill>
+              <a:latin typeface="Calibri"/>
+              <a:ea typeface="Calibri"/>
+              <a:cs typeface="Calibri"/>
+              <a:sym typeface="Calibri"/>
+            </a:endParaRPr>
+          </a:p>
+        </p:txBody>
+      </p:sp>
+      <p:grpSp>
+        <p:nvGrpSpPr>
+          <p:cNvPr id="15" name="Google Shape;36;p2">
+            <a:extLst>
+              <a:ext uri="{FF2B5EF4-FFF2-40B4-BE49-F238E27FC236}">
+                <a16:creationId xmlns:a16="http://schemas.microsoft.com/office/drawing/2014/main" id="{49F82F9E-F989-90DE-4988-20A7C41F232B}"/>
+              </a:ext>
+            </a:extLst>
+          </p:cNvPr>
+          <p:cNvGrpSpPr/>
+          <p:nvPr/>
+        </p:nvGrpSpPr>
+        <p:grpSpPr>
+          <a:xfrm>
+            <a:off x="9218875" y="2005581"/>
+            <a:ext cx="2241712" cy="3860353"/>
+            <a:chOff x="10032616" y="3903061"/>
+            <a:chExt cx="1237035" cy="2321746"/>
+          </a:xfrm>
+        </p:grpSpPr>
+        <p:grpSp>
+          <p:nvGrpSpPr>
+            <p:cNvPr id="16" name="Google Shape;37;p2">
+              <a:extLst>
+                <a:ext uri="{FF2B5EF4-FFF2-40B4-BE49-F238E27FC236}">
+                  <a16:creationId xmlns:a16="http://schemas.microsoft.com/office/drawing/2014/main" id="{BD568171-37CC-94E6-3C6B-CE14EFA73B28}"/>
+                </a:ext>
+              </a:extLst>
+            </p:cNvPr>
+            <p:cNvGrpSpPr/>
+            <p:nvPr/>
+          </p:nvGrpSpPr>
+          <p:grpSpPr>
+            <a:xfrm>
+              <a:off x="10226037" y="3903061"/>
+              <a:ext cx="1043614" cy="2321746"/>
+              <a:chOff x="3663675" y="-2"/>
+              <a:chExt cx="2957700" cy="6580047"/>
+            </a:xfrm>
+          </p:grpSpPr>
+          <p:pic>
+            <p:nvPicPr>
+              <p:cNvPr id="45" name="Google Shape;38;p2">
+                <a:extLst>
+                  <a:ext uri="{FF2B5EF4-FFF2-40B4-BE49-F238E27FC236}">
+                    <a16:creationId xmlns:a16="http://schemas.microsoft.com/office/drawing/2014/main" id="{970E88E9-0A34-8E33-D502-07539FA03917}"/>
+                  </a:ext>
+                </a:extLst>
+              </p:cNvPr>
+              <p:cNvPicPr preferRelativeResize="0"/>
+              <p:nvPr/>
+            </p:nvPicPr>
+            <p:blipFill rotWithShape="1">
+              <a:blip r:embed="rId8">
+                <a:alphaModFix amt="70000"/>
+              </a:blip>
+              <a:srcRect l="33353" r="32933"/>
+              <a:stretch/>
+            </p:blipFill>
+            <p:spPr>
+              <a:xfrm>
+                <a:off x="3663675" y="-2"/>
+                <a:ext cx="2957700" cy="6580047"/>
+              </a:xfrm>
+              <a:prstGeom prst="rect">
+                <a:avLst/>
+              </a:prstGeom>
+              <a:noFill/>
+              <a:ln>
+                <a:noFill/>
+              </a:ln>
+            </p:spPr>
+          </p:pic>
+          <p:sp>
+            <p:nvSpPr>
+              <p:cNvPr id="46" name="Google Shape;39;p2">
+                <a:extLst>
+                  <a:ext uri="{FF2B5EF4-FFF2-40B4-BE49-F238E27FC236}">
+                    <a16:creationId xmlns:a16="http://schemas.microsoft.com/office/drawing/2014/main" id="{F4E8BEEC-DDD0-DDBE-4397-03BAC2747F74}"/>
+                  </a:ext>
+                </a:extLst>
+              </p:cNvPr>
+              <p:cNvSpPr/>
+              <p:nvPr/>
+            </p:nvSpPr>
+            <p:spPr>
+              <a:xfrm>
+                <a:off x="4200315" y="6083610"/>
+                <a:ext cx="93945" cy="93945"/>
+              </a:xfrm>
+              <a:prstGeom prst="ellipse">
+                <a:avLst/>
+              </a:prstGeom>
+              <a:solidFill>
+                <a:schemeClr val="accent1"/>
+              </a:solidFill>
+              <a:ln w="12700" cap="flat" cmpd="sng">
+                <a:solidFill>
+                  <a:srgbClr val="595959"/>
+                </a:solidFill>
+                <a:prstDash val="solid"/>
+                <a:miter lim="800000"/>
+                <a:headEnd type="none" w="sm" len="sm"/>
+                <a:tailEnd type="none" w="sm" len="sm"/>
+              </a:ln>
+            </p:spPr>
+            <p:txBody>
+              <a:bodyPr spcFirstLastPara="1" wrap="square" lIns="91433" tIns="45700" rIns="91433" bIns="45700" anchor="ctr" anchorCtr="0">
+                <a:noAutofit/>
+              </a:bodyPr>
+              <a:lstStyle/>
+              <a:p>
+                <a:pPr algn="ctr">
+                  <a:buClr>
+                    <a:srgbClr val="000000"/>
+                  </a:buClr>
+                  <a:buSzPts val="1400"/>
+                </a:pPr>
+                <a:endParaRPr sz="1867">
+                  <a:solidFill>
+                    <a:schemeClr val="lt1"/>
+                  </a:solidFill>
+                  <a:latin typeface="Calibri"/>
+                  <a:ea typeface="Calibri"/>
+                  <a:cs typeface="Calibri"/>
+                  <a:sym typeface="Calibri"/>
+                </a:endParaRPr>
+              </a:p>
+            </p:txBody>
+          </p:sp>
+          <p:sp>
+            <p:nvSpPr>
+              <p:cNvPr id="47" name="Google Shape;40;p2">
+                <a:extLst>
+                  <a:ext uri="{FF2B5EF4-FFF2-40B4-BE49-F238E27FC236}">
+                    <a16:creationId xmlns:a16="http://schemas.microsoft.com/office/drawing/2014/main" id="{37964A05-93D3-E8B3-26F4-96A9869C68CF}"/>
+                  </a:ext>
+                </a:extLst>
+              </p:cNvPr>
+              <p:cNvSpPr/>
+              <p:nvPr/>
+            </p:nvSpPr>
+            <p:spPr>
+              <a:xfrm>
+                <a:off x="3966709" y="5389468"/>
+                <a:ext cx="93945" cy="93945"/>
+              </a:xfrm>
+              <a:prstGeom prst="ellipse">
+                <a:avLst/>
+              </a:prstGeom>
+              <a:solidFill>
+                <a:schemeClr val="accent1"/>
+              </a:solidFill>
+              <a:ln w="12700" cap="flat" cmpd="sng">
+                <a:solidFill>
+                  <a:srgbClr val="595959"/>
+                </a:solidFill>
+                <a:prstDash val="solid"/>
+                <a:miter lim="800000"/>
+                <a:headEnd type="none" w="sm" len="sm"/>
+                <a:tailEnd type="none" w="sm" len="sm"/>
+              </a:ln>
+            </p:spPr>
+            <p:txBody>
+              <a:bodyPr spcFirstLastPara="1" wrap="square" lIns="91433" tIns="45700" rIns="91433" bIns="45700" anchor="ctr" anchorCtr="0">
+                <a:noAutofit/>
+              </a:bodyPr>
+              <a:lstStyle/>
+              <a:p>
+                <a:pPr algn="ctr">
+                  <a:buClr>
+                    <a:srgbClr val="000000"/>
+                  </a:buClr>
+                  <a:buSzPts val="1400"/>
+                </a:pPr>
+                <a:endParaRPr sz="1867">
+                  <a:solidFill>
+                    <a:schemeClr val="lt1"/>
+                  </a:solidFill>
+                  <a:latin typeface="Calibri"/>
+                  <a:ea typeface="Calibri"/>
+                  <a:cs typeface="Calibri"/>
+                  <a:sym typeface="Calibri"/>
+                </a:endParaRPr>
+              </a:p>
+            </p:txBody>
+          </p:sp>
+          <p:sp>
+            <p:nvSpPr>
+              <p:cNvPr id="48" name="Google Shape;41;p2">
+                <a:extLst>
+                  <a:ext uri="{FF2B5EF4-FFF2-40B4-BE49-F238E27FC236}">
+                    <a16:creationId xmlns:a16="http://schemas.microsoft.com/office/drawing/2014/main" id="{5FE75C28-565E-9CAE-937E-506D161C608E}"/>
+                  </a:ext>
+                </a:extLst>
+              </p:cNvPr>
+              <p:cNvSpPr/>
+              <p:nvPr/>
+            </p:nvSpPr>
+            <p:spPr>
+              <a:xfrm>
+                <a:off x="5068602" y="4575183"/>
+                <a:ext cx="93945" cy="93945"/>
+              </a:xfrm>
+              <a:prstGeom prst="ellipse">
+                <a:avLst/>
+              </a:prstGeom>
+              <a:solidFill>
+                <a:schemeClr val="accent1"/>
+              </a:solidFill>
+              <a:ln w="12700" cap="flat" cmpd="sng">
+                <a:solidFill>
+                  <a:srgbClr val="595959"/>
+                </a:solidFill>
+                <a:prstDash val="solid"/>
+                <a:miter lim="800000"/>
+                <a:headEnd type="none" w="sm" len="sm"/>
+                <a:tailEnd type="none" w="sm" len="sm"/>
+              </a:ln>
+            </p:spPr>
+            <p:txBody>
+              <a:bodyPr spcFirstLastPara="1" wrap="square" lIns="91433" tIns="45700" rIns="91433" bIns="45700" anchor="ctr" anchorCtr="0">
+                <a:noAutofit/>
+              </a:bodyPr>
+              <a:lstStyle/>
+              <a:p>
+                <a:pPr algn="ctr">
+                  <a:buClr>
+                    <a:srgbClr val="000000"/>
+                  </a:buClr>
+                  <a:buSzPts val="1400"/>
+                </a:pPr>
+                <a:endParaRPr sz="1867">
+                  <a:solidFill>
+                    <a:schemeClr val="lt1"/>
+                  </a:solidFill>
+                  <a:latin typeface="Calibri"/>
+                  <a:ea typeface="Calibri"/>
+                  <a:cs typeface="Calibri"/>
+                  <a:sym typeface="Calibri"/>
+                </a:endParaRPr>
+              </a:p>
+            </p:txBody>
+          </p:sp>
+          <p:sp>
+            <p:nvSpPr>
+              <p:cNvPr id="49" name="Google Shape;42;p2">
+                <a:extLst>
+                  <a:ext uri="{FF2B5EF4-FFF2-40B4-BE49-F238E27FC236}">
+                    <a16:creationId xmlns:a16="http://schemas.microsoft.com/office/drawing/2014/main" id="{A0E6389F-0A47-BCAD-5198-4614E466853F}"/>
+                  </a:ext>
+                </a:extLst>
+              </p:cNvPr>
+              <p:cNvSpPr/>
+              <p:nvPr/>
+            </p:nvSpPr>
+            <p:spPr>
+              <a:xfrm>
+                <a:off x="5149199" y="4720909"/>
+                <a:ext cx="93945" cy="93945"/>
+              </a:xfrm>
+              <a:prstGeom prst="ellipse">
+                <a:avLst/>
+              </a:prstGeom>
+              <a:solidFill>
+                <a:schemeClr val="accent1"/>
+              </a:solidFill>
+              <a:ln w="12700" cap="flat" cmpd="sng">
+                <a:solidFill>
+                  <a:srgbClr val="595959"/>
+                </a:solidFill>
+                <a:prstDash val="solid"/>
+                <a:miter lim="800000"/>
+                <a:headEnd type="none" w="sm" len="sm"/>
+                <a:tailEnd type="none" w="sm" len="sm"/>
+              </a:ln>
+            </p:spPr>
+            <p:txBody>
+              <a:bodyPr spcFirstLastPara="1" wrap="square" lIns="91433" tIns="45700" rIns="91433" bIns="45700" anchor="ctr" anchorCtr="0">
+                <a:noAutofit/>
+              </a:bodyPr>
+              <a:lstStyle/>
+              <a:p>
+                <a:pPr algn="ctr">
+                  <a:buClr>
+                    <a:srgbClr val="000000"/>
+                  </a:buClr>
+                  <a:buSzPts val="1400"/>
+                </a:pPr>
+                <a:endParaRPr sz="1867">
+                  <a:solidFill>
+                    <a:schemeClr val="lt1"/>
+                  </a:solidFill>
+                  <a:latin typeface="Calibri"/>
+                  <a:ea typeface="Calibri"/>
+                  <a:cs typeface="Calibri"/>
+                  <a:sym typeface="Calibri"/>
+                </a:endParaRPr>
+              </a:p>
+            </p:txBody>
+          </p:sp>
+          <p:sp>
+            <p:nvSpPr>
+              <p:cNvPr id="50" name="Google Shape;43;p2">
+                <a:extLst>
+                  <a:ext uri="{FF2B5EF4-FFF2-40B4-BE49-F238E27FC236}">
+                    <a16:creationId xmlns:a16="http://schemas.microsoft.com/office/drawing/2014/main" id="{E4901BDA-32FB-DBD7-1F1C-BFE524D3E754}"/>
+                  </a:ext>
+                </a:extLst>
+              </p:cNvPr>
+              <p:cNvSpPr/>
+              <p:nvPr/>
+            </p:nvSpPr>
+            <p:spPr>
+              <a:xfrm>
+                <a:off x="4693722" y="5061305"/>
+                <a:ext cx="93945" cy="93945"/>
+              </a:xfrm>
+              <a:prstGeom prst="ellipse">
+                <a:avLst/>
+              </a:prstGeom>
+              <a:solidFill>
+                <a:schemeClr val="accent1"/>
+              </a:solidFill>
+              <a:ln w="12700" cap="flat" cmpd="sng">
+                <a:solidFill>
+                  <a:srgbClr val="595959"/>
+                </a:solidFill>
+                <a:prstDash val="solid"/>
+                <a:miter lim="800000"/>
+                <a:headEnd type="none" w="sm" len="sm"/>
+                <a:tailEnd type="none" w="sm" len="sm"/>
+              </a:ln>
+            </p:spPr>
+            <p:txBody>
+              <a:bodyPr spcFirstLastPara="1" wrap="square" lIns="91433" tIns="45700" rIns="91433" bIns="45700" anchor="ctr" anchorCtr="0">
+                <a:noAutofit/>
+              </a:bodyPr>
+              <a:lstStyle/>
+              <a:p>
+                <a:pPr algn="ctr">
+                  <a:buClr>
+                    <a:srgbClr val="000000"/>
+                  </a:buClr>
+                  <a:buSzPts val="1400"/>
+                </a:pPr>
+                <a:endParaRPr sz="1867">
+                  <a:solidFill>
+                    <a:schemeClr val="lt1"/>
+                  </a:solidFill>
+                  <a:latin typeface="Calibri"/>
+                  <a:ea typeface="Calibri"/>
+                  <a:cs typeface="Calibri"/>
+                  <a:sym typeface="Calibri"/>
+                </a:endParaRPr>
+              </a:p>
+            </p:txBody>
+          </p:sp>
+          <p:sp>
+            <p:nvSpPr>
+              <p:cNvPr id="51" name="Google Shape;44;p2">
+                <a:extLst>
+                  <a:ext uri="{FF2B5EF4-FFF2-40B4-BE49-F238E27FC236}">
+                    <a16:creationId xmlns:a16="http://schemas.microsoft.com/office/drawing/2014/main" id="{D0EC715F-E380-F559-0C1B-150FB13BB44C}"/>
+                  </a:ext>
+                </a:extLst>
+              </p:cNvPr>
+              <p:cNvSpPr/>
+              <p:nvPr/>
+            </p:nvSpPr>
+            <p:spPr>
+              <a:xfrm>
+                <a:off x="5614794" y="2805341"/>
+                <a:ext cx="93945" cy="93945"/>
+              </a:xfrm>
+              <a:prstGeom prst="ellipse">
+                <a:avLst/>
+              </a:prstGeom>
+              <a:solidFill>
+                <a:schemeClr val="accent1"/>
+              </a:solidFill>
+              <a:ln w="12700" cap="flat" cmpd="sng">
+                <a:solidFill>
+                  <a:srgbClr val="595959"/>
+                </a:solidFill>
+                <a:prstDash val="solid"/>
+                <a:miter lim="800000"/>
+                <a:headEnd type="none" w="sm" len="sm"/>
+                <a:tailEnd type="none" w="sm" len="sm"/>
+              </a:ln>
+            </p:spPr>
+            <p:txBody>
+              <a:bodyPr spcFirstLastPara="1" wrap="square" lIns="91433" tIns="45700" rIns="91433" bIns="45700" anchor="ctr" anchorCtr="0">
+                <a:noAutofit/>
+              </a:bodyPr>
+              <a:lstStyle/>
+              <a:p>
+                <a:pPr algn="ctr">
+                  <a:buClr>
+                    <a:srgbClr val="000000"/>
+                  </a:buClr>
+                  <a:buSzPts val="1400"/>
+                </a:pPr>
+                <a:endParaRPr sz="1867">
+                  <a:solidFill>
+                    <a:schemeClr val="lt1"/>
+                  </a:solidFill>
+                  <a:latin typeface="Calibri"/>
+                  <a:ea typeface="Calibri"/>
+                  <a:cs typeface="Calibri"/>
+                  <a:sym typeface="Calibri"/>
+                </a:endParaRPr>
+              </a:p>
+            </p:txBody>
+          </p:sp>
+        </p:grpSp>
+        <p:sp>
+          <p:nvSpPr>
+            <p:cNvPr id="17" name="Google Shape;45;p2">
+              <a:extLst>
+                <a:ext uri="{FF2B5EF4-FFF2-40B4-BE49-F238E27FC236}">
+                  <a16:creationId xmlns:a16="http://schemas.microsoft.com/office/drawing/2014/main" id="{70A6D8FB-60CD-33C7-BF28-3C8BA576BD77}"/>
+                </a:ext>
+              </a:extLst>
+            </p:cNvPr>
+            <p:cNvSpPr txBox="1"/>
+            <p:nvPr/>
+          </p:nvSpPr>
+          <p:spPr>
+            <a:xfrm>
+              <a:off x="10901429" y="4831690"/>
+              <a:ext cx="280852" cy="117249"/>
+            </a:xfrm>
+            <a:prstGeom prst="rect">
+              <a:avLst/>
+            </a:prstGeom>
+            <a:noFill/>
+            <a:ln>
+              <a:noFill/>
+            </a:ln>
+          </p:spPr>
+          <p:txBody>
+            <a:bodyPr spcFirstLastPara="1" wrap="square" lIns="91433" tIns="45700" rIns="91433" bIns="45700" anchor="t" anchorCtr="0">
+              <a:spAutoFit/>
+            </a:bodyPr>
+            <a:lstStyle/>
+            <a:p>
+              <a:pPr algn="ctr">
+                <a:buClr>
+                  <a:srgbClr val="000000"/>
+                </a:buClr>
+                <a:buSzPts val="500"/>
+              </a:pPr>
+              <a:r>
+                <a:rPr lang="en" sz="667" i="1">
+                  <a:solidFill>
+                    <a:schemeClr val="dk1"/>
+                  </a:solidFill>
+                  <a:latin typeface="Arial"/>
+                  <a:ea typeface="Arial"/>
+                  <a:cs typeface="Arial"/>
+                  <a:sym typeface="Arial"/>
+                </a:rPr>
+                <a:t>Umeå</a:t>
+              </a:r>
+              <a:endParaRPr sz="667" i="1">
+                <a:solidFill>
+                  <a:schemeClr val="dk1"/>
+                </a:solidFill>
+                <a:latin typeface="Arial"/>
+                <a:ea typeface="Arial"/>
+                <a:cs typeface="Arial"/>
+                <a:sym typeface="Arial"/>
+              </a:endParaRPr>
+            </a:p>
+          </p:txBody>
+        </p:sp>
+        <p:sp>
+          <p:nvSpPr>
+            <p:cNvPr id="18" name="Google Shape;46;p2">
+              <a:extLst>
+                <a:ext uri="{FF2B5EF4-FFF2-40B4-BE49-F238E27FC236}">
+                  <a16:creationId xmlns:a16="http://schemas.microsoft.com/office/drawing/2014/main" id="{7248CDB4-2AB3-9A85-07DD-C471096ADF39}"/>
+                </a:ext>
+              </a:extLst>
+            </p:cNvPr>
+            <p:cNvSpPr txBox="1"/>
+            <p:nvPr/>
+          </p:nvSpPr>
+          <p:spPr>
+            <a:xfrm>
+              <a:off x="10727667" y="5547385"/>
+              <a:ext cx="373630" cy="117249"/>
+            </a:xfrm>
+            <a:prstGeom prst="rect">
+              <a:avLst/>
+            </a:prstGeom>
+            <a:noFill/>
+            <a:ln>
+              <a:noFill/>
+            </a:ln>
+          </p:spPr>
+          <p:txBody>
+            <a:bodyPr spcFirstLastPara="1" wrap="square" lIns="91433" tIns="45700" rIns="91433" bIns="45700" anchor="t" anchorCtr="0">
+              <a:spAutoFit/>
+            </a:bodyPr>
+            <a:lstStyle/>
+            <a:p>
+              <a:pPr algn="ctr">
+                <a:buClr>
+                  <a:srgbClr val="000000"/>
+                </a:buClr>
+                <a:buSzPts val="500"/>
+              </a:pPr>
+              <a:r>
+                <a:rPr lang="en" sz="667" i="1">
+                  <a:solidFill>
+                    <a:schemeClr val="dk1"/>
+                  </a:solidFill>
+                  <a:latin typeface="Arial"/>
+                  <a:ea typeface="Arial"/>
+                  <a:cs typeface="Arial"/>
+                  <a:sym typeface="Arial"/>
+                </a:rPr>
+                <a:t>Stockholm</a:t>
+              </a:r>
+              <a:endParaRPr sz="1467">
+                <a:solidFill>
+                  <a:srgbClr val="000000"/>
+                </a:solidFill>
+                <a:latin typeface="Arial"/>
+                <a:ea typeface="Arial"/>
+                <a:cs typeface="Arial"/>
+                <a:sym typeface="Arial"/>
+              </a:endParaRPr>
+            </a:p>
+          </p:txBody>
+        </p:sp>
+        <p:sp>
+          <p:nvSpPr>
+            <p:cNvPr id="19" name="Google Shape;47;p2">
+              <a:extLst>
+                <a:ext uri="{FF2B5EF4-FFF2-40B4-BE49-F238E27FC236}">
+                  <a16:creationId xmlns:a16="http://schemas.microsoft.com/office/drawing/2014/main" id="{426270D1-31A1-B2D5-2F04-27E2C5405B49}"/>
+                </a:ext>
+              </a:extLst>
+            </p:cNvPr>
+            <p:cNvSpPr txBox="1"/>
+            <p:nvPr/>
+          </p:nvSpPr>
+          <p:spPr>
+            <a:xfrm>
+              <a:off x="10763039" y="5386702"/>
+              <a:ext cx="282358" cy="117249"/>
+            </a:xfrm>
+            <a:prstGeom prst="rect">
+              <a:avLst/>
+            </a:prstGeom>
+            <a:noFill/>
+            <a:ln>
+              <a:noFill/>
+            </a:ln>
+          </p:spPr>
+          <p:txBody>
+            <a:bodyPr spcFirstLastPara="1" wrap="square" lIns="91433" tIns="45700" rIns="91433" bIns="45700" anchor="t" anchorCtr="0">
+              <a:spAutoFit/>
+            </a:bodyPr>
+            <a:lstStyle/>
+            <a:p>
+              <a:pPr algn="ctr">
+                <a:buClr>
+                  <a:srgbClr val="000000"/>
+                </a:buClr>
+                <a:buSzPts val="500"/>
+              </a:pPr>
+              <a:r>
+                <a:rPr lang="en" sz="667" i="1">
+                  <a:solidFill>
+                    <a:schemeClr val="dk1"/>
+                  </a:solidFill>
+                  <a:latin typeface="Arial"/>
+                  <a:ea typeface="Arial"/>
+                  <a:cs typeface="Arial"/>
+                  <a:sym typeface="Arial"/>
+                </a:rPr>
+                <a:t>Uppsala</a:t>
+              </a:r>
+              <a:endParaRPr sz="1467">
+                <a:solidFill>
+                  <a:srgbClr val="000000"/>
+                </a:solidFill>
+                <a:latin typeface="Arial"/>
+                <a:ea typeface="Arial"/>
+                <a:cs typeface="Arial"/>
+                <a:sym typeface="Arial"/>
+              </a:endParaRPr>
+            </a:p>
+          </p:txBody>
+        </p:sp>
+        <p:sp>
+          <p:nvSpPr>
+            <p:cNvPr id="20" name="Google Shape;48;p2">
+              <a:extLst>
+                <a:ext uri="{FF2B5EF4-FFF2-40B4-BE49-F238E27FC236}">
+                  <a16:creationId xmlns:a16="http://schemas.microsoft.com/office/drawing/2014/main" id="{3AB97C13-823D-0737-A30B-51E8038BAF72}"/>
+                </a:ext>
+              </a:extLst>
+            </p:cNvPr>
+            <p:cNvSpPr txBox="1"/>
+            <p:nvPr/>
+          </p:nvSpPr>
+          <p:spPr>
+            <a:xfrm>
+              <a:off x="10648551" y="5649241"/>
+              <a:ext cx="312433" cy="117249"/>
+            </a:xfrm>
+            <a:prstGeom prst="rect">
+              <a:avLst/>
+            </a:prstGeom>
+            <a:noFill/>
+            <a:ln>
+              <a:noFill/>
+            </a:ln>
+          </p:spPr>
+          <p:txBody>
+            <a:bodyPr spcFirstLastPara="1" wrap="square" lIns="91433" tIns="45700" rIns="91433" bIns="45700" anchor="t" anchorCtr="0">
+              <a:spAutoFit/>
+            </a:bodyPr>
+            <a:lstStyle/>
+            <a:p>
+              <a:pPr algn="ctr">
+                <a:buClr>
+                  <a:srgbClr val="000000"/>
+                </a:buClr>
+                <a:buSzPts val="500"/>
+              </a:pPr>
+              <a:r>
+                <a:rPr lang="en" sz="667" i="1">
+                  <a:solidFill>
+                    <a:schemeClr val="dk1"/>
+                  </a:solidFill>
+                  <a:latin typeface="Arial"/>
+                  <a:ea typeface="Arial"/>
+                  <a:cs typeface="Arial"/>
+                  <a:sym typeface="Arial"/>
+                </a:rPr>
+                <a:t>Linköping</a:t>
+              </a:r>
+              <a:endParaRPr sz="1467">
+                <a:solidFill>
+                  <a:srgbClr val="000000"/>
+                </a:solidFill>
+                <a:latin typeface="Arial"/>
+                <a:ea typeface="Arial"/>
+                <a:cs typeface="Arial"/>
+                <a:sym typeface="Arial"/>
+              </a:endParaRPr>
+            </a:p>
+          </p:txBody>
+        </p:sp>
+        <p:sp>
+          <p:nvSpPr>
+            <p:cNvPr id="43" name="Google Shape;49;p2">
+              <a:extLst>
+                <a:ext uri="{FF2B5EF4-FFF2-40B4-BE49-F238E27FC236}">
+                  <a16:creationId xmlns:a16="http://schemas.microsoft.com/office/drawing/2014/main" id="{40225E82-DE15-EA0C-2210-DE490BC9B2C5}"/>
+                </a:ext>
+              </a:extLst>
+            </p:cNvPr>
+            <p:cNvSpPr txBox="1"/>
+            <p:nvPr/>
+          </p:nvSpPr>
+          <p:spPr>
+            <a:xfrm>
+              <a:off x="10032616" y="5713587"/>
+              <a:ext cx="308895" cy="117249"/>
+            </a:xfrm>
+            <a:prstGeom prst="rect">
+              <a:avLst/>
+            </a:prstGeom>
+            <a:noFill/>
+            <a:ln>
+              <a:noFill/>
+            </a:ln>
+          </p:spPr>
+          <p:txBody>
+            <a:bodyPr spcFirstLastPara="1" wrap="square" lIns="91433" tIns="45700" rIns="91433" bIns="45700" anchor="t" anchorCtr="0">
+              <a:spAutoFit/>
+            </a:bodyPr>
+            <a:lstStyle/>
+            <a:p>
+              <a:pPr algn="ctr">
+                <a:buClr>
+                  <a:srgbClr val="000000"/>
+                </a:buClr>
+                <a:buSzPts val="500"/>
+              </a:pPr>
+              <a:r>
+                <a:rPr lang="en" sz="667" i="1">
+                  <a:solidFill>
+                    <a:schemeClr val="dk1"/>
+                  </a:solidFill>
+                  <a:latin typeface="Arial"/>
+                  <a:ea typeface="Arial"/>
+                  <a:cs typeface="Arial"/>
+                  <a:sym typeface="Arial"/>
+                </a:rPr>
+                <a:t>Göteborg</a:t>
+              </a:r>
+              <a:endParaRPr sz="667" i="1">
+                <a:solidFill>
+                  <a:schemeClr val="dk1"/>
+                </a:solidFill>
+                <a:latin typeface="Arial"/>
+                <a:ea typeface="Arial"/>
+                <a:cs typeface="Arial"/>
+                <a:sym typeface="Arial"/>
+              </a:endParaRPr>
+            </a:p>
+          </p:txBody>
+        </p:sp>
+        <p:sp>
+          <p:nvSpPr>
+            <p:cNvPr id="44" name="Google Shape;50;p2">
+              <a:extLst>
+                <a:ext uri="{FF2B5EF4-FFF2-40B4-BE49-F238E27FC236}">
+                  <a16:creationId xmlns:a16="http://schemas.microsoft.com/office/drawing/2014/main" id="{411535C6-3A3C-2272-635F-5271AB002763}"/>
+                </a:ext>
+              </a:extLst>
+            </p:cNvPr>
+            <p:cNvSpPr txBox="1"/>
+            <p:nvPr/>
+          </p:nvSpPr>
+          <p:spPr>
+            <a:xfrm>
+              <a:off x="10227448" y="6047508"/>
+              <a:ext cx="211592" cy="117249"/>
+            </a:xfrm>
+            <a:prstGeom prst="rect">
+              <a:avLst/>
+            </a:prstGeom>
+            <a:noFill/>
+            <a:ln>
+              <a:noFill/>
+            </a:ln>
+          </p:spPr>
+          <p:txBody>
+            <a:bodyPr spcFirstLastPara="1" wrap="square" lIns="91433" tIns="45700" rIns="91433" bIns="45700" anchor="t" anchorCtr="0">
+              <a:spAutoFit/>
+            </a:bodyPr>
+            <a:lstStyle/>
+            <a:p>
+              <a:pPr algn="ctr">
+                <a:buClr>
+                  <a:srgbClr val="000000"/>
+                </a:buClr>
+                <a:buSzPts val="500"/>
+              </a:pPr>
+              <a:r>
+                <a:rPr lang="en" sz="667" i="1">
+                  <a:solidFill>
+                    <a:schemeClr val="dk1"/>
+                  </a:solidFill>
+                  <a:latin typeface="Arial"/>
+                  <a:ea typeface="Arial"/>
+                  <a:cs typeface="Arial"/>
+                  <a:sym typeface="Arial"/>
+                </a:rPr>
+                <a:t>Lund</a:t>
+              </a:r>
+              <a:endParaRPr sz="1467">
+                <a:solidFill>
+                  <a:srgbClr val="000000"/>
+                </a:solidFill>
+                <a:latin typeface="Arial"/>
+                <a:ea typeface="Arial"/>
+                <a:cs typeface="Arial"/>
+                <a:sym typeface="Arial"/>
+              </a:endParaRPr>
+            </a:p>
+          </p:txBody>
+        </p:sp>
+      </p:grpSp>
+      <p:sp>
+        <p:nvSpPr>
+          <p:cNvPr id="52" name="Google Shape;51;p2">
+            <a:extLst>
+              <a:ext uri="{FF2B5EF4-FFF2-40B4-BE49-F238E27FC236}">
+                <a16:creationId xmlns:a16="http://schemas.microsoft.com/office/drawing/2014/main" id="{F050D0D0-7C58-1877-86B3-20E0041F8AB1}"/>
+              </a:ext>
+            </a:extLst>
+          </p:cNvPr>
+          <p:cNvSpPr txBox="1">
+            <a:spLocks/>
+          </p:cNvSpPr>
+          <p:nvPr/>
+        </p:nvSpPr>
+        <p:spPr>
+          <a:xfrm>
+            <a:off x="6728952" y="4221758"/>
+            <a:ext cx="1747217" cy="1644175"/>
+          </a:xfrm>
+          <a:prstGeom prst="rect">
+            <a:avLst/>
+          </a:prstGeom>
+          <a:noFill/>
+          <a:ln>
+            <a:noFill/>
+          </a:ln>
+        </p:spPr>
+        <p:txBody>
+          <a:bodyPr spcFirstLastPara="1" vert="horz" wrap="square" lIns="91433" tIns="45700" rIns="91433" bIns="45700" rtlCol="0" anchor="t" anchorCtr="0">
+            <a:normAutofit/>
+          </a:bodyPr>
+          <a:lstStyle>
+            <a:lvl1pPr marL="0" indent="0" algn="l" defTabSz="914400" rtl="0" eaLnBrk="1" latinLnBrk="0" hangingPunct="1">
+              <a:lnSpc>
+                <a:spcPct val="90000"/>
+              </a:lnSpc>
+              <a:spcBef>
+                <a:spcPts val="1000"/>
+              </a:spcBef>
+              <a:buFont typeface="Arial" panose="020B0604020202020204" pitchFamily="34" charset="0"/>
+              <a:buNone/>
+              <a:defRPr sz="2000" kern="1200">
+                <a:solidFill>
+                  <a:schemeClr val="bg2">
+                    <a:lumMod val="10000"/>
+                  </a:schemeClr>
+                </a:solidFill>
+                <a:latin typeface="Arial" panose="020B0604020202020204" pitchFamily="34" charset="0"/>
+                <a:ea typeface="+mn-ea"/>
+                <a:cs typeface="Arial" panose="020B0604020202020204" pitchFamily="34" charset="0"/>
+              </a:defRPr>
+            </a:lvl1pPr>
+            <a:lvl2pPr marL="457200" indent="0" algn="l" defTabSz="914400" rtl="0" eaLnBrk="1" latinLnBrk="0" hangingPunct="1">
+              <a:lnSpc>
+                <a:spcPct val="90000"/>
+              </a:lnSpc>
+              <a:spcBef>
+                <a:spcPts val="500"/>
+              </a:spcBef>
+              <a:buFont typeface="Arial" panose="020B0604020202020204" pitchFamily="34" charset="0"/>
+              <a:buNone/>
+              <a:defRPr sz="1600" kern="1200">
+                <a:solidFill>
+                  <a:schemeClr val="bg2">
+                    <a:lumMod val="10000"/>
+                  </a:schemeClr>
+                </a:solidFill>
+                <a:latin typeface="Arial" panose="020B0604020202020204" pitchFamily="34" charset="0"/>
+                <a:ea typeface="+mn-ea"/>
+                <a:cs typeface="Arial" panose="020B0604020202020204" pitchFamily="34" charset="0"/>
+              </a:defRPr>
+            </a:lvl2pPr>
+            <a:lvl3pPr marL="914400" indent="0" algn="l" defTabSz="914400" rtl="0" eaLnBrk="1" latinLnBrk="0" hangingPunct="1">
+              <a:lnSpc>
+                <a:spcPct val="90000"/>
+              </a:lnSpc>
+              <a:spcBef>
+                <a:spcPts val="500"/>
+              </a:spcBef>
+              <a:buFont typeface="Arial" panose="020B0604020202020204" pitchFamily="34" charset="0"/>
+              <a:buNone/>
+              <a:defRPr sz="1400" kern="1200">
+                <a:solidFill>
+                  <a:schemeClr val="bg2">
+                    <a:lumMod val="10000"/>
+                  </a:schemeClr>
+                </a:solidFill>
+                <a:latin typeface="Arial" panose="020B0604020202020204" pitchFamily="34" charset="0"/>
+                <a:ea typeface="+mn-ea"/>
+                <a:cs typeface="Arial" panose="020B0604020202020204" pitchFamily="34" charset="0"/>
+              </a:defRPr>
+            </a:lvl3pPr>
+            <a:lvl4pPr marL="1371600" indent="0" algn="l" defTabSz="914400" rtl="0" eaLnBrk="1" latinLnBrk="0" hangingPunct="1">
+              <a:lnSpc>
+                <a:spcPct val="90000"/>
+              </a:lnSpc>
+              <a:spcBef>
+                <a:spcPts val="500"/>
+              </a:spcBef>
+              <a:buFont typeface="Arial" panose="020B0604020202020204" pitchFamily="34" charset="0"/>
+              <a:buNone/>
+              <a:defRPr sz="1400" kern="1200">
+                <a:solidFill>
+                  <a:schemeClr val="bg2">
+                    <a:lumMod val="10000"/>
+                  </a:schemeClr>
+                </a:solidFill>
+                <a:latin typeface="Arial" panose="020B0604020202020204" pitchFamily="34" charset="0"/>
+                <a:ea typeface="+mn-ea"/>
+                <a:cs typeface="Arial" panose="020B0604020202020204" pitchFamily="34" charset="0"/>
+              </a:defRPr>
+            </a:lvl4pPr>
+            <a:lvl5pPr marL="1828800" indent="0" algn="l" defTabSz="914400" rtl="0" eaLnBrk="1" latinLnBrk="0" hangingPunct="1">
+              <a:lnSpc>
+                <a:spcPct val="90000"/>
+              </a:lnSpc>
+              <a:spcBef>
+                <a:spcPts val="500"/>
+              </a:spcBef>
+              <a:buFont typeface="Arial" panose="020B0604020202020204" pitchFamily="34" charset="0"/>
+              <a:buNone/>
+              <a:defRPr sz="1400" kern="1200">
+                <a:solidFill>
+                  <a:schemeClr val="bg2">
+                    <a:lumMod val="10000"/>
+                  </a:schemeClr>
+                </a:solidFill>
+                <a:latin typeface="Arial" panose="020B0604020202020204" pitchFamily="34" charset="0"/>
+                <a:ea typeface="+mn-ea"/>
+                <a:cs typeface="Arial" panose="020B0604020202020204" pitchFamily="34" charset="0"/>
+              </a:defRPr>
+            </a:lvl5pPr>
+            <a:lvl6pPr marL="2514600" indent="-228600" algn="l" defTabSz="914400" rtl="0" eaLnBrk="1" latinLnBrk="0" hangingPunct="1">
+              <a:lnSpc>
+                <a:spcPct val="90000"/>
+              </a:lnSpc>
+              <a:spcBef>
+                <a:spcPts val="500"/>
+              </a:spcBef>
+              <a:buFont typeface="Arial" panose="020B0604020202020204" pitchFamily="34" charset="0"/>
+              <a:buChar char="•"/>
+              <a:defRPr sz="1800" kern="1200">
+                <a:solidFill>
+                  <a:schemeClr val="tx1"/>
+                </a:solidFill>
+                <a:latin typeface="+mn-lt"/>
+                <a:ea typeface="+mn-ea"/>
+                <a:cs typeface="+mn-cs"/>
+              </a:defRPr>
+            </a:lvl6pPr>
+            <a:lvl7pPr marL="2971800" indent="-228600" algn="l" defTabSz="914400" rtl="0" eaLnBrk="1" latinLnBrk="0" hangingPunct="1">
+              <a:lnSpc>
+                <a:spcPct val="90000"/>
+              </a:lnSpc>
+              <a:spcBef>
+                <a:spcPts val="500"/>
+              </a:spcBef>
+              <a:buFont typeface="Arial" panose="020B0604020202020204" pitchFamily="34" charset="0"/>
+              <a:buChar char="•"/>
+              <a:defRPr sz="1800" kern="1200">
+                <a:solidFill>
+                  <a:schemeClr val="tx1"/>
+                </a:solidFill>
+                <a:latin typeface="+mn-lt"/>
+                <a:ea typeface="+mn-ea"/>
+                <a:cs typeface="+mn-cs"/>
+              </a:defRPr>
+            </a:lvl7pPr>
+            <a:lvl8pPr marL="3429000" indent="-228600" algn="l" defTabSz="914400" rtl="0" eaLnBrk="1" latinLnBrk="0" hangingPunct="1">
+              <a:lnSpc>
+                <a:spcPct val="90000"/>
+              </a:lnSpc>
+              <a:spcBef>
+                <a:spcPts val="500"/>
+              </a:spcBef>
+              <a:buFont typeface="Arial" panose="020B0604020202020204" pitchFamily="34" charset="0"/>
+              <a:buChar char="•"/>
+              <a:defRPr sz="1800" kern="1200">
+                <a:solidFill>
+                  <a:schemeClr val="tx1"/>
+                </a:solidFill>
+                <a:latin typeface="+mn-lt"/>
+                <a:ea typeface="+mn-ea"/>
+                <a:cs typeface="+mn-cs"/>
+              </a:defRPr>
+            </a:lvl8pPr>
+            <a:lvl9pPr marL="3886200" indent="-228600" algn="l" defTabSz="914400" rtl="0" eaLnBrk="1" latinLnBrk="0" hangingPunct="1">
+              <a:lnSpc>
+                <a:spcPct val="90000"/>
+              </a:lnSpc>
+              <a:spcBef>
+                <a:spcPts val="500"/>
+              </a:spcBef>
+              <a:buFont typeface="Arial" panose="020B0604020202020204" pitchFamily="34" charset="0"/>
+              <a:buChar char="•"/>
+              <a:defRPr sz="1800" kern="1200">
+                <a:solidFill>
+                  <a:schemeClr val="tx1"/>
+                </a:solidFill>
+                <a:latin typeface="+mn-lt"/>
+                <a:ea typeface="+mn-ea"/>
+                <a:cs typeface="+mn-cs"/>
+              </a:defRPr>
+            </a:lvl9pPr>
+          </a:lstStyle>
+          <a:p>
+            <a:pPr algn="ctr">
+              <a:spcBef>
+                <a:spcPts val="0"/>
+              </a:spcBef>
+              <a:buClr>
+                <a:schemeClr val="lt1"/>
+              </a:buClr>
+              <a:buSzPts val="1100"/>
+            </a:pPr>
+            <a:r>
+              <a:rPr lang="en-GB" sz="1467" dirty="0">
+                <a:solidFill>
+                  <a:schemeClr val="lt1"/>
+                </a:solidFill>
+              </a:rPr>
+              <a:t>~120 staff at six different sites across Sweden with expertise in many different omics-related areas</a:t>
+            </a:r>
+            <a:endParaRPr lang="en-GB" dirty="0"/>
+          </a:p>
+          <a:p>
+            <a:pPr>
+              <a:buSzPts val="1400"/>
+            </a:pPr>
+            <a:endParaRPr lang="en-GB" sz="1867" dirty="0"/>
+          </a:p>
+        </p:txBody>
+      </p:sp>
+      <p:cxnSp>
+        <p:nvCxnSpPr>
+          <p:cNvPr id="53" name="Google Shape;52;p2">
+            <a:extLst>
+              <a:ext uri="{FF2B5EF4-FFF2-40B4-BE49-F238E27FC236}">
+                <a16:creationId xmlns:a16="http://schemas.microsoft.com/office/drawing/2014/main" id="{1074BB0C-7E44-5536-1977-A74EEF4FB9D5}"/>
+              </a:ext>
+            </a:extLst>
+          </p:cNvPr>
+          <p:cNvCxnSpPr/>
+          <p:nvPr/>
+        </p:nvCxnSpPr>
+        <p:spPr>
+          <a:xfrm rot="10800000" flipH="1">
+            <a:off x="8400259" y="3724147"/>
+            <a:ext cx="2308963" cy="679687"/>
+          </a:xfrm>
+          <a:prstGeom prst="straightConnector1">
+            <a:avLst/>
+          </a:prstGeom>
+          <a:noFill/>
+          <a:ln w="28575" cap="rnd" cmpd="sng">
+            <a:solidFill>
+              <a:schemeClr val="accent1"/>
+            </a:solidFill>
+            <a:prstDash val="dot"/>
+            <a:round/>
+            <a:headEnd type="none" w="sm" len="sm"/>
+            <a:tailEnd type="none" w="sm" len="sm"/>
+          </a:ln>
+        </p:spPr>
+      </p:cxnSp>
+      <p:cxnSp>
+        <p:nvCxnSpPr>
+          <p:cNvPr id="54" name="Google Shape;53;p2">
+            <a:extLst>
+              <a:ext uri="{FF2B5EF4-FFF2-40B4-BE49-F238E27FC236}">
+                <a16:creationId xmlns:a16="http://schemas.microsoft.com/office/drawing/2014/main" id="{53FF7348-7347-1A63-F356-9DA1FD00802E}"/>
+              </a:ext>
+            </a:extLst>
+          </p:cNvPr>
+          <p:cNvCxnSpPr/>
+          <p:nvPr/>
+        </p:nvCxnSpPr>
+        <p:spPr>
+          <a:xfrm>
+            <a:off x="8397873" y="5234401"/>
+            <a:ext cx="1485200" cy="368000"/>
+          </a:xfrm>
+          <a:prstGeom prst="straightConnector1">
+            <a:avLst/>
+          </a:prstGeom>
+          <a:noFill/>
+          <a:ln w="28575" cap="rnd" cmpd="sng">
+            <a:solidFill>
+              <a:schemeClr val="accent1"/>
+            </a:solidFill>
+            <a:prstDash val="dot"/>
+            <a:round/>
+            <a:headEnd type="none" w="sm" len="sm"/>
+            <a:tailEnd type="none" w="sm" len="sm"/>
+          </a:ln>
+        </p:spPr>
+      </p:cxnSp>
+      <p:cxnSp>
+        <p:nvCxnSpPr>
+          <p:cNvPr id="55" name="Google Shape;54;p2">
+            <a:extLst>
+              <a:ext uri="{FF2B5EF4-FFF2-40B4-BE49-F238E27FC236}">
+                <a16:creationId xmlns:a16="http://schemas.microsoft.com/office/drawing/2014/main" id="{C462A66C-005D-3ABD-EA44-A8E347209258}"/>
+              </a:ext>
+            </a:extLst>
+          </p:cNvPr>
+          <p:cNvCxnSpPr/>
+          <p:nvPr/>
+        </p:nvCxnSpPr>
+        <p:spPr>
+          <a:xfrm>
+            <a:off x="8544285" y="4710191"/>
+            <a:ext cx="1837631" cy="22168"/>
+          </a:xfrm>
+          <a:prstGeom prst="straightConnector1">
+            <a:avLst/>
+          </a:prstGeom>
+          <a:noFill/>
+          <a:ln w="28575" cap="rnd" cmpd="sng">
+            <a:solidFill>
+              <a:schemeClr val="accent1"/>
+            </a:solidFill>
+            <a:prstDash val="dot"/>
+            <a:round/>
+            <a:headEnd type="none" w="sm" len="sm"/>
+            <a:tailEnd type="none" w="sm" len="sm"/>
+          </a:ln>
+        </p:spPr>
+      </p:cxnSp>
+      <p:cxnSp>
+        <p:nvCxnSpPr>
+          <p:cNvPr id="56" name="Google Shape;55;p2">
+            <a:extLst>
+              <a:ext uri="{FF2B5EF4-FFF2-40B4-BE49-F238E27FC236}">
+                <a16:creationId xmlns:a16="http://schemas.microsoft.com/office/drawing/2014/main" id="{C9CEF8D4-93C9-A0F0-2B3D-66E8CFC7CD30}"/>
+              </a:ext>
+            </a:extLst>
+          </p:cNvPr>
+          <p:cNvCxnSpPr/>
+          <p:nvPr/>
+        </p:nvCxnSpPr>
+        <p:spPr>
+          <a:xfrm>
+            <a:off x="8466342" y="5129338"/>
+            <a:ext cx="1202245" cy="65669"/>
+          </a:xfrm>
+          <a:prstGeom prst="straightConnector1">
+            <a:avLst/>
+          </a:prstGeom>
+          <a:noFill/>
+          <a:ln w="28575" cap="rnd" cmpd="sng">
+            <a:solidFill>
+              <a:schemeClr val="accent1"/>
+            </a:solidFill>
+            <a:prstDash val="dot"/>
+            <a:round/>
+            <a:headEnd type="none" w="sm" len="sm"/>
+            <a:tailEnd type="none" w="sm" len="sm"/>
+          </a:ln>
+        </p:spPr>
+      </p:cxnSp>
+      <p:cxnSp>
+        <p:nvCxnSpPr>
+          <p:cNvPr id="57" name="Google Shape;56;p2">
+            <a:extLst>
+              <a:ext uri="{FF2B5EF4-FFF2-40B4-BE49-F238E27FC236}">
+                <a16:creationId xmlns:a16="http://schemas.microsoft.com/office/drawing/2014/main" id="{A1D99E11-39F3-AF8A-EF57-E96C1A37F003}"/>
+              </a:ext>
+            </a:extLst>
+          </p:cNvPr>
+          <p:cNvCxnSpPr/>
+          <p:nvPr/>
+        </p:nvCxnSpPr>
+        <p:spPr>
+          <a:xfrm>
+            <a:off x="8510834" y="4818867"/>
+            <a:ext cx="1837631" cy="22168"/>
+          </a:xfrm>
+          <a:prstGeom prst="straightConnector1">
+            <a:avLst/>
+          </a:prstGeom>
+          <a:noFill/>
+          <a:ln w="28575" cap="rnd" cmpd="sng">
+            <a:solidFill>
+              <a:schemeClr val="accent1"/>
+            </a:solidFill>
+            <a:prstDash val="dot"/>
+            <a:round/>
+            <a:headEnd type="none" w="sm" len="sm"/>
+            <a:tailEnd type="none" w="sm" len="sm"/>
+          </a:ln>
+        </p:spPr>
+      </p:cxnSp>
+      <p:cxnSp>
+        <p:nvCxnSpPr>
+          <p:cNvPr id="58" name="Google Shape;57;p2">
+            <a:extLst>
+              <a:ext uri="{FF2B5EF4-FFF2-40B4-BE49-F238E27FC236}">
+                <a16:creationId xmlns:a16="http://schemas.microsoft.com/office/drawing/2014/main" id="{5853E223-7693-EADB-5AA1-014C15B91966}"/>
+              </a:ext>
+            </a:extLst>
+          </p:cNvPr>
+          <p:cNvCxnSpPr/>
+          <p:nvPr/>
+        </p:nvCxnSpPr>
+        <p:spPr>
+          <a:xfrm>
+            <a:off x="8499473" y="4941385"/>
+            <a:ext cx="1607136" cy="57763"/>
+          </a:xfrm>
+          <a:prstGeom prst="straightConnector1">
+            <a:avLst/>
+          </a:prstGeom>
+          <a:noFill/>
+          <a:ln w="28575" cap="rnd" cmpd="sng">
+            <a:solidFill>
+              <a:schemeClr val="accent1"/>
+            </a:solidFill>
+            <a:prstDash val="dot"/>
+            <a:round/>
+            <a:headEnd type="none" w="sm" len="sm"/>
+            <a:tailEnd type="none" w="sm" len="sm"/>
+          </a:ln>
+        </p:spPr>
+      </p:cxnSp>
     </p:spTree>
     <p:extLst>
       <p:ext uri="{BB962C8B-B14F-4D97-AF65-F5344CB8AC3E}">
@@ -4229,114 +3934,15 @@
                                   </p:childTnLst>
                                 </p:cTn>
                               </p:par>
-                            </p:childTnLst>
-                          </p:cTn>
-                        </p:par>
-                      </p:childTnLst>
-                    </p:cTn>
-                  </p:par>
-                  <p:par>
-                    <p:cTn id="7" fill="hold">
-                      <p:stCondLst>
-                        <p:cond delay="indefinite"/>
-                      </p:stCondLst>
-                      <p:childTnLst>
-                        <p:par>
-                          <p:cTn id="8" fill="hold">
-                            <p:stCondLst>
-                              <p:cond delay="0"/>
-                            </p:stCondLst>
-                            <p:childTnLst>
                               <p:par>
-                                <p:cTn id="9" presetID="1" presetClass="entr" presetSubtype="0" fill="hold" nodeType="clickEffect">
+                                <p:cTn id="7" presetID="1" presetClass="entr" presetSubtype="0" fill="hold" grpId="0" nodeType="withEffect">
                                   <p:stCondLst>
                                     <p:cond delay="0"/>
                                   </p:stCondLst>
                                   <p:childTnLst>
                                     <p:set>
                                       <p:cBhvr>
-                                        <p:cTn id="10" dur="1" fill="hold">
-                                          <p:stCondLst>
-                                            <p:cond delay="0"/>
-                                          </p:stCondLst>
-                                        </p:cTn>
-                                        <p:tgtEl>
-                                          <p:spTgt spid="36"/>
-                                        </p:tgtEl>
-                                        <p:attrNameLst>
-                                          <p:attrName>style.visibility</p:attrName>
-                                        </p:attrNameLst>
-                                      </p:cBhvr>
-                                      <p:to>
-                                        <p:strVal val="visible"/>
-                                      </p:to>
-                                    </p:set>
-                                  </p:childTnLst>
-                                </p:cTn>
-                              </p:par>
-                              <p:par>
-                                <p:cTn id="11" presetID="1" presetClass="entr" presetSubtype="0" fill="hold" grpId="0" nodeType="withEffect">
-                                  <p:stCondLst>
-                                    <p:cond delay="0"/>
-                                  </p:stCondLst>
-                                  <p:childTnLst>
-                                    <p:set>
-                                      <p:cBhvr>
-                                        <p:cTn id="12" dur="1" fill="hold">
-                                          <p:stCondLst>
-                                            <p:cond delay="0"/>
-                                          </p:stCondLst>
-                                        </p:cTn>
-                                        <p:tgtEl>
-                                          <p:spTgt spid="6"/>
-                                        </p:tgtEl>
-                                        <p:attrNameLst>
-                                          <p:attrName>style.visibility</p:attrName>
-                                        </p:attrNameLst>
-                                      </p:cBhvr>
-                                      <p:to>
-                                        <p:strVal val="visible"/>
-                                      </p:to>
-                                    </p:set>
-                                  </p:childTnLst>
-                                </p:cTn>
-                              </p:par>
-                              <p:par>
-                                <p:cTn id="13" presetID="1" presetClass="entr" presetSubtype="0" fill="hold" nodeType="withEffect">
-                                  <p:stCondLst>
-                                    <p:cond delay="0"/>
-                                  </p:stCondLst>
-                                  <p:childTnLst>
-                                    <p:set>
-                                      <p:cBhvr>
-                                        <p:cTn id="14" dur="1" fill="hold">
-                                          <p:stCondLst>
-                                            <p:cond delay="0"/>
-                                          </p:stCondLst>
-                                        </p:cTn>
-                                        <p:tgtEl>
-                                          <p:spTgt spid="13"/>
-                                        </p:tgtEl>
-                                        <p:attrNameLst>
-                                          <p:attrName>style.visibility</p:attrName>
-                                        </p:attrNameLst>
-                                      </p:cBhvr>
-                                      <p:to>
-                                        <p:strVal val="visible"/>
-                                      </p:to>
-                                    </p:set>
-                                  </p:childTnLst>
-                                </p:cTn>
-                              </p:par>
-                              <p:par>
-                                <p:cTn id="15" presetID="1" presetClass="entr" presetSubtype="0" fill="hold" grpId="0" nodeType="withEffect">
-                                  <p:stCondLst>
-                                    <p:cond delay="0"/>
-                                  </p:stCondLst>
-                                  <p:childTnLst>
-                                    <p:set>
-                                      <p:cBhvr>
-                                        <p:cTn id="16" dur="1" fill="hold">
+                                        <p:cTn id="8" dur="1" fill="hold">
                                           <p:stCondLst>
                                             <p:cond delay="0"/>
                                           </p:stCondLst>
@@ -4359,168 +3965,6 @@
                                   </p:childTnLst>
                                 </p:cTn>
                               </p:par>
-                              <p:par>
-                                <p:cTn id="17" presetID="1" presetClass="entr" presetSubtype="0" fill="hold" nodeType="withEffect">
-                                  <p:stCondLst>
-                                    <p:cond delay="0"/>
-                                  </p:stCondLst>
-                                  <p:childTnLst>
-                                    <p:set>
-                                      <p:cBhvr>
-                                        <p:cTn id="18" dur="1" fill="hold">
-                                          <p:stCondLst>
-                                            <p:cond delay="0"/>
-                                          </p:stCondLst>
-                                        </p:cTn>
-                                        <p:tgtEl>
-                                          <p:spTgt spid="8"/>
-                                        </p:tgtEl>
-                                        <p:attrNameLst>
-                                          <p:attrName>style.visibility</p:attrName>
-                                        </p:attrNameLst>
-                                      </p:cBhvr>
-                                      <p:to>
-                                        <p:strVal val="visible"/>
-                                      </p:to>
-                                    </p:set>
-                                  </p:childTnLst>
-                                </p:cTn>
-                              </p:par>
-                              <p:par>
-                                <p:cTn id="19" presetID="1" presetClass="entr" presetSubtype="0" fill="hold" nodeType="withEffect">
-                                  <p:stCondLst>
-                                    <p:cond delay="0"/>
-                                  </p:stCondLst>
-                                  <p:childTnLst>
-                                    <p:set>
-                                      <p:cBhvr>
-                                        <p:cTn id="20" dur="1" fill="hold">
-                                          <p:stCondLst>
-                                            <p:cond delay="0"/>
-                                          </p:stCondLst>
-                                        </p:cTn>
-                                        <p:tgtEl>
-                                          <p:spTgt spid="35"/>
-                                        </p:tgtEl>
-                                        <p:attrNameLst>
-                                          <p:attrName>style.visibility</p:attrName>
-                                        </p:attrNameLst>
-                                      </p:cBhvr>
-                                      <p:to>
-                                        <p:strVal val="visible"/>
-                                      </p:to>
-                                    </p:set>
-                                  </p:childTnLst>
-                                </p:cTn>
-                              </p:par>
-                              <p:par>
-                                <p:cTn id="21" presetID="1" presetClass="entr" presetSubtype="0" fill="hold" nodeType="withEffect">
-                                  <p:stCondLst>
-                                    <p:cond delay="0"/>
-                                  </p:stCondLst>
-                                  <p:childTnLst>
-                                    <p:set>
-                                      <p:cBhvr>
-                                        <p:cTn id="22" dur="1" fill="hold">
-                                          <p:stCondLst>
-                                            <p:cond delay="0"/>
-                                          </p:stCondLst>
-                                        </p:cTn>
-                                        <p:tgtEl>
-                                          <p:spTgt spid="38"/>
-                                        </p:tgtEl>
-                                        <p:attrNameLst>
-                                          <p:attrName>style.visibility</p:attrName>
-                                        </p:attrNameLst>
-                                      </p:cBhvr>
-                                      <p:to>
-                                        <p:strVal val="visible"/>
-                                      </p:to>
-                                    </p:set>
-                                  </p:childTnLst>
-                                </p:cTn>
-                              </p:par>
-                              <p:par>
-                                <p:cTn id="23" presetID="1" presetClass="entr" presetSubtype="0" fill="hold" nodeType="withEffect">
-                                  <p:stCondLst>
-                                    <p:cond delay="0"/>
-                                  </p:stCondLst>
-                                  <p:childTnLst>
-                                    <p:set>
-                                      <p:cBhvr>
-                                        <p:cTn id="24" dur="1" fill="hold">
-                                          <p:stCondLst>
-                                            <p:cond delay="0"/>
-                                          </p:stCondLst>
-                                        </p:cTn>
-                                        <p:tgtEl>
-                                          <p:spTgt spid="39"/>
-                                        </p:tgtEl>
-                                        <p:attrNameLst>
-                                          <p:attrName>style.visibility</p:attrName>
-                                        </p:attrNameLst>
-                                      </p:cBhvr>
-                                      <p:to>
-                                        <p:strVal val="visible"/>
-                                      </p:to>
-                                    </p:set>
-                                  </p:childTnLst>
-                                </p:cTn>
-                              </p:par>
-                              <p:par>
-                                <p:cTn id="25" presetID="1" presetClass="entr" presetSubtype="0" fill="hold" nodeType="withEffect">
-                                  <p:stCondLst>
-                                    <p:cond delay="0"/>
-                                  </p:stCondLst>
-                                  <p:childTnLst>
-                                    <p:set>
-                                      <p:cBhvr>
-                                        <p:cTn id="26" dur="1" fill="hold">
-                                          <p:stCondLst>
-                                            <p:cond delay="0"/>
-                                          </p:stCondLst>
-                                        </p:cTn>
-                                        <p:tgtEl>
-                                          <p:spTgt spid="40"/>
-                                        </p:tgtEl>
-                                        <p:attrNameLst>
-                                          <p:attrName>style.visibility</p:attrName>
-                                        </p:attrNameLst>
-                                      </p:cBhvr>
-                                      <p:to>
-                                        <p:strVal val="visible"/>
-                                      </p:to>
-                                    </p:set>
-                                  </p:childTnLst>
-                                </p:cTn>
-                              </p:par>
-                              <p:par>
-                                <p:cTn id="27" presetID="1" presetClass="entr" presetSubtype="0" fill="hold" nodeType="withEffect">
-                                  <p:stCondLst>
-                                    <p:cond delay="0"/>
-                                  </p:stCondLst>
-                                  <p:childTnLst>
-                                    <p:set>
-                                      <p:cBhvr>
-                                        <p:cTn id="28" dur="1" fill="hold">
-                                          <p:stCondLst>
-                                            <p:cond delay="0"/>
-                                          </p:stCondLst>
-                                        </p:cTn>
-                                        <p:tgtEl>
-                                          <p:spTgt spid="41"/>
-                                        </p:tgtEl>
-                                        <p:attrNameLst>
-                                          <p:attrName>style.visibility</p:attrName>
-                                        </p:attrNameLst>
-                                      </p:cBhvr>
-                                      <p:to>
-                                        <p:strVal val="visible"/>
-                                      </p:to>
-                                    </p:set>
-                                  </p:childTnLst>
-                                </p:cTn>
-                              </p:par>
                             </p:childTnLst>
                           </p:cTn>
                         </p:par>
@@ -4528,26 +3972,26 @@
                     </p:cTn>
                   </p:par>
                   <p:par>
-                    <p:cTn id="29" fill="hold">
+                    <p:cTn id="9" fill="hold">
                       <p:stCondLst>
                         <p:cond delay="indefinite"/>
                       </p:stCondLst>
                       <p:childTnLst>
                         <p:par>
-                          <p:cTn id="30" fill="hold">
+                          <p:cTn id="10" fill="hold">
                             <p:stCondLst>
                               <p:cond delay="0"/>
                             </p:stCondLst>
                             <p:childTnLst>
                               <p:par>
-                                <p:cTn id="31" presetID="1" presetClass="entr" presetSubtype="0" fill="hold" grpId="0" nodeType="clickEffect">
+                                <p:cTn id="11" presetID="1" presetClass="entr" presetSubtype="0" fill="hold" grpId="0" nodeType="clickEffect">
                                   <p:stCondLst>
                                     <p:cond delay="0"/>
                                   </p:stCondLst>
                                   <p:childTnLst>
                                     <p:set>
                                       <p:cBhvr>
-                                        <p:cTn id="32" dur="1" fill="hold">
+                                        <p:cTn id="12" dur="1" fill="hold">
                                           <p:stCondLst>
                                             <p:cond delay="0"/>
                                           </p:stCondLst>
@@ -4594,7 +4038,6 @@
       </p:par>
     </p:tnLst>
     <p:bldLst>
-      <p:bldP spid="6" grpId="0" animBg="1"/>
       <p:bldP spid="11" grpId="0" animBg="1"/>
       <p:bldP spid="37" grpId="0" build="p"/>
       <p:bldP spid="42" grpId="0" animBg="1"/>
@@ -5800,7 +5243,7 @@
           <p:cNvPr id="2" name="Content Placeholder 1">
             <a:extLst>
               <a:ext uri="{FF2B5EF4-FFF2-40B4-BE49-F238E27FC236}">
-                <a16:creationId xmlns:a16="http://schemas.microsoft.com/office/drawing/2014/main" id="{C645882F-EE5B-B94C-B27C-4688A921B30F}"/>
+                <a16:creationId xmlns:a16="http://schemas.microsoft.com/office/drawing/2014/main" id="{23A79CA0-88DC-72F5-37E2-EEEF4A122327}"/>
               </a:ext>
             </a:extLst>
           </p:cNvPr>
@@ -5819,163 +5262,71 @@
           <a:lstStyle/>
           <a:p>
             <a:pPr marL="342900" indent="-342900">
-              <a:buFontTx/>
+              <a:buFont typeface="Arial" panose="020B0604020202020204" pitchFamily="34" charset="0"/>
               <a:buChar char="•"/>
             </a:pPr>
             <a:r>
-              <a:rPr lang="en-US" sz="2000" b="1" dirty="0"/>
-              <a:t>Drop-in sessions </a:t>
-            </a:r>
-            <a:r>
-              <a:rPr lang="en-US" sz="2000" dirty="0"/>
-              <a:t>every week @ all 6 sites</a:t>
-            </a:r>
-          </a:p>
-          <a:p>
-            <a:pPr marL="800100" lvl="1" indent="-342900">
-              <a:buFontTx/>
+              <a:rPr lang="en-SE" sz="2400" dirty="0"/>
+              <a:t>Fire exits</a:t>
+            </a:r>
+          </a:p>
+          <a:p>
+            <a:pPr marL="342900" indent="-342900">
+              <a:buFont typeface="Arial" panose="020B0604020202020204" pitchFamily="34" charset="0"/>
               <a:buChar char="•"/>
             </a:pPr>
             <a:r>
-              <a:rPr lang="en-US" sz="1600" dirty="0"/>
-              <a:t>Online (Zoom) Tuesdays at 14.00, for free</a:t>
-            </a:r>
-            <a:br>
-              <a:rPr lang="en-US" sz="1600" i="1" dirty="0"/>
-            </a:br>
-            <a:endParaRPr lang="en-US" sz="1600" dirty="0"/>
+              <a:rPr lang="en-SE" sz="2400" dirty="0"/>
+              <a:t>Restrooms</a:t>
+            </a:r>
           </a:p>
           <a:p>
             <a:pPr marL="342900" indent="-342900">
-              <a:buFontTx/>
+              <a:buFont typeface="Arial" panose="020B0604020202020204" pitchFamily="34" charset="0"/>
               <a:buChar char="•"/>
             </a:pPr>
             <a:r>
-              <a:rPr lang="en-US" sz="2000" dirty="0"/>
-              <a:t>Study design and project </a:t>
-            </a:r>
-            <a:r>
-              <a:rPr lang="en-US" sz="2000" b="1" dirty="0"/>
-              <a:t>consultation</a:t>
-            </a:r>
-          </a:p>
-          <a:p>
-            <a:pPr marL="800100" lvl="1" indent="-342900">
-              <a:buFontTx/>
+              <a:rPr lang="en-SE" sz="2400" dirty="0"/>
+              <a:t>Lunch is booked at 12:00 every day</a:t>
+            </a:r>
+          </a:p>
+          <a:p>
+            <a:pPr marL="342900" indent="-342900">
+              <a:buFont typeface="Arial" panose="020B0604020202020204" pitchFamily="34" charset="0"/>
               <a:buChar char="•"/>
             </a:pPr>
             <a:r>
-              <a:rPr lang="en-US" sz="1600" dirty="0"/>
-              <a:t>Three hours per project, for free</a:t>
-            </a:r>
-            <a:br>
-              <a:rPr lang="en-US" sz="1600" dirty="0"/>
-            </a:br>
-            <a:endParaRPr lang="en-US" sz="1600" dirty="0"/>
+              <a:rPr lang="en-SE" sz="2400" dirty="0"/>
+              <a:t>Coffe is ordered for 10:00 and 14:30 every day. We may adjust times a bit depending on lectures</a:t>
+            </a:r>
           </a:p>
           <a:p>
             <a:pPr marL="342900" indent="-342900">
-              <a:buFontTx/>
+              <a:buFont typeface="Arial" panose="020B0604020202020204" pitchFamily="34" charset="0"/>
               <a:buChar char="•"/>
             </a:pPr>
             <a:r>
-              <a:rPr lang="en-US" sz="2000" dirty="0"/>
-              <a:t>Fee-for-service </a:t>
-            </a:r>
-            <a:r>
-              <a:rPr lang="en-US" b="1" dirty="0"/>
-              <a:t>s</a:t>
-            </a:r>
-            <a:r>
-              <a:rPr lang="en-US" sz="2000" b="1" dirty="0"/>
-              <a:t>upport</a:t>
-            </a:r>
-          </a:p>
-          <a:p>
-            <a:pPr marL="800100" lvl="1" indent="-342900">
-              <a:buFontTx/>
-              <a:buChar char="•"/>
-            </a:pPr>
-            <a:r>
-              <a:rPr lang="en-US" sz="1600" dirty="0"/>
-              <a:t>User fee 800 SEK per hour, however many hours you may need</a:t>
-            </a:r>
-          </a:p>
-          <a:p>
-            <a:pPr marL="800100" lvl="1" indent="-342900">
-              <a:buFontTx/>
-              <a:buChar char="•"/>
-            </a:pPr>
-            <a:r>
-              <a:rPr lang="en-US" sz="1600" dirty="0"/>
-              <a:t>No selection process, all project are welcome</a:t>
-            </a:r>
-            <a:br>
-              <a:rPr lang="en-US" sz="1600" dirty="0"/>
-            </a:br>
-            <a:endParaRPr lang="en-US" sz="2000" dirty="0"/>
-          </a:p>
-          <a:p>
-            <a:pPr marL="342900" indent="-342900">
-              <a:buFontTx/>
-              <a:buChar char="•"/>
-            </a:pPr>
-            <a:r>
-              <a:rPr lang="en-US" dirty="0"/>
-              <a:t>Long-term </a:t>
-            </a:r>
-            <a:r>
-              <a:rPr lang="en-US" b="1" dirty="0"/>
-              <a:t>s</a:t>
-            </a:r>
-            <a:r>
-              <a:rPr lang="en-US" sz="2000" b="1" dirty="0"/>
-              <a:t>upport</a:t>
-            </a:r>
-          </a:p>
-          <a:p>
-            <a:pPr marL="800100" lvl="1" indent="-342900">
-              <a:buFontTx/>
-              <a:buChar char="•"/>
-            </a:pPr>
-            <a:r>
-              <a:rPr lang="en-US" sz="1600" dirty="0"/>
-              <a:t>Selection process based on scientific peer-review</a:t>
-            </a:r>
-          </a:p>
-          <a:p>
-            <a:pPr marL="800100" lvl="1" indent="-342900">
-              <a:buFontTx/>
-              <a:buChar char="•"/>
-            </a:pPr>
-            <a:r>
-              <a:rPr lang="en-US" sz="1600" dirty="0"/>
-              <a:t>A total of 500 hours, for free</a:t>
-            </a:r>
-            <a:br>
-              <a:rPr lang="en-US" sz="1600" dirty="0"/>
-            </a:br>
-            <a:endParaRPr lang="en-US" sz="2000" dirty="0"/>
-          </a:p>
-          <a:p>
-            <a:pPr marL="342900" indent="-342900">
-              <a:buFontTx/>
-              <a:buChar char="•"/>
-            </a:pPr>
-            <a:r>
-              <a:rPr lang="en-US" sz="2000" b="1" dirty="0"/>
-              <a:t>Partner Projects</a:t>
-            </a:r>
-          </a:p>
-          <a:p>
-            <a:pPr marL="800100" lvl="1" indent="-342900">
-              <a:buFontTx/>
-              <a:buChar char="•"/>
-            </a:pPr>
-            <a:r>
-              <a:rPr lang="en-US" sz="1600" dirty="0"/>
-              <a:t>Full-cost model: utilize and pay for 50% of one NBIS FTE</a:t>
-            </a:r>
+              <a:rPr lang="en-SE" sz="2400" dirty="0"/>
+              <a:t>C</a:t>
+            </a:r>
+            <a:r>
+              <a:rPr lang="en-GB" sz="2400" dirty="0"/>
+              <a:t>o</a:t>
+            </a:r>
+            <a:r>
+              <a:rPr lang="en-SE" sz="2400" dirty="0"/>
+              <a:t>urse dinner: Wednesday 18:00, Koh Phangan, Fyristorg 2. </a:t>
+            </a:r>
+          </a:p>
+          <a:p>
+            <a:pPr lvl="1"/>
+            <a:r>
+              <a:rPr lang="en-SE" sz="2400" i="1" dirty="0"/>
+              <a:t>Please sign up on the list in the classroom on Monday!</a:t>
+            </a:r>
+          </a:p>
+          <a:p>
+            <a:endParaRPr lang="en-SE" sz="2400" dirty="0"/>
           </a:p>
         </p:txBody>
       </p:sp>
@@ -5984,7 +5335,7 @@
           <p:cNvPr id="3" name="Title 2">
             <a:extLst>
               <a:ext uri="{FF2B5EF4-FFF2-40B4-BE49-F238E27FC236}">
-                <a16:creationId xmlns:a16="http://schemas.microsoft.com/office/drawing/2014/main" id="{FD0BE02C-FBBA-1E40-84DF-5714AA0B9F46}"/>
+                <a16:creationId xmlns:a16="http://schemas.microsoft.com/office/drawing/2014/main" id="{F55C4A6F-E249-AD4F-05AB-1C5BAE7EEE06}"/>
               </a:ext>
             </a:extLst>
           </p:cNvPr>
@@ -6003,8 +5354,8 @@
           <a:lstStyle/>
           <a:p>
             <a:r>
-              <a:rPr lang="en-GB" dirty="0"/>
-              <a:t>NBIS Bioinformatic Support</a:t>
+              <a:rPr lang="en-SE" dirty="0"/>
+              <a:t>Practical information</a:t>
             </a:r>
           </a:p>
         </p:txBody>
@@ -6012,508 +5363,13 @@
     </p:spTree>
     <p:extLst>
       <p:ext uri="{BB962C8B-B14F-4D97-AF65-F5344CB8AC3E}">
-        <p14:creationId xmlns:p14="http://schemas.microsoft.com/office/powerpoint/2010/main" val="3765426315"/>
+        <p14:creationId xmlns:p14="http://schemas.microsoft.com/office/powerpoint/2010/main" val="3067932316"/>
       </p:ext>
     </p:extLst>
   </p:cSld>
   <p:clrMapOvr>
     <a:masterClrMapping/>
   </p:clrMapOvr>
-  <p:timing>
-    <p:tnLst>
-      <p:par>
-        <p:cTn id="1" dur="indefinite" restart="never" nodeType="tmRoot">
-          <p:childTnLst>
-            <p:seq concurrent="1" nextAc="seek">
-              <p:cTn id="2" dur="indefinite" nodeType="mainSeq">
-                <p:childTnLst>
-                  <p:par>
-                    <p:cTn id="3" fill="hold">
-                      <p:stCondLst>
-                        <p:cond delay="indefinite"/>
-                      </p:stCondLst>
-                      <p:childTnLst>
-                        <p:par>
-                          <p:cTn id="4" fill="hold">
-                            <p:stCondLst>
-                              <p:cond delay="0"/>
-                            </p:stCondLst>
-                            <p:childTnLst>
-                              <p:par>
-                                <p:cTn id="5" presetID="1" presetClass="entr" presetSubtype="0" fill="hold" grpId="0" nodeType="clickEffect">
-                                  <p:stCondLst>
-                                    <p:cond delay="0"/>
-                                  </p:stCondLst>
-                                  <p:childTnLst>
-                                    <p:set>
-                                      <p:cBhvr>
-                                        <p:cTn id="6" dur="1" fill="hold">
-                                          <p:stCondLst>
-                                            <p:cond delay="0"/>
-                                          </p:stCondLst>
-                                        </p:cTn>
-                                        <p:tgtEl>
-                                          <p:spTgt spid="2">
-                                            <p:txEl>
-                                              <p:pRg st="0" end="0"/>
-                                            </p:txEl>
-                                          </p:spTgt>
-                                        </p:tgtEl>
-                                        <p:attrNameLst>
-                                          <p:attrName>style.visibility</p:attrName>
-                                        </p:attrNameLst>
-                                      </p:cBhvr>
-                                      <p:to>
-                                        <p:strVal val="visible"/>
-                                      </p:to>
-                                    </p:set>
-                                  </p:childTnLst>
-                                </p:cTn>
-                              </p:par>
-                              <p:par>
-                                <p:cTn id="7" presetID="1" presetClass="entr" presetSubtype="0" fill="hold" grpId="0" nodeType="withEffect">
-                                  <p:stCondLst>
-                                    <p:cond delay="0"/>
-                                  </p:stCondLst>
-                                  <p:childTnLst>
-                                    <p:set>
-                                      <p:cBhvr>
-                                        <p:cTn id="8" dur="1" fill="hold">
-                                          <p:stCondLst>
-                                            <p:cond delay="0"/>
-                                          </p:stCondLst>
-                                        </p:cTn>
-                                        <p:tgtEl>
-                                          <p:spTgt spid="2">
-                                            <p:txEl>
-                                              <p:pRg st="1" end="1"/>
-                                            </p:txEl>
-                                          </p:spTgt>
-                                        </p:tgtEl>
-                                        <p:attrNameLst>
-                                          <p:attrName>style.visibility</p:attrName>
-                                        </p:attrNameLst>
-                                      </p:cBhvr>
-                                      <p:to>
-                                        <p:strVal val="visible"/>
-                                      </p:to>
-                                    </p:set>
-                                  </p:childTnLst>
-                                </p:cTn>
-                              </p:par>
-                            </p:childTnLst>
-                          </p:cTn>
-                        </p:par>
-                      </p:childTnLst>
-                    </p:cTn>
-                  </p:par>
-                  <p:par>
-                    <p:cTn id="9" fill="hold">
-                      <p:stCondLst>
-                        <p:cond delay="indefinite"/>
-                      </p:stCondLst>
-                      <p:childTnLst>
-                        <p:par>
-                          <p:cTn id="10" fill="hold">
-                            <p:stCondLst>
-                              <p:cond delay="0"/>
-                            </p:stCondLst>
-                            <p:childTnLst>
-                              <p:par>
-                                <p:cTn id="11" presetID="1" presetClass="entr" presetSubtype="0" fill="hold" grpId="0" nodeType="clickEffect">
-                                  <p:stCondLst>
-                                    <p:cond delay="0"/>
-                                  </p:stCondLst>
-                                  <p:childTnLst>
-                                    <p:set>
-                                      <p:cBhvr>
-                                        <p:cTn id="12" dur="1" fill="hold">
-                                          <p:stCondLst>
-                                            <p:cond delay="0"/>
-                                          </p:stCondLst>
-                                        </p:cTn>
-                                        <p:tgtEl>
-                                          <p:spTgt spid="2">
-                                            <p:txEl>
-                                              <p:pRg st="2" end="2"/>
-                                            </p:txEl>
-                                          </p:spTgt>
-                                        </p:tgtEl>
-                                        <p:attrNameLst>
-                                          <p:attrName>style.visibility</p:attrName>
-                                        </p:attrNameLst>
-                                      </p:cBhvr>
-                                      <p:to>
-                                        <p:strVal val="visible"/>
-                                      </p:to>
-                                    </p:set>
-                                  </p:childTnLst>
-                                </p:cTn>
-                              </p:par>
-                              <p:par>
-                                <p:cTn id="13" presetID="1" presetClass="entr" presetSubtype="0" fill="hold" grpId="0" nodeType="withEffect">
-                                  <p:stCondLst>
-                                    <p:cond delay="0"/>
-                                  </p:stCondLst>
-                                  <p:childTnLst>
-                                    <p:set>
-                                      <p:cBhvr>
-                                        <p:cTn id="14" dur="1" fill="hold">
-                                          <p:stCondLst>
-                                            <p:cond delay="0"/>
-                                          </p:stCondLst>
-                                        </p:cTn>
-                                        <p:tgtEl>
-                                          <p:spTgt spid="2">
-                                            <p:txEl>
-                                              <p:pRg st="3" end="3"/>
-                                            </p:txEl>
-                                          </p:spTgt>
-                                        </p:tgtEl>
-                                        <p:attrNameLst>
-                                          <p:attrName>style.visibility</p:attrName>
-                                        </p:attrNameLst>
-                                      </p:cBhvr>
-                                      <p:to>
-                                        <p:strVal val="visible"/>
-                                      </p:to>
-                                    </p:set>
-                                  </p:childTnLst>
-                                </p:cTn>
-                              </p:par>
-                            </p:childTnLst>
-                          </p:cTn>
-                        </p:par>
-                      </p:childTnLst>
-                    </p:cTn>
-                  </p:par>
-                  <p:par>
-                    <p:cTn id="15" fill="hold">
-                      <p:stCondLst>
-                        <p:cond delay="indefinite"/>
-                      </p:stCondLst>
-                      <p:childTnLst>
-                        <p:par>
-                          <p:cTn id="16" fill="hold">
-                            <p:stCondLst>
-                              <p:cond delay="0"/>
-                            </p:stCondLst>
-                            <p:childTnLst>
-                              <p:par>
-                                <p:cTn id="17" presetID="1" presetClass="entr" presetSubtype="0" fill="hold" grpId="0" nodeType="clickEffect">
-                                  <p:stCondLst>
-                                    <p:cond delay="0"/>
-                                  </p:stCondLst>
-                                  <p:childTnLst>
-                                    <p:set>
-                                      <p:cBhvr>
-                                        <p:cTn id="18" dur="1" fill="hold">
-                                          <p:stCondLst>
-                                            <p:cond delay="0"/>
-                                          </p:stCondLst>
-                                        </p:cTn>
-                                        <p:tgtEl>
-                                          <p:spTgt spid="2">
-                                            <p:txEl>
-                                              <p:pRg st="4" end="4"/>
-                                            </p:txEl>
-                                          </p:spTgt>
-                                        </p:tgtEl>
-                                        <p:attrNameLst>
-                                          <p:attrName>style.visibility</p:attrName>
-                                        </p:attrNameLst>
-                                      </p:cBhvr>
-                                      <p:to>
-                                        <p:strVal val="visible"/>
-                                      </p:to>
-                                    </p:set>
-                                  </p:childTnLst>
-                                </p:cTn>
-                              </p:par>
-                              <p:par>
-                                <p:cTn id="19" presetID="1" presetClass="entr" presetSubtype="0" fill="hold" grpId="0" nodeType="withEffect">
-                                  <p:stCondLst>
-                                    <p:cond delay="0"/>
-                                  </p:stCondLst>
-                                  <p:childTnLst>
-                                    <p:set>
-                                      <p:cBhvr>
-                                        <p:cTn id="20" dur="1" fill="hold">
-                                          <p:stCondLst>
-                                            <p:cond delay="0"/>
-                                          </p:stCondLst>
-                                        </p:cTn>
-                                        <p:tgtEl>
-                                          <p:spTgt spid="2">
-                                            <p:txEl>
-                                              <p:pRg st="5" end="5"/>
-                                            </p:txEl>
-                                          </p:spTgt>
-                                        </p:tgtEl>
-                                        <p:attrNameLst>
-                                          <p:attrName>style.visibility</p:attrName>
-                                        </p:attrNameLst>
-                                      </p:cBhvr>
-                                      <p:to>
-                                        <p:strVal val="visible"/>
-                                      </p:to>
-                                    </p:set>
-                                  </p:childTnLst>
-                                </p:cTn>
-                              </p:par>
-                              <p:par>
-                                <p:cTn id="21" presetID="1" presetClass="entr" presetSubtype="0" fill="hold" grpId="0" nodeType="withEffect">
-                                  <p:stCondLst>
-                                    <p:cond delay="0"/>
-                                  </p:stCondLst>
-                                  <p:childTnLst>
-                                    <p:set>
-                                      <p:cBhvr>
-                                        <p:cTn id="22" dur="1" fill="hold">
-                                          <p:stCondLst>
-                                            <p:cond delay="0"/>
-                                          </p:stCondLst>
-                                        </p:cTn>
-                                        <p:tgtEl>
-                                          <p:spTgt spid="2">
-                                            <p:txEl>
-                                              <p:pRg st="6" end="6"/>
-                                            </p:txEl>
-                                          </p:spTgt>
-                                        </p:tgtEl>
-                                        <p:attrNameLst>
-                                          <p:attrName>style.visibility</p:attrName>
-                                        </p:attrNameLst>
-                                      </p:cBhvr>
-                                      <p:to>
-                                        <p:strVal val="visible"/>
-                                      </p:to>
-                                    </p:set>
-                                  </p:childTnLst>
-                                </p:cTn>
-                              </p:par>
-                            </p:childTnLst>
-                          </p:cTn>
-                        </p:par>
-                      </p:childTnLst>
-                    </p:cTn>
-                  </p:par>
-                  <p:par>
-                    <p:cTn id="23" fill="hold">
-                      <p:stCondLst>
-                        <p:cond delay="indefinite"/>
-                      </p:stCondLst>
-                      <p:childTnLst>
-                        <p:par>
-                          <p:cTn id="24" fill="hold">
-                            <p:stCondLst>
-                              <p:cond delay="0"/>
-                            </p:stCondLst>
-                            <p:childTnLst>
-                              <p:par>
-                                <p:cTn id="25" presetID="1" presetClass="entr" presetSubtype="0" fill="hold" grpId="0" nodeType="clickEffect">
-                                  <p:stCondLst>
-                                    <p:cond delay="0"/>
-                                  </p:stCondLst>
-                                  <p:childTnLst>
-                                    <p:set>
-                                      <p:cBhvr>
-                                        <p:cTn id="26" dur="1" fill="hold">
-                                          <p:stCondLst>
-                                            <p:cond delay="0"/>
-                                          </p:stCondLst>
-                                        </p:cTn>
-                                        <p:tgtEl>
-                                          <p:spTgt spid="2">
-                                            <p:txEl>
-                                              <p:pRg st="7" end="7"/>
-                                            </p:txEl>
-                                          </p:spTgt>
-                                        </p:tgtEl>
-                                        <p:attrNameLst>
-                                          <p:attrName>style.visibility</p:attrName>
-                                        </p:attrNameLst>
-                                      </p:cBhvr>
-                                      <p:to>
-                                        <p:strVal val="visible"/>
-                                      </p:to>
-                                    </p:set>
-                                  </p:childTnLst>
-                                </p:cTn>
-                              </p:par>
-                              <p:par>
-                                <p:cTn id="27" presetID="1" presetClass="entr" presetSubtype="0" fill="hold" grpId="0" nodeType="withEffect">
-                                  <p:stCondLst>
-                                    <p:cond delay="0"/>
-                                  </p:stCondLst>
-                                  <p:childTnLst>
-                                    <p:set>
-                                      <p:cBhvr>
-                                        <p:cTn id="28" dur="1" fill="hold">
-                                          <p:stCondLst>
-                                            <p:cond delay="0"/>
-                                          </p:stCondLst>
-                                        </p:cTn>
-                                        <p:tgtEl>
-                                          <p:spTgt spid="2">
-                                            <p:txEl>
-                                              <p:pRg st="8" end="8"/>
-                                            </p:txEl>
-                                          </p:spTgt>
-                                        </p:tgtEl>
-                                        <p:attrNameLst>
-                                          <p:attrName>style.visibility</p:attrName>
-                                        </p:attrNameLst>
-                                      </p:cBhvr>
-                                      <p:to>
-                                        <p:strVal val="visible"/>
-                                      </p:to>
-                                    </p:set>
-                                  </p:childTnLst>
-                                </p:cTn>
-                              </p:par>
-                              <p:par>
-                                <p:cTn id="29" presetID="1" presetClass="entr" presetSubtype="0" fill="hold" grpId="0" nodeType="withEffect">
-                                  <p:stCondLst>
-                                    <p:cond delay="0"/>
-                                  </p:stCondLst>
-                                  <p:childTnLst>
-                                    <p:set>
-                                      <p:cBhvr>
-                                        <p:cTn id="30" dur="1" fill="hold">
-                                          <p:stCondLst>
-                                            <p:cond delay="0"/>
-                                          </p:stCondLst>
-                                        </p:cTn>
-                                        <p:tgtEl>
-                                          <p:spTgt spid="2">
-                                            <p:txEl>
-                                              <p:pRg st="9" end="9"/>
-                                            </p:txEl>
-                                          </p:spTgt>
-                                        </p:tgtEl>
-                                        <p:attrNameLst>
-                                          <p:attrName>style.visibility</p:attrName>
-                                        </p:attrNameLst>
-                                      </p:cBhvr>
-                                      <p:to>
-                                        <p:strVal val="visible"/>
-                                      </p:to>
-                                    </p:set>
-                                  </p:childTnLst>
-                                </p:cTn>
-                              </p:par>
-                            </p:childTnLst>
-                          </p:cTn>
-                        </p:par>
-                      </p:childTnLst>
-                    </p:cTn>
-                  </p:par>
-                  <p:par>
-                    <p:cTn id="31" fill="hold">
-                      <p:stCondLst>
-                        <p:cond delay="indefinite"/>
-                      </p:stCondLst>
-                      <p:childTnLst>
-                        <p:par>
-                          <p:cTn id="32" fill="hold">
-                            <p:stCondLst>
-                              <p:cond delay="0"/>
-                            </p:stCondLst>
-                            <p:childTnLst>
-                              <p:par>
-                                <p:cTn id="33" presetID="1" presetClass="entr" presetSubtype="0" fill="hold" grpId="0" nodeType="clickEffect">
-                                  <p:stCondLst>
-                                    <p:cond delay="0"/>
-                                  </p:stCondLst>
-                                  <p:childTnLst>
-                                    <p:set>
-                                      <p:cBhvr>
-                                        <p:cTn id="34" dur="1" fill="hold">
-                                          <p:stCondLst>
-                                            <p:cond delay="0"/>
-                                          </p:stCondLst>
-                                        </p:cTn>
-                                        <p:tgtEl>
-                                          <p:spTgt spid="2">
-                                            <p:txEl>
-                                              <p:pRg st="10" end="10"/>
-                                            </p:txEl>
-                                          </p:spTgt>
-                                        </p:tgtEl>
-                                        <p:attrNameLst>
-                                          <p:attrName>style.visibility</p:attrName>
-                                        </p:attrNameLst>
-                                      </p:cBhvr>
-                                      <p:to>
-                                        <p:strVal val="visible"/>
-                                      </p:to>
-                                    </p:set>
-                                  </p:childTnLst>
-                                </p:cTn>
-                              </p:par>
-                              <p:par>
-                                <p:cTn id="35" presetID="1" presetClass="entr" presetSubtype="0" fill="hold" grpId="0" nodeType="withEffect">
-                                  <p:stCondLst>
-                                    <p:cond delay="0"/>
-                                  </p:stCondLst>
-                                  <p:childTnLst>
-                                    <p:set>
-                                      <p:cBhvr>
-                                        <p:cTn id="36" dur="1" fill="hold">
-                                          <p:stCondLst>
-                                            <p:cond delay="0"/>
-                                          </p:stCondLst>
-                                        </p:cTn>
-                                        <p:tgtEl>
-                                          <p:spTgt spid="2">
-                                            <p:txEl>
-                                              <p:pRg st="11" end="11"/>
-                                            </p:txEl>
-                                          </p:spTgt>
-                                        </p:tgtEl>
-                                        <p:attrNameLst>
-                                          <p:attrName>style.visibility</p:attrName>
-                                        </p:attrNameLst>
-                                      </p:cBhvr>
-                                      <p:to>
-                                        <p:strVal val="visible"/>
-                                      </p:to>
-                                    </p:set>
-                                  </p:childTnLst>
-                                </p:cTn>
-                              </p:par>
-                            </p:childTnLst>
-                          </p:cTn>
-                        </p:par>
-                      </p:childTnLst>
-                    </p:cTn>
-                  </p:par>
-                </p:childTnLst>
-              </p:cTn>
-              <p:prevCondLst>
-                <p:cond evt="onPrev" delay="0">
-                  <p:tgtEl>
-                    <p:sldTgt/>
-                  </p:tgtEl>
-                </p:cond>
-              </p:prevCondLst>
-              <p:nextCondLst>
-                <p:cond evt="onNext" delay="0">
-                  <p:tgtEl>
-                    <p:sldTgt/>
-                  </p:tgtEl>
-                </p:cond>
-              </p:nextCondLst>
-            </p:seq>
-          </p:childTnLst>
-        </p:cTn>
-      </p:par>
-    </p:tnLst>
-    <p:bldLst>
-      <p:bldP spid="2" grpId="0" build="p"/>
-    </p:bldLst>
-  </p:timing>
 </p:sld>
 </file>
 
@@ -6536,10 +5392,10 @@
       </p:grpSpPr>
       <p:sp>
         <p:nvSpPr>
-          <p:cNvPr id="2" name="Content Placeholder 1">
+          <p:cNvPr id="2" name="Platshållare för innehåll 1">
             <a:extLst>
               <a:ext uri="{FF2B5EF4-FFF2-40B4-BE49-F238E27FC236}">
-                <a16:creationId xmlns:a16="http://schemas.microsoft.com/office/drawing/2014/main" id="{8FFA1570-0EFF-2C48-BBDB-C61ADFAEB3F5}"/>
+                <a16:creationId xmlns:a16="http://schemas.microsoft.com/office/drawing/2014/main" id="{EFEF3CA9-AB7A-A446-91F3-AFDAACBB631D}"/>
               </a:ext>
             </a:extLst>
           </p:cNvPr>
@@ -6550,124 +5406,90 @@
             <p:ph idx="1"/>
           </p:nvPr>
         </p:nvSpPr>
-        <p:spPr/>
+        <p:spPr>
+          <a:xfrm>
+            <a:off x="431209" y="1241059"/>
+            <a:ext cx="8680133" cy="2992407"/>
+          </a:xfrm>
+        </p:spPr>
         <p:txBody>
-          <a:bodyPr>
-            <a:normAutofit/>
-          </a:bodyPr>
+          <a:bodyPr/>
           <a:lstStyle/>
           <a:p>
-            <a:r>
-              <a:rPr lang="en-US" sz="2000" b="1" dirty="0"/>
-              <a:t>Some example NBIS courses</a:t>
-            </a:r>
-          </a:p>
-          <a:p>
-            <a:pPr marL="457200" indent="-457200">
+            <a:pPr marL="342900" indent="-342900">
               <a:buFont typeface="Arial" panose="020B0604020202020204" pitchFamily="34" charset="0"/>
               <a:buChar char="•"/>
             </a:pPr>
             <a:r>
-              <a:rPr lang="en-US" sz="2000" dirty="0">
-                <a:solidFill>
-                  <a:srgbClr val="000000"/>
-                </a:solidFill>
-                <a:ea typeface="Arial" charset="0"/>
-                <a:cs typeface="Arial" charset="0"/>
-              </a:rPr>
-              <a:t>Introduction to bioinformatics using NGS data</a:t>
-            </a:r>
-          </a:p>
-          <a:p>
-            <a:pPr marL="457200" indent="-457200">
+              <a:rPr lang="en-GB" sz="2400" dirty="0"/>
+              <a:t>Instructions available in Canvas:</a:t>
+            </a:r>
+            <a:endParaRPr lang="en-GB" dirty="0"/>
+          </a:p>
+          <a:p>
+            <a:pPr marL="800100" lvl="1" indent="-342900">
               <a:buFont typeface="Arial" panose="020B0604020202020204" pitchFamily="34" charset="0"/>
               <a:buChar char="•"/>
             </a:pPr>
             <a:r>
-              <a:rPr lang="en-US" sz="2000" dirty="0"/>
-              <a:t>Bulk and single-cell RNA-seq</a:t>
-            </a:r>
-          </a:p>
-          <a:p>
-            <a:pPr marL="457200" indent="-457200">
+              <a:rPr lang="en-GB" sz="2000" dirty="0">
+                <a:hlinkClick r:id="rId3"/>
+              </a:rPr>
+              <a:t>https://uppsala.instructure.com/courses/85059</a:t>
+            </a:r>
+            <a:endParaRPr lang="en-GB" sz="2000" dirty="0"/>
+          </a:p>
+          <a:p>
+            <a:pPr marL="800100" lvl="1" indent="-342900">
               <a:buFont typeface="Arial" panose="020B0604020202020204" pitchFamily="34" charset="0"/>
               <a:buChar char="•"/>
             </a:pPr>
             <a:r>
-              <a:rPr lang="en-US" sz="2000" dirty="0"/>
-              <a:t>Python and R programming </a:t>
-            </a:r>
-          </a:p>
-          <a:p>
-            <a:pPr marL="457200" indent="-457200">
+              <a:rPr lang="en-GB" sz="2000" dirty="0"/>
+              <a:t>All material linked from Modules/Workshop/Schedule</a:t>
+            </a:r>
+            <a:endParaRPr lang="en-GB" sz="2400" dirty="0"/>
+          </a:p>
+          <a:p>
+            <a:pPr marL="342900" indent="-342900">
               <a:buFont typeface="Arial" panose="020B0604020202020204" pitchFamily="34" charset="0"/>
               <a:buChar char="•"/>
             </a:pPr>
             <a:r>
-              <a:rPr lang="en-US" sz="2000" dirty="0"/>
-              <a:t>Tools for reproducible research</a:t>
-            </a:r>
-          </a:p>
-          <a:p>
-            <a:pPr marL="457200" indent="-457200">
+              <a:rPr lang="en-GB" sz="2400" dirty="0"/>
+              <a:t>Work in pairs because it improves the learning.</a:t>
+            </a:r>
+          </a:p>
+          <a:p>
+            <a:pPr marL="342900" indent="-342900">
               <a:buFont typeface="Arial" panose="020B0604020202020204" pitchFamily="34" charset="0"/>
               <a:buChar char="•"/>
             </a:pPr>
             <a:r>
-              <a:rPr lang="en-US" sz="2000" dirty="0"/>
-              <a:t>Omics integration and systems biology</a:t>
-            </a:r>
-          </a:p>
-          <a:p>
-            <a:pPr marL="457200" indent="-457200">
-              <a:buFont typeface="Arial" panose="020B0604020202020204" pitchFamily="34" charset="0"/>
-              <a:buChar char="•"/>
-            </a:pPr>
-            <a:r>
-              <a:rPr lang="en-US" sz="2000" dirty="0"/>
-              <a:t>Biostatistics and machine learning</a:t>
-            </a:r>
-          </a:p>
-          <a:p>
-            <a:endParaRPr lang="en-US" sz="2000" dirty="0"/>
-          </a:p>
-          <a:p>
-            <a:r>
-              <a:rPr lang="en-US" sz="2000" dirty="0"/>
-              <a:t>Check out our training catalogue</a:t>
-            </a:r>
-            <a:r>
-              <a:rPr lang="en-US" dirty="0"/>
-              <a:t>: </a:t>
-            </a:r>
-          </a:p>
-          <a:p>
-            <a:r>
-              <a:rPr lang="en-US" dirty="0"/>
-              <a:t>https://</a:t>
-            </a:r>
-            <a:r>
-              <a:rPr lang="en-US" dirty="0" err="1"/>
-              <a:t>uppsala.instructure.com</a:t>
-            </a:r>
-            <a:r>
-              <a:rPr lang="en-US" dirty="0"/>
-              <a:t>/courses/79097</a:t>
-            </a:r>
-            <a:endParaRPr lang="en-SE" sz="2000" dirty="0">
-              <a:solidFill>
-                <a:srgbClr val="045C64"/>
-              </a:solidFill>
-            </a:endParaRPr>
+              <a:rPr lang="en-GB" sz="2400" dirty="0"/>
+              <a:t>Ask TAs when you have problems!</a:t>
+            </a:r>
+          </a:p>
+          <a:p>
+            <a:endParaRPr lang="en-GB" dirty="0"/>
+          </a:p>
+          <a:p>
+            <a:endParaRPr lang="en-GB" dirty="0"/>
+          </a:p>
+          <a:p>
+            <a:endParaRPr lang="en-GB" dirty="0"/>
+          </a:p>
+          <a:p>
+            <a:endParaRPr lang="en-GB" dirty="0"/>
           </a:p>
         </p:txBody>
       </p:sp>
       <p:sp>
         <p:nvSpPr>
-          <p:cNvPr id="3" name="Title 2">
+          <p:cNvPr id="3" name="Rubrik 2">
             <a:extLst>
               <a:ext uri="{FF2B5EF4-FFF2-40B4-BE49-F238E27FC236}">
-                <a16:creationId xmlns:a16="http://schemas.microsoft.com/office/drawing/2014/main" id="{C49BB356-E7F1-1C42-946C-740E0BC09D0D}"/>
+                <a16:creationId xmlns:a16="http://schemas.microsoft.com/office/drawing/2014/main" id="{7E27F0CF-10D2-0745-B573-A806CFB1514D}"/>
               </a:ext>
             </a:extLst>
           </p:cNvPr>
@@ -6687,7 +5509,7 @@
           <a:p>
             <a:r>
               <a:rPr lang="en-GB" dirty="0"/>
-              <a:t>NBIS Training</a:t>
+              <a:t>Labs</a:t>
             </a:r>
           </a:p>
         </p:txBody>
@@ -6695,7 +5517,7 @@
     </p:spTree>
     <p:extLst>
       <p:ext uri="{BB962C8B-B14F-4D97-AF65-F5344CB8AC3E}">
-        <p14:creationId xmlns:p14="http://schemas.microsoft.com/office/powerpoint/2010/main" val="2167017155"/>
+        <p14:creationId xmlns:p14="http://schemas.microsoft.com/office/powerpoint/2010/main" val="235262784"/>
       </p:ext>
     </p:extLst>
   </p:cSld>
@@ -6724,10 +5546,10 @@
       </p:grpSpPr>
       <p:sp>
         <p:nvSpPr>
-          <p:cNvPr id="4" name="Rubrik 3">
+          <p:cNvPr id="2" name="Content Placeholder 1">
             <a:extLst>
               <a:ext uri="{FF2B5EF4-FFF2-40B4-BE49-F238E27FC236}">
-                <a16:creationId xmlns:a16="http://schemas.microsoft.com/office/drawing/2014/main" id="{5E6D3344-626D-404C-89BC-8D6B12E5F22E}"/>
+                <a16:creationId xmlns:a16="http://schemas.microsoft.com/office/drawing/2014/main" id="{D8A19674-0785-988B-CAE8-B69C6C1D93C5}"/>
               </a:ext>
             </a:extLst>
           </p:cNvPr>
@@ -6735,17 +5557,85 @@
             <a:spLocks noGrp="1"/>
           </p:cNvSpPr>
           <p:nvPr>
-            <p:ph type="ctrTitle"/>
+            <p:ph idx="1"/>
           </p:nvPr>
         </p:nvSpPr>
         <p:spPr/>
         <p:txBody>
-          <a:bodyPr/>
+          <a:bodyPr>
+            <a:normAutofit/>
+          </a:bodyPr>
           <a:lstStyle/>
           <a:p>
             <a:r>
-              <a:rPr lang="en-GB" dirty="0"/>
-              <a:t>More information about NBIS on Friday!</a:t>
+              <a:rPr lang="en-SE" sz="2400" dirty="0"/>
+              <a:t>Those that attend the full workshop* will get a certificate.</a:t>
+            </a:r>
+          </a:p>
+          <a:p>
+            <a:r>
+              <a:rPr lang="en-SE" sz="2400" dirty="0"/>
+              <a:t>	*Attendence at all lectures and labs</a:t>
+            </a:r>
+          </a:p>
+          <a:p>
+            <a:r>
+              <a:rPr lang="en-SE" sz="2400" dirty="0"/>
+              <a:t>	*Labs done to the basic level</a:t>
+            </a:r>
+          </a:p>
+          <a:p>
+            <a:r>
+              <a:rPr lang="en-SE" sz="2400" dirty="0"/>
+              <a:t>	*Let us know if you need to miss a session</a:t>
+            </a:r>
+          </a:p>
+          <a:p>
+            <a:endParaRPr lang="en-SE" sz="2400" dirty="0"/>
+          </a:p>
+          <a:p>
+            <a:r>
+              <a:rPr lang="en-SE" sz="2400" dirty="0"/>
+              <a:t>The certificate will not state number of credits. It will say that this was a full weeks workshop and what topics were covered.</a:t>
+            </a:r>
+          </a:p>
+          <a:p>
+            <a:endParaRPr lang="en-SE" sz="2400" dirty="0"/>
+          </a:p>
+          <a:p>
+            <a:r>
+              <a:rPr lang="en-SE" sz="2400" dirty="0"/>
+              <a:t>Please fill in attendence sheets on the wall!</a:t>
+            </a:r>
+          </a:p>
+        </p:txBody>
+      </p:sp>
+      <p:sp>
+        <p:nvSpPr>
+          <p:cNvPr id="3" name="Title 2">
+            <a:extLst>
+              <a:ext uri="{FF2B5EF4-FFF2-40B4-BE49-F238E27FC236}">
+                <a16:creationId xmlns:a16="http://schemas.microsoft.com/office/drawing/2014/main" id="{1C20F98B-1903-2E1B-1CC1-DFE396E5749F}"/>
+              </a:ext>
+            </a:extLst>
+          </p:cNvPr>
+          <p:cNvSpPr>
+            <a:spLocks noGrp="1"/>
+          </p:cNvSpPr>
+          <p:nvPr>
+            <p:ph type="title"/>
+          </p:nvPr>
+        </p:nvSpPr>
+        <p:spPr/>
+        <p:txBody>
+          <a:bodyPr>
+            <a:normAutofit fontScale="90000"/>
+          </a:bodyPr>
+          <a:lstStyle/>
+          <a:p>
+            <a:r>
+              <a:rPr lang="en-SE" dirty="0"/>
+              <a:t>Attendence and certificate</a:t>
             </a:r>
           </a:p>
         </p:txBody>
@@ -6753,7 +5643,7 @@
     </p:spTree>
     <p:extLst>
       <p:ext uri="{BB962C8B-B14F-4D97-AF65-F5344CB8AC3E}">
-        <p14:creationId xmlns:p14="http://schemas.microsoft.com/office/powerpoint/2010/main" val="2450548110"/>
+        <p14:creationId xmlns:p14="http://schemas.microsoft.com/office/powerpoint/2010/main" val="4010080424"/>
       </p:ext>
     </p:extLst>
   </p:cSld>
@@ -6782,10 +5672,10 @@
       </p:grpSpPr>
       <p:sp>
         <p:nvSpPr>
-          <p:cNvPr id="2" name="Rubrik 1">
+          <p:cNvPr id="2" name="Content Placeholder 1">
             <a:extLst>
               <a:ext uri="{FF2B5EF4-FFF2-40B4-BE49-F238E27FC236}">
-                <a16:creationId xmlns:a16="http://schemas.microsoft.com/office/drawing/2014/main" id="{0167827F-EC78-864A-9C8F-2E74AFFE8EF8}"/>
+                <a16:creationId xmlns:a16="http://schemas.microsoft.com/office/drawing/2014/main" id="{D96A6D82-F9B4-3263-5767-33C81CEE1332}"/>
               </a:ext>
             </a:extLst>
           </p:cNvPr>
@@ -6793,17 +5683,79 @@
             <a:spLocks noGrp="1"/>
           </p:cNvSpPr>
           <p:nvPr>
-            <p:ph type="ctrTitle"/>
+            <p:ph idx="1"/>
           </p:nvPr>
         </p:nvSpPr>
         <p:spPr/>
         <p:txBody>
-          <a:bodyPr/>
+          <a:bodyPr>
+            <a:normAutofit/>
+          </a:bodyPr>
           <a:lstStyle/>
           <a:p>
             <a:r>
-              <a:rPr lang="en-GB" dirty="0"/>
-              <a:t>Practical information</a:t>
+              <a:rPr lang="en-SE" sz="2400" dirty="0"/>
+              <a:t>Wednesday 18:00</a:t>
+            </a:r>
+          </a:p>
+          <a:p>
+            <a:endParaRPr lang="en-SE" sz="2400" dirty="0"/>
+          </a:p>
+          <a:p>
+            <a:r>
+              <a:rPr lang="en-SE" sz="2400" dirty="0"/>
+              <a:t>Uppsala: Koh Phangan, Fyristorg 2</a:t>
+            </a:r>
+          </a:p>
+          <a:p>
+            <a:r>
+              <a:rPr lang="en-SE" sz="2400" dirty="0"/>
+              <a:t>Lund:</a:t>
+            </a:r>
+          </a:p>
+          <a:p>
+            <a:r>
+              <a:rPr lang="en-SE" sz="2400" dirty="0"/>
+              <a:t>Umeå:</a:t>
+            </a:r>
+          </a:p>
+          <a:p>
+            <a:endParaRPr lang="en-SE" sz="2400" dirty="0"/>
+          </a:p>
+          <a:p>
+            <a:r>
+              <a:rPr lang="en-SE" sz="2400" dirty="0"/>
+              <a:t>Please sign up on the list in the classroom on Monday!</a:t>
+            </a:r>
+          </a:p>
+        </p:txBody>
+      </p:sp>
+      <p:sp>
+        <p:nvSpPr>
+          <p:cNvPr id="3" name="Title 2">
+            <a:extLst>
+              <a:ext uri="{FF2B5EF4-FFF2-40B4-BE49-F238E27FC236}">
+                <a16:creationId xmlns:a16="http://schemas.microsoft.com/office/drawing/2014/main" id="{B89F6912-36F6-CA31-AC72-7539500C7B1B}"/>
+              </a:ext>
+            </a:extLst>
+          </p:cNvPr>
+          <p:cNvSpPr>
+            <a:spLocks noGrp="1"/>
+          </p:cNvSpPr>
+          <p:nvPr>
+            <p:ph type="title"/>
+          </p:nvPr>
+        </p:nvSpPr>
+        <p:spPr/>
+        <p:txBody>
+          <a:bodyPr>
+            <a:normAutofit fontScale="90000"/>
+          </a:bodyPr>
+          <a:lstStyle/>
+          <a:p>
+            <a:r>
+              <a:rPr lang="en-SE" dirty="0"/>
+              <a:t>Course dinner</a:t>
             </a:r>
           </a:p>
         </p:txBody>
@@ -6811,7 +5763,7 @@
     </p:spTree>
     <p:extLst>
       <p:ext uri="{BB962C8B-B14F-4D97-AF65-F5344CB8AC3E}">
-        <p14:creationId xmlns:p14="http://schemas.microsoft.com/office/powerpoint/2010/main" val="2998468256"/>
+        <p14:creationId xmlns:p14="http://schemas.microsoft.com/office/powerpoint/2010/main" val="2894102020"/>
       </p:ext>
     </p:extLst>
   </p:cSld>
@@ -6840,10 +5792,10 @@
       </p:grpSpPr>
       <p:sp>
         <p:nvSpPr>
-          <p:cNvPr id="2" name="Platshållare för innehåll 1">
+          <p:cNvPr id="2" name="Rubrik 1">
             <a:extLst>
               <a:ext uri="{FF2B5EF4-FFF2-40B4-BE49-F238E27FC236}">
-                <a16:creationId xmlns:a16="http://schemas.microsoft.com/office/drawing/2014/main" id="{C839E2EE-38FA-9A4C-823E-E9E16C448F0D}"/>
+                <a16:creationId xmlns:a16="http://schemas.microsoft.com/office/drawing/2014/main" id="{91E43C49-E986-0845-A1CC-D1810C078403}"/>
               </a:ext>
             </a:extLst>
           </p:cNvPr>
@@ -6851,77 +5803,27 @@
             <a:spLocks noGrp="1"/>
           </p:cNvSpPr>
           <p:nvPr>
-            <p:ph idx="1"/>
+            <p:ph type="ctrTitle"/>
           </p:nvPr>
         </p:nvSpPr>
-        <p:spPr>
-          <a:xfrm>
-            <a:off x="431208" y="1235233"/>
-            <a:ext cx="11329579" cy="4964845"/>
-          </a:xfrm>
-        </p:spPr>
+        <p:spPr/>
         <p:txBody>
           <a:bodyPr/>
           <a:lstStyle/>
           <a:p>
-            <a:pPr marL="342900" indent="-342900">
-              <a:buFont typeface="Arial" panose="020B0604020202020204" pitchFamily="34" charset="0"/>
-              <a:buChar char="•"/>
-            </a:pPr>
-            <a:r>
-              <a:rPr lang="en-GB" sz="2400" dirty="0"/>
-              <a:t>Mainly live in the classroom in Uppsala.</a:t>
-            </a:r>
-          </a:p>
-          <a:p>
-            <a:pPr marL="342900" indent="-342900">
-              <a:buFont typeface="Arial" panose="020B0604020202020204" pitchFamily="34" charset="0"/>
-              <a:buChar char="•"/>
-            </a:pPr>
-            <a:r>
-              <a:rPr lang="en-GB" sz="2400" dirty="0"/>
-              <a:t>Streamed via zoom to Lund and </a:t>
-            </a:r>
-            <a:r>
-              <a:rPr lang="en-GB" sz="2400" dirty="0" err="1"/>
-              <a:t>Umeå</a:t>
-            </a:r>
-            <a:r>
-              <a:rPr lang="en-GB" sz="2400" dirty="0"/>
-              <a:t>. </a:t>
-            </a:r>
-          </a:p>
-          <a:p>
-            <a:pPr marL="342900" indent="-342900">
-              <a:buFont typeface="Arial" panose="020B0604020202020204" pitchFamily="34" charset="0"/>
-              <a:buChar char="•"/>
-            </a:pPr>
-            <a:r>
-              <a:rPr lang="en-GB" sz="2400" dirty="0"/>
-              <a:t>Lets help out to make sure that questions are heard in all classrooms!</a:t>
-            </a:r>
-          </a:p>
-          <a:p>
-            <a:pPr marL="342900" indent="-342900">
-              <a:buFont typeface="Arial" panose="020B0604020202020204" pitchFamily="34" charset="0"/>
-              <a:buChar char="•"/>
-            </a:pPr>
-            <a:endParaRPr lang="en-GB" dirty="0"/>
-          </a:p>
-          <a:p>
-            <a:endParaRPr lang="en-GB" dirty="0"/>
-          </a:p>
-          <a:p>
-            <a:endParaRPr lang="en-GB" dirty="0"/>
+            <a:r>
+              <a:rPr lang="en-GB" dirty="0"/>
+              <a:t>Questions?</a:t>
+            </a:r>
           </a:p>
         </p:txBody>
       </p:sp>
       <p:sp>
         <p:nvSpPr>
-          <p:cNvPr id="3" name="Rubrik 2">
+          <p:cNvPr id="3" name="Underrubrik 2">
             <a:extLst>
               <a:ext uri="{FF2B5EF4-FFF2-40B4-BE49-F238E27FC236}">
-                <a16:creationId xmlns:a16="http://schemas.microsoft.com/office/drawing/2014/main" id="{A058BB4D-2A4B-9440-870E-3534FB01AA85}"/>
+                <a16:creationId xmlns:a16="http://schemas.microsoft.com/office/drawing/2014/main" id="{A9E0F243-4187-4A48-85B7-4390215EB1DA}"/>
               </a:ext>
             </a:extLst>
           </p:cNvPr>
@@ -6929,19 +5831,17 @@
             <a:spLocks noGrp="1"/>
           </p:cNvSpPr>
           <p:nvPr>
-            <p:ph type="title"/>
+            <p:ph type="subTitle" idx="1"/>
           </p:nvPr>
         </p:nvSpPr>
         <p:spPr/>
         <p:txBody>
-          <a:bodyPr>
-            <a:normAutofit fontScale="90000"/>
-          </a:bodyPr>
+          <a:bodyPr/>
           <a:lstStyle/>
           <a:p>
             <a:r>
               <a:rPr lang="en-GB" dirty="0"/>
-              <a:t>Lectures</a:t>
+              <a:t>Please ask questions and take part in discussions trough out the workshop! </a:t>
             </a:r>
           </a:p>
         </p:txBody>
@@ -6949,7 +5849,7 @@
     </p:spTree>
     <p:extLst>
       <p:ext uri="{BB962C8B-B14F-4D97-AF65-F5344CB8AC3E}">
-        <p14:creationId xmlns:p14="http://schemas.microsoft.com/office/powerpoint/2010/main" val="3321144600"/>
+        <p14:creationId xmlns:p14="http://schemas.microsoft.com/office/powerpoint/2010/main" val="3455965932"/>
       </p:ext>
     </p:extLst>
   </p:cSld>

</xml_diff>

<commit_message>
Updated introduction slides, Added to schedule
</commit_message>
<xml_diff>
--- a/topics/other/slide_introduction.pptx
+++ b/topics/other/slide_introduction.pptx
@@ -5106,7 +5106,7 @@
         </p:blipFill>
         <p:spPr>
           <a:xfrm>
-            <a:off x="1422399" y="2070100"/>
+            <a:off x="1422399" y="2170216"/>
             <a:ext cx="2717800" cy="2717800"/>
           </a:xfrm>
         </p:spPr>
@@ -5132,7 +5132,7 @@
         </p:blipFill>
         <p:spPr>
           <a:xfrm>
-            <a:off x="4247050" y="1770635"/>
+            <a:off x="4231100" y="1823185"/>
             <a:ext cx="3511593" cy="3516962"/>
           </a:xfrm>
           <a:prstGeom prst="rect">
@@ -5156,14 +5156,13 @@
         </p:nvPicPr>
         <p:blipFill>
           <a:blip r:embed="rId4"/>
-          <a:stretch>
-            <a:fillRect/>
-          </a:stretch>
+          <a:srcRect/>
+          <a:stretch/>
         </p:blipFill>
         <p:spPr>
           <a:xfrm>
-            <a:off x="7644415" y="1770635"/>
-            <a:ext cx="3147630" cy="3147630"/>
+            <a:off x="7749516" y="2058615"/>
+            <a:ext cx="2960524" cy="2960524"/>
           </a:xfrm>
           <a:prstGeom prst="rect">
             <a:avLst/>

</xml_diff>

<commit_message>
Update intro slides for Linköping
</commit_message>
<xml_diff>
--- a/topics/other/slide_introduction.pptx
+++ b/topics/other/slide_introduction.pptx
@@ -15,8 +15,8 @@
     <p:sldId id="1125" r:id="rId3"/>
     <p:sldId id="1121" r:id="rId4"/>
     <p:sldId id="1131" r:id="rId5"/>
-    <p:sldId id="1137" r:id="rId6"/>
-    <p:sldId id="1129" r:id="rId7"/>
+    <p:sldId id="1138" r:id="rId6"/>
+    <p:sldId id="1137" r:id="rId7"/>
     <p:sldId id="1135" r:id="rId8"/>
     <p:sldId id="1133" r:id="rId9"/>
   </p:sldIdLst>
@@ -306,7 +306,7 @@
           <a:p>
             <a:fld id="{C3D4F295-D1F4-D54B-BA69-832D96C6432A}" type="datetimeFigureOut">
               <a:rPr lang="en-SE" smtClean="0"/>
-              <a:t>2024-03-15</a:t>
+              <a:t>2024-11-24</a:t>
             </a:fld>
             <a:endParaRPr lang="en-SE"/>
           </a:p>
@@ -405,7 +405,7 @@
           <a:p>
             <a:fld id="{1EC88F62-802F-2448-8EA8-1562273BBAF4}" type="datetimeFigureOut">
               <a:rPr lang="en-SE" smtClean="0"/>
-              <a:t>2024-03-15</a:t>
+              <a:t>2024-11-24</a:t>
             </a:fld>
             <a:endParaRPr lang="en-SE"/>
           </a:p>
@@ -928,98 +928,6 @@
 </file>
 
 <file path=ppt/notesSlides/notesSlide3.xml><?xml version="1.0" encoding="utf-8"?>
-<p:notes xmlns:a="http://schemas.openxmlformats.org/drawingml/2006/main" xmlns:r="http://schemas.openxmlformats.org/officeDocument/2006/relationships" xmlns:p="http://schemas.openxmlformats.org/presentationml/2006/main">
-  <p:cSld>
-    <p:spTree>
-      <p:nvGrpSpPr>
-        <p:cNvPr id="1" name=""/>
-        <p:cNvGrpSpPr/>
-        <p:nvPr/>
-      </p:nvGrpSpPr>
-      <p:grpSpPr>
-        <a:xfrm>
-          <a:off x="0" y="0"/>
-          <a:ext cx="0" cy="0"/>
-          <a:chOff x="0" y="0"/>
-          <a:chExt cx="0" cy="0"/>
-        </a:xfrm>
-      </p:grpSpPr>
-      <p:sp>
-        <p:nvSpPr>
-          <p:cNvPr id="2" name="Platshållare för bildobjekt 1"/>
-          <p:cNvSpPr>
-            <a:spLocks noGrp="1" noRot="1" noChangeAspect="1"/>
-          </p:cNvSpPr>
-          <p:nvPr>
-            <p:ph type="sldImg"/>
-          </p:nvPr>
-        </p:nvSpPr>
-        <p:spPr/>
-      </p:sp>
-      <p:sp>
-        <p:nvSpPr>
-          <p:cNvPr id="3" name="Platshållare för anteckningar 2"/>
-          <p:cNvSpPr>
-            <a:spLocks noGrp="1"/>
-          </p:cNvSpPr>
-          <p:nvPr>
-            <p:ph type="body" idx="1"/>
-          </p:nvPr>
-        </p:nvSpPr>
-        <p:spPr/>
-        <p:txBody>
-          <a:bodyPr/>
-          <a:lstStyle/>
-          <a:p>
-            <a:r>
-              <a:rPr lang="en-GB" dirty="0"/>
-              <a:t>Show how to edit </a:t>
-            </a:r>
-            <a:r>
-              <a:rPr lang="en-GB" dirty="0" err="1"/>
-              <a:t>hackmd</a:t>
-            </a:r>
-            <a:endParaRPr lang="en-GB" dirty="0"/>
-          </a:p>
-        </p:txBody>
-      </p:sp>
-      <p:sp>
-        <p:nvSpPr>
-          <p:cNvPr id="4" name="Platshållare för bildnummer 3"/>
-          <p:cNvSpPr>
-            <a:spLocks noGrp="1"/>
-          </p:cNvSpPr>
-          <p:nvPr>
-            <p:ph type="sldNum" sz="quarter" idx="5"/>
-          </p:nvPr>
-        </p:nvSpPr>
-        <p:spPr/>
-        <p:txBody>
-          <a:bodyPr/>
-          <a:lstStyle/>
-          <a:p>
-            <a:fld id="{DA3BA1A2-6287-9245-9FC9-020813467484}" type="slidenum">
-              <a:rPr lang="en-SE" smtClean="0"/>
-              <a:t>6</a:t>
-            </a:fld>
-            <a:endParaRPr lang="en-SE"/>
-          </a:p>
-        </p:txBody>
-      </p:sp>
-    </p:spTree>
-    <p:extLst>
-      <p:ext uri="{BB962C8B-B14F-4D97-AF65-F5344CB8AC3E}">
-        <p14:creationId xmlns:p14="http://schemas.microsoft.com/office/powerpoint/2010/main" val="1582120909"/>
-      </p:ext>
-    </p:extLst>
-  </p:cSld>
-  <p:clrMapOvr>
-    <a:masterClrMapping/>
-  </p:clrMapOvr>
-</p:notes>
-</file>
-
-<file path=ppt/notesSlides/notesSlide4.xml><?xml version="1.0" encoding="utf-8"?>
 <p:notes xmlns:a="http://schemas.openxmlformats.org/drawingml/2006/main" xmlns:r="http://schemas.openxmlformats.org/officeDocument/2006/relationships" xmlns:p="http://schemas.openxmlformats.org/presentationml/2006/main">
   <p:cSld>
     <p:spTree>
@@ -5203,7 +5111,7 @@
           <p:cNvPr id="2" name="Content Placeholder 1">
             <a:extLst>
               <a:ext uri="{FF2B5EF4-FFF2-40B4-BE49-F238E27FC236}">
-                <a16:creationId xmlns:a16="http://schemas.microsoft.com/office/drawing/2014/main" id="{23A79CA0-88DC-72F5-37E2-EEEF4A122327}"/>
+                <a16:creationId xmlns:a16="http://schemas.microsoft.com/office/drawing/2014/main" id="{D33D6560-B0E5-6A39-9DCA-D602C46CE421}"/>
               </a:ext>
             </a:extLst>
           </p:cNvPr>
@@ -5216,119 +5124,155 @@
         </p:nvSpPr>
         <p:spPr/>
         <p:txBody>
-          <a:bodyPr>
-            <a:normAutofit/>
+          <a:bodyPr numCol="2">
+            <a:normAutofit fontScale="92500"/>
           </a:bodyPr>
           <a:lstStyle/>
           <a:p>
-            <a:pPr marL="342900" indent="-342900">
-              <a:buFont typeface="Arial" panose="020B0604020202020204" pitchFamily="34" charset="0"/>
-              <a:buChar char="•"/>
-            </a:pPr>
-            <a:r>
-              <a:rPr lang="en-SE" sz="2400" dirty="0"/>
-              <a:t>Zoom: </a:t>
-            </a:r>
-            <a:r>
-              <a:rPr lang="en-GB" sz="2400" dirty="0">
-                <a:hlinkClick r:id="rId2"/>
+            <a:r>
+              <a:rPr lang="en-GB" sz="3600" b="0" i="0" u="none" strike="noStrike" dirty="0" err="1">
+                <a:solidFill>
+                  <a:srgbClr val="1D1D1B"/>
+                </a:solidFill>
+                <a:effectLst/>
+                <a:latin typeface="+mn-lt"/>
               </a:rPr>
-              <a:t>https://uu-se.zoom.us/j/61968741381?pwd=TUxTaysrWFc2RTloeWh4YkRQNUdNZz09</a:t>
-            </a:r>
-            <a:endParaRPr lang="en-GB" sz="2400" dirty="0"/>
-          </a:p>
-          <a:p>
-            <a:pPr marL="342900" indent="-342900">
-              <a:buFont typeface="Arial" panose="020B0604020202020204" pitchFamily="34" charset="0"/>
-              <a:buChar char="•"/>
-            </a:pPr>
-            <a:r>
-              <a:rPr lang="en-SE" sz="2400" dirty="0"/>
-              <a:t>Course home page: </a:t>
-            </a:r>
-            <a:r>
-              <a:rPr lang="en-GB" sz="2400" dirty="0"/>
-              <a:t>https://</a:t>
-            </a:r>
-            <a:r>
-              <a:rPr lang="en-GB" sz="2400" dirty="0" err="1"/>
-              <a:t>uppsala.instructure.com</a:t>
-            </a:r>
-            <a:r>
-              <a:rPr lang="en-GB" sz="2400" dirty="0"/>
-              <a:t>/courses/91743</a:t>
-            </a:r>
-            <a:endParaRPr lang="en-SE" sz="2400" dirty="0"/>
-          </a:p>
-          <a:p>
-            <a:pPr marL="342900" indent="-342900">
-              <a:buFont typeface="Arial" panose="020B0604020202020204" pitchFamily="34" charset="0"/>
-              <a:buChar char="•"/>
-            </a:pPr>
-            <a:r>
-              <a:rPr lang="en-SE" sz="2400" dirty="0"/>
-              <a:t>Lunch ~12:00 every day</a:t>
-            </a:r>
-          </a:p>
-          <a:p>
-            <a:pPr marL="342900" indent="-342900">
-              <a:buFont typeface="Arial" panose="020B0604020202020204" pitchFamily="34" charset="0"/>
-              <a:buChar char="•"/>
-            </a:pPr>
-            <a:r>
-              <a:rPr lang="en-SE" sz="2400" dirty="0"/>
-              <a:t>Coffee breaks in the morning and afternoon (exact times decided per day)</a:t>
-            </a:r>
-          </a:p>
-          <a:p>
-            <a:pPr marL="342900" indent="-342900">
-              <a:buFont typeface="Arial" panose="020B0604020202020204" pitchFamily="34" charset="0"/>
-              <a:buChar char="•"/>
-            </a:pPr>
-            <a:r>
-              <a:rPr lang="en-SE" sz="2400" dirty="0"/>
-              <a:t>Times in schedule may be adjusted slightly depending on breaks. Start time in the morning and after lunch is “fixed”.</a:t>
-            </a:r>
-          </a:p>
-          <a:p>
-            <a:pPr marL="342900" indent="-342900">
-              <a:buFont typeface="Arial" panose="020B0604020202020204" pitchFamily="34" charset="0"/>
-              <a:buChar char="•"/>
-            </a:pPr>
-            <a:r>
-              <a:rPr lang="en-SE" sz="2400" dirty="0"/>
-              <a:t>Lectures in the main zoom room</a:t>
-            </a:r>
-          </a:p>
-          <a:p>
-            <a:pPr marL="342900" indent="-342900">
-              <a:buFont typeface="Arial" panose="020B0604020202020204" pitchFamily="34" charset="0"/>
-              <a:buChar char="•"/>
-            </a:pPr>
-            <a:r>
-              <a:rPr lang="en-SE" sz="2400" dirty="0"/>
-              <a:t>Labs in breakout rooms</a:t>
-            </a:r>
-          </a:p>
-          <a:p>
-            <a:pPr marL="342900" indent="-342900">
-              <a:buFont typeface="Arial" panose="020B0604020202020204" pitchFamily="34" charset="0"/>
-              <a:buChar char="•"/>
-            </a:pPr>
-            <a:r>
-              <a:rPr lang="en-SE" sz="2400" dirty="0"/>
-              <a:t>Please have cameras on</a:t>
-            </a:r>
-          </a:p>
-          <a:p>
-            <a:pPr marL="342900" indent="-342900">
-              <a:buFont typeface="Arial" panose="020B0604020202020204" pitchFamily="34" charset="0"/>
-              <a:buChar char="•"/>
-            </a:pPr>
-            <a:endParaRPr lang="en-SE" sz="2400" dirty="0"/>
-          </a:p>
-          <a:p>
-            <a:endParaRPr lang="en-SE" sz="2400" dirty="0"/>
+              <a:t>Jyotirmoy</a:t>
+            </a:r>
+            <a:r>
+              <a:rPr lang="en-GB" sz="3600" b="0" i="0" u="none" strike="noStrike" dirty="0">
+                <a:solidFill>
+                  <a:srgbClr val="1D1D1B"/>
+                </a:solidFill>
+                <a:effectLst/>
+                <a:latin typeface="+mn-lt"/>
+              </a:rPr>
+              <a:t> Das</a:t>
+            </a:r>
+          </a:p>
+          <a:p>
+            <a:r>
+              <a:rPr lang="en-SE" sz="3600" dirty="0">
+                <a:latin typeface="+mn-lt"/>
+              </a:rPr>
+              <a:t>Core Facility LiU, Clinical Genomics SciLifeLab Linköping</a:t>
+            </a:r>
+          </a:p>
+          <a:p>
+            <a:endParaRPr lang="en-SE" sz="3600" dirty="0">
+              <a:latin typeface="+mn-lt"/>
+            </a:endParaRPr>
+          </a:p>
+          <a:p>
+            <a:r>
+              <a:rPr lang="en-SE" sz="3600" dirty="0">
+                <a:latin typeface="+mn-lt"/>
+              </a:rPr>
+              <a:t>Johanna Lagensjö</a:t>
+            </a:r>
+          </a:p>
+          <a:p>
+            <a:r>
+              <a:rPr lang="en-SE" sz="3600" dirty="0">
+                <a:latin typeface="+mn-lt"/>
+              </a:rPr>
+              <a:t>NGI SciLifeLab Uppsala</a:t>
+            </a:r>
+          </a:p>
+          <a:p>
+            <a:endParaRPr lang="en-SE" sz="3600" dirty="0">
+              <a:latin typeface="+mn-lt"/>
+            </a:endParaRPr>
+          </a:p>
+          <a:p>
+            <a:r>
+              <a:rPr lang="en-SE" sz="3600" dirty="0">
+                <a:latin typeface="+mn-lt"/>
+              </a:rPr>
+              <a:t>Adam Ameur </a:t>
+            </a:r>
+          </a:p>
+          <a:p>
+            <a:r>
+              <a:rPr lang="en-SE" sz="3600" dirty="0">
+                <a:latin typeface="+mn-lt"/>
+              </a:rPr>
+              <a:t>NGI SciLifeLab Uppsala</a:t>
+            </a:r>
+          </a:p>
+          <a:p>
+            <a:pPr marL="400050"/>
+            <a:endParaRPr lang="en-SE" sz="3600" dirty="0">
+              <a:latin typeface="+mn-lt"/>
+            </a:endParaRPr>
+          </a:p>
+          <a:p>
+            <a:pPr marL="400050"/>
+            <a:r>
+              <a:rPr lang="en-SE" sz="3600" dirty="0">
+                <a:latin typeface="+mn-lt"/>
+              </a:rPr>
+              <a:t>Diana Ekman </a:t>
+            </a:r>
+          </a:p>
+          <a:p>
+            <a:pPr marL="400050"/>
+            <a:r>
+              <a:rPr lang="en-SE" sz="3600" dirty="0">
+                <a:latin typeface="+mn-lt"/>
+              </a:rPr>
+              <a:t>NBIS SciLifeLab Stockholm</a:t>
+            </a:r>
+          </a:p>
+          <a:p>
+            <a:pPr marL="400050"/>
+            <a:br>
+              <a:rPr lang="en-SE" sz="3600" dirty="0">
+                <a:latin typeface="+mn-lt"/>
+              </a:rPr>
+            </a:br>
+            <a:r>
+              <a:rPr lang="en-SE" sz="3600" dirty="0">
+                <a:latin typeface="+mn-lt"/>
+              </a:rPr>
+              <a:t>Dag Ahren</a:t>
+            </a:r>
+          </a:p>
+          <a:p>
+            <a:pPr marL="400050"/>
+            <a:r>
+              <a:rPr lang="en-SE" sz="3600" dirty="0">
+                <a:latin typeface="+mn-lt"/>
+              </a:rPr>
+              <a:t>NBIS SciLifeLab Lund</a:t>
+            </a:r>
+          </a:p>
+          <a:p>
+            <a:pPr marL="400050"/>
+            <a:endParaRPr lang="en-SE" sz="3600" dirty="0">
+              <a:latin typeface="+mn-lt"/>
+            </a:endParaRPr>
+          </a:p>
+          <a:p>
+            <a:pPr marL="400050"/>
+            <a:r>
+              <a:rPr lang="en-SE" sz="3600" dirty="0">
+                <a:latin typeface="+mn-lt"/>
+              </a:rPr>
+              <a:t>Elin Kronander </a:t>
+            </a:r>
+          </a:p>
+          <a:p>
+            <a:pPr marL="400050"/>
+            <a:r>
+              <a:rPr lang="en-SE" sz="3600" dirty="0">
+                <a:latin typeface="+mn-lt"/>
+              </a:rPr>
+              <a:t>NBIS ScilIifeLab Uppsala </a:t>
+            </a:r>
+          </a:p>
+          <a:p>
+            <a:endParaRPr lang="en-SE" dirty="0"/>
           </a:p>
         </p:txBody>
       </p:sp>
@@ -5337,7 +5281,7 @@
           <p:cNvPr id="3" name="Title 2">
             <a:extLst>
               <a:ext uri="{FF2B5EF4-FFF2-40B4-BE49-F238E27FC236}">
-                <a16:creationId xmlns:a16="http://schemas.microsoft.com/office/drawing/2014/main" id="{F55C4A6F-E249-AD4F-05AB-1C5BAE7EEE06}"/>
+                <a16:creationId xmlns:a16="http://schemas.microsoft.com/office/drawing/2014/main" id="{AE4E6BEE-29B6-9EB3-5D85-B8E1BC3F676B}"/>
               </a:ext>
             </a:extLst>
           </p:cNvPr>
@@ -5357,7 +5301,7 @@
           <a:p>
             <a:r>
               <a:rPr lang="en-SE" dirty="0"/>
-              <a:t>Practical information</a:t>
+              <a:t>Teachers</a:t>
             </a:r>
           </a:p>
         </p:txBody>
@@ -5365,7 +5309,7 @@
     </p:spTree>
     <p:extLst>
       <p:ext uri="{BB962C8B-B14F-4D97-AF65-F5344CB8AC3E}">
-        <p14:creationId xmlns:p14="http://schemas.microsoft.com/office/powerpoint/2010/main" val="3067932316"/>
+        <p14:creationId xmlns:p14="http://schemas.microsoft.com/office/powerpoint/2010/main" val="3976039184"/>
       </p:ext>
     </p:extLst>
   </p:cSld>
@@ -5394,10 +5338,10 @@
       </p:grpSpPr>
       <p:sp>
         <p:nvSpPr>
-          <p:cNvPr id="2" name="Platshållare för innehåll 1">
+          <p:cNvPr id="2" name="Content Placeholder 1">
             <a:extLst>
               <a:ext uri="{FF2B5EF4-FFF2-40B4-BE49-F238E27FC236}">
-                <a16:creationId xmlns:a16="http://schemas.microsoft.com/office/drawing/2014/main" id="{EFEF3CA9-AB7A-A446-91F3-AFDAACBB631D}"/>
+                <a16:creationId xmlns:a16="http://schemas.microsoft.com/office/drawing/2014/main" id="{23A79CA0-88DC-72F5-37E2-EEEF4A122327}"/>
               </a:ext>
             </a:extLst>
           </p:cNvPr>
@@ -5408,15 +5352,10 @@
             <p:ph idx="1"/>
           </p:nvPr>
         </p:nvSpPr>
-        <p:spPr>
-          <a:xfrm>
-            <a:off x="900547" y="1127771"/>
-            <a:ext cx="8680133" cy="2992407"/>
-          </a:xfrm>
-        </p:spPr>
+        <p:spPr/>
         <p:txBody>
           <a:bodyPr>
-            <a:noAutofit/>
+            <a:normAutofit/>
           </a:bodyPr>
           <a:lstStyle/>
           <a:p>
@@ -5425,38 +5364,27 @@
               <a:buChar char="•"/>
             </a:pPr>
             <a:r>
-              <a:rPr lang="en-GB" sz="2400" dirty="0"/>
-              <a:t>Instructions available in Canvas:</a:t>
-            </a:r>
-          </a:p>
-          <a:p>
-            <a:pPr marL="800100" lvl="1" indent="-342900">
-              <a:buFont typeface="Arial" panose="020B0604020202020204" pitchFamily="34" charset="0"/>
-              <a:buChar char="•"/>
-            </a:pPr>
-            <a:r>
-              <a:rPr lang="en-GB" sz="2400" dirty="0"/>
-              <a:t>https://</a:t>
-            </a:r>
-            <a:r>
-              <a:rPr lang="en-GB" sz="2400" dirty="0" err="1"/>
-              <a:t>uppsala.instructure.com</a:t>
-            </a:r>
-            <a:r>
-              <a:rPr lang="en-GB" sz="2400" dirty="0"/>
-              <a:t>/courses/91743</a:t>
-            </a:r>
-            <a:endParaRPr lang="en-SE" sz="2400" dirty="0"/>
-          </a:p>
-          <a:p>
-            <a:pPr marL="800100" lvl="1" indent="-342900">
-              <a:buFont typeface="Arial" panose="020B0604020202020204" pitchFamily="34" charset="0"/>
-              <a:buChar char="•"/>
-            </a:pPr>
-            <a:r>
-              <a:rPr lang="en-GB" sz="2400" dirty="0"/>
-              <a:t>All material linked from Modules/Workshop/Schedule</a:t>
-            </a:r>
+              <a:rPr lang="en-SE" sz="2400" dirty="0"/>
+              <a:t>Zoom Monday: </a:t>
+            </a:r>
+            <a:r>
+              <a:rPr lang="en-GB" sz="2000" dirty="0">
+                <a:solidFill>
+                  <a:srgbClr val="616074"/>
+                </a:solidFill>
+                <a:effectLst/>
+                <a:latin typeface="Helvetica Neue" panose="02000503000000020004" pitchFamily="2" charset="0"/>
+                <a:hlinkClick r:id="rId2"/>
+              </a:rPr>
+              <a:t>https://liu-se.zoom.us/j/65307893994</a:t>
+            </a:r>
+            <a:endParaRPr lang="en-GB" sz="2000" dirty="0">
+              <a:solidFill>
+                <a:srgbClr val="616074"/>
+              </a:solidFill>
+              <a:effectLst/>
+              <a:latin typeface="Helvetica Neue" panose="02000503000000020004" pitchFamily="2" charset="0"/>
+            </a:endParaRPr>
           </a:p>
           <a:p>
             <a:pPr marL="342900" indent="-342900">
@@ -5464,9 +5392,16 @@
               <a:buChar char="•"/>
             </a:pPr>
             <a:r>
-              <a:rPr lang="en-GB" sz="2400" dirty="0"/>
-              <a:t>Work in breakout rooms</a:t>
-            </a:r>
+              <a:rPr lang="en-SE" sz="2400" dirty="0"/>
+              <a:t>Course web page: </a:t>
+            </a:r>
+            <a:r>
+              <a:rPr lang="en-GB" sz="2400" dirty="0">
+                <a:hlinkClick r:id="rId3"/>
+              </a:rPr>
+              <a:t>https://nbisweden.github.io/workshop-ngsintro/2411/index.html</a:t>
+            </a:r>
+            <a:endParaRPr lang="en-GB" sz="2400" dirty="0"/>
           </a:p>
           <a:p>
             <a:pPr marL="342900" indent="-342900">
@@ -5474,9 +5409,22 @@
               <a:buChar char="•"/>
             </a:pPr>
             <a:r>
+              <a:rPr lang="en-SE" sz="2400" dirty="0"/>
+              <a:t>Lunch ~12:00 every day at Tropikhuset (</a:t>
+            </a:r>
+            <a:r>
               <a:rPr lang="en-GB" sz="2400" dirty="0"/>
-              <a:t>Four persons in each room</a:t>
-            </a:r>
+              <a:t>https://</a:t>
+            </a:r>
+            <a:r>
+              <a:rPr lang="en-GB" sz="2400" dirty="0" err="1"/>
+              <a:t>belvederen-tropikhuset.se</a:t>
+            </a:r>
+            <a:r>
+              <a:rPr lang="en-GB" sz="2400" dirty="0"/>
+              <a:t>)</a:t>
+            </a:r>
+            <a:endParaRPr lang="en-SE" sz="2400" dirty="0"/>
           </a:p>
           <a:p>
             <a:pPr marL="342900" indent="-342900">
@@ -5484,8 +5432,8 @@
               <a:buChar char="•"/>
             </a:pPr>
             <a:r>
-              <a:rPr lang="en-GB" sz="2400" dirty="0"/>
-              <a:t>Help each other in the room because it improves the learning.</a:t>
+              <a:rPr lang="en-SE" sz="2400" dirty="0"/>
+              <a:t>Coffee breaks in the morning and afternoon </a:t>
             </a:r>
           </a:p>
           <a:p>
@@ -5494,8 +5442,8 @@
               <a:buChar char="•"/>
             </a:pPr>
             <a:r>
-              <a:rPr lang="en-GB" sz="2400" dirty="0"/>
-              <a:t>Breakout rooms will be announced in slack</a:t>
+              <a:rPr lang="en-SE" sz="2400" dirty="0"/>
+              <a:t>Times in schedule may be adjusted slightly depending on breaks. Start time in the morning and after lunch is “fixed”.</a:t>
             </a:r>
           </a:p>
           <a:p>
@@ -5504,8 +5452,16 @@
               <a:buChar char="•"/>
             </a:pPr>
             <a:r>
+              <a:rPr lang="en-SE" sz="2400" dirty="0"/>
+              <a:t>C</a:t>
+            </a:r>
+            <a:r>
               <a:rPr lang="en-GB" sz="2400" dirty="0"/>
-              <a:t>Ask TAs when you have problems! </a:t>
+              <a:t>o</a:t>
+            </a:r>
+            <a:r>
+              <a:rPr lang="en-SE" sz="2400" dirty="0"/>
+              <a:t>urse dinner Thursday 18:00 at PappaGrappa</a:t>
             </a:r>
           </a:p>
           <a:p>
@@ -5513,57 +5469,26 @@
               <a:buFont typeface="Arial" panose="020B0604020202020204" pitchFamily="34" charset="0"/>
               <a:buChar char="•"/>
             </a:pPr>
-            <a:r>
-              <a:rPr lang="en-GB" sz="2400" dirty="0"/>
-              <a:t>Use slack channel </a:t>
-            </a:r>
-            <a:r>
-              <a:rPr lang="en-GB" sz="2400" b="1" dirty="0" err="1"/>
-              <a:t>ngsintro_students</a:t>
-            </a:r>
-            <a:r>
-              <a:rPr lang="en-GB" sz="2400" b="1" dirty="0"/>
-              <a:t> </a:t>
-            </a:r>
-            <a:r>
-              <a:rPr lang="en-GB" sz="2400" dirty="0"/>
-              <a:t>to ask for help: </a:t>
-            </a:r>
-          </a:p>
-          <a:p>
-            <a:pPr lvl="1"/>
-            <a:r>
-              <a:rPr lang="en-GB" sz="2400" dirty="0"/>
-              <a:t>“Help needed in room 4”</a:t>
-            </a:r>
+            <a:endParaRPr lang="en-SE" sz="2400" dirty="0"/>
           </a:p>
           <a:p>
             <a:pPr marL="342900" indent="-342900">
               <a:buFont typeface="Arial" panose="020B0604020202020204" pitchFamily="34" charset="0"/>
               <a:buChar char="•"/>
             </a:pPr>
-            <a:endParaRPr lang="en-GB" sz="2400" dirty="0"/>
-          </a:p>
-          <a:p>
-            <a:endParaRPr lang="en-GB" sz="2400" dirty="0"/>
-          </a:p>
-          <a:p>
-            <a:endParaRPr lang="en-GB" sz="2400" dirty="0"/>
-          </a:p>
-          <a:p>
-            <a:endParaRPr lang="en-GB" sz="2400" dirty="0"/>
-          </a:p>
-          <a:p>
-            <a:endParaRPr lang="en-GB" sz="2400" dirty="0"/>
+            <a:endParaRPr lang="en-SE" sz="2400" dirty="0"/>
+          </a:p>
+          <a:p>
+            <a:endParaRPr lang="en-SE" sz="2400" dirty="0"/>
           </a:p>
         </p:txBody>
       </p:sp>
       <p:sp>
         <p:nvSpPr>
-          <p:cNvPr id="3" name="Rubrik 2">
+          <p:cNvPr id="3" name="Title 2">
             <a:extLst>
               <a:ext uri="{FF2B5EF4-FFF2-40B4-BE49-F238E27FC236}">
-                <a16:creationId xmlns:a16="http://schemas.microsoft.com/office/drawing/2014/main" id="{7E27F0CF-10D2-0745-B573-A806CFB1514D}"/>
+                <a16:creationId xmlns:a16="http://schemas.microsoft.com/office/drawing/2014/main" id="{F55C4A6F-E249-AD4F-05AB-1C5BAE7EEE06}"/>
               </a:ext>
             </a:extLst>
           </p:cNvPr>
@@ -5582,8 +5507,8 @@
           <a:lstStyle/>
           <a:p>
             <a:r>
-              <a:rPr lang="en-GB" dirty="0"/>
-              <a:t>Labs</a:t>
+              <a:rPr lang="en-SE" dirty="0"/>
+              <a:t>Practical information</a:t>
             </a:r>
           </a:p>
         </p:txBody>
@@ -5591,7 +5516,7 @@
     </p:spTree>
     <p:extLst>
       <p:ext uri="{BB962C8B-B14F-4D97-AF65-F5344CB8AC3E}">
-        <p14:creationId xmlns:p14="http://schemas.microsoft.com/office/powerpoint/2010/main" val="235262784"/>
+        <p14:creationId xmlns:p14="http://schemas.microsoft.com/office/powerpoint/2010/main" val="3067932316"/>
       </p:ext>
     </p:extLst>
   </p:cSld>
@@ -5679,7 +5604,7 @@
           <a:p>
             <a:r>
               <a:rPr lang="en-SE" sz="2400" dirty="0"/>
-              <a:t>We will mark your attendance during the workshop</a:t>
+              <a:t>Please mark your attendance on the sheet in the classroom every day</a:t>
             </a:r>
           </a:p>
         </p:txBody>

</xml_diff>